<commit_message>
more details about pod & generice resource structure
</commit_message>
<xml_diff>
--- a/kubernetes/02_namespaces_pods.pptx
+++ b/kubernetes/02_namespaces_pods.pptx
@@ -5,21 +5,22 @@
     <p:sldMasterId id="2147483733" r:id="rId1"/>
   </p:sldMasterIdLst>
   <p:notesMasterIdLst>
-    <p:notesMasterId r:id="rId11"/>
+    <p:notesMasterId r:id="rId12"/>
   </p:notesMasterIdLst>
   <p:handoutMasterIdLst>
-    <p:handoutMasterId r:id="rId12"/>
+    <p:handoutMasterId r:id="rId13"/>
   </p:handoutMasterIdLst>
   <p:sldIdLst>
     <p:sldId id="433" r:id="rId2"/>
     <p:sldId id="441" r:id="rId3"/>
     <p:sldId id="437" r:id="rId4"/>
-    <p:sldId id="438" r:id="rId5"/>
-    <p:sldId id="440" r:id="rId6"/>
-    <p:sldId id="436" r:id="rId7"/>
-    <p:sldId id="443" r:id="rId8"/>
-    <p:sldId id="444" r:id="rId9"/>
-    <p:sldId id="265" r:id="rId10"/>
+    <p:sldId id="445" r:id="rId5"/>
+    <p:sldId id="438" r:id="rId6"/>
+    <p:sldId id="440" r:id="rId7"/>
+    <p:sldId id="436" r:id="rId8"/>
+    <p:sldId id="443" r:id="rId9"/>
+    <p:sldId id="444" r:id="rId10"/>
+    <p:sldId id="265" r:id="rId11"/>
   </p:sldIdLst>
   <p:sldSz cx="12195175" cy="6858000"/>
   <p:notesSz cx="6858000" cy="9144000"/>
@@ -634,6 +635,49 @@
       </p:grpSpPr>
       <p:sp>
         <p:nvSpPr>
+          <p:cNvPr id="2" name="Slide Image Placeholder 1"/>
+          <p:cNvSpPr>
+            <a:spLocks noGrp="1" noRot="1" noChangeAspect="1"/>
+          </p:cNvSpPr>
+          <p:nvPr>
+            <p:ph type="sldImg"/>
+          </p:nvPr>
+        </p:nvSpPr>
+        <p:spPr/>
+      </p:sp>
+      <p:sp>
+        <p:nvSpPr>
+          <p:cNvPr id="3" name="Notes Placeholder 2"/>
+          <p:cNvSpPr>
+            <a:spLocks noGrp="1"/>
+          </p:cNvSpPr>
+          <p:nvPr>
+            <p:ph type="body" idx="1"/>
+          </p:nvPr>
+        </p:nvSpPr>
+        <p:spPr/>
+        <p:txBody>
+          <a:bodyPr/>
+          <a:lstStyle/>
+          <a:p>
+            <a:r>
+              <a:rPr lang="en-US" dirty="0"/>
+              <a:t>Example</a:t>
+            </a:r>
+            <a:r>
+              <a:rPr lang="en-US" baseline="0" dirty="0"/>
+              <a:t> for a resource with different structure: </a:t>
+            </a:r>
+            <a:r>
+              <a:rPr lang="en-US" baseline="0" dirty="0" err="1"/>
+              <a:t>configMap</a:t>
+            </a:r>
+            <a:endParaRPr lang="en-US" dirty="0"/>
+          </a:p>
+        </p:txBody>
+      </p:sp>
+      <p:sp>
+        <p:nvSpPr>
           <p:cNvPr id="4" name="Slide Number Placeholder 3"/>
           <p:cNvSpPr>
             <a:spLocks noGrp="1"/>
@@ -656,48 +700,10 @@
           </a:p>
         </p:txBody>
       </p:sp>
-      <p:sp>
-        <p:nvSpPr>
-          <p:cNvPr id="9" name="Slide Image Placeholder 8"/>
-          <p:cNvSpPr>
-            <a:spLocks noGrp="1" noRot="1" noChangeAspect="1"/>
-          </p:cNvSpPr>
-          <p:nvPr>
-            <p:ph type="sldImg"/>
-          </p:nvPr>
-        </p:nvSpPr>
-        <p:spPr>
-          <a:xfrm>
-            <a:off x="547688" y="612775"/>
-            <a:ext cx="5762625" cy="3241675"/>
-          </a:xfrm>
-        </p:spPr>
-      </p:sp>
-      <p:sp>
-        <p:nvSpPr>
-          <p:cNvPr id="10" name="Notes Placeholder 9"/>
-          <p:cNvSpPr>
-            <a:spLocks noGrp="1"/>
-          </p:cNvSpPr>
-          <p:nvPr>
-            <p:ph type="body" idx="1"/>
-          </p:nvPr>
-        </p:nvSpPr>
-        <p:spPr/>
-        <p:txBody>
-          <a:bodyPr>
-            <a:normAutofit/>
-          </a:bodyPr>
-          <a:lstStyle/>
-          <a:p>
-            <a:endParaRPr lang="en-US"/>
-          </a:p>
-        </p:txBody>
-      </p:sp>
     </p:spTree>
     <p:extLst>
       <p:ext uri="{BB962C8B-B14F-4D97-AF65-F5344CB8AC3E}">
-        <p14:creationId xmlns:p14="http://schemas.microsoft.com/office/powerpoint/2010/main" val="3968705523"/>
+        <p14:creationId xmlns:p14="http://schemas.microsoft.com/office/powerpoint/2010/main" val="1052791939"/>
       </p:ext>
     </p:extLst>
   </p:cSld>
@@ -742,7 +748,7 @@
             <a:fld id="{7D8C2C35-2B8A-446E-BEC0-FD36716C29AC}" type="slidenum">
               <a:rPr lang="de-DE" smtClean="0"/>
               <a:pPr/>
-              <a:t>6</a:t>
+              <a:t>5</a:t>
             </a:fld>
             <a:endParaRPr lang="de-DE" dirty="0"/>
           </a:p>
@@ -789,7 +795,7 @@
     </p:spTree>
     <p:extLst>
       <p:ext uri="{BB962C8B-B14F-4D97-AF65-F5344CB8AC3E}">
-        <p14:creationId xmlns:p14="http://schemas.microsoft.com/office/powerpoint/2010/main" val="3094605481"/>
+        <p14:creationId xmlns:p14="http://schemas.microsoft.com/office/powerpoint/2010/main" val="3968705523"/>
       </p:ext>
     </p:extLst>
   </p:cSld>
@@ -834,7 +840,99 @@
             <a:fld id="{7D8C2C35-2B8A-446E-BEC0-FD36716C29AC}" type="slidenum">
               <a:rPr lang="de-DE" smtClean="0"/>
               <a:pPr/>
-              <a:t>9</a:t>
+              <a:t>7</a:t>
+            </a:fld>
+            <a:endParaRPr lang="de-DE" dirty="0"/>
+          </a:p>
+        </p:txBody>
+      </p:sp>
+      <p:sp>
+        <p:nvSpPr>
+          <p:cNvPr id="9" name="Slide Image Placeholder 8"/>
+          <p:cNvSpPr>
+            <a:spLocks noGrp="1" noRot="1" noChangeAspect="1"/>
+          </p:cNvSpPr>
+          <p:nvPr>
+            <p:ph type="sldImg"/>
+          </p:nvPr>
+        </p:nvSpPr>
+        <p:spPr>
+          <a:xfrm>
+            <a:off x="547688" y="612775"/>
+            <a:ext cx="5762625" cy="3241675"/>
+          </a:xfrm>
+        </p:spPr>
+      </p:sp>
+      <p:sp>
+        <p:nvSpPr>
+          <p:cNvPr id="10" name="Notes Placeholder 9"/>
+          <p:cNvSpPr>
+            <a:spLocks noGrp="1"/>
+          </p:cNvSpPr>
+          <p:nvPr>
+            <p:ph type="body" idx="1"/>
+          </p:nvPr>
+        </p:nvSpPr>
+        <p:spPr/>
+        <p:txBody>
+          <a:bodyPr>
+            <a:normAutofit/>
+          </a:bodyPr>
+          <a:lstStyle/>
+          <a:p>
+            <a:endParaRPr lang="en-US"/>
+          </a:p>
+        </p:txBody>
+      </p:sp>
+    </p:spTree>
+    <p:extLst>
+      <p:ext uri="{BB962C8B-B14F-4D97-AF65-F5344CB8AC3E}">
+        <p14:creationId xmlns:p14="http://schemas.microsoft.com/office/powerpoint/2010/main" val="3094605481"/>
+      </p:ext>
+    </p:extLst>
+  </p:cSld>
+  <p:clrMapOvr>
+    <a:masterClrMapping/>
+  </p:clrMapOvr>
+</p:notes>
+</file>
+
+<file path=ppt/notesSlides/notesSlide5.xml><?xml version="1.0" encoding="utf-8"?>
+<p:notes xmlns:a="http://schemas.openxmlformats.org/drawingml/2006/main" xmlns:r="http://schemas.openxmlformats.org/officeDocument/2006/relationships" xmlns:p="http://schemas.openxmlformats.org/presentationml/2006/main">
+  <p:cSld>
+    <p:spTree>
+      <p:nvGrpSpPr>
+        <p:cNvPr id="1" name=""/>
+        <p:cNvGrpSpPr/>
+        <p:nvPr/>
+      </p:nvGrpSpPr>
+      <p:grpSpPr>
+        <a:xfrm>
+          <a:off x="0" y="0"/>
+          <a:ext cx="0" cy="0"/>
+          <a:chOff x="0" y="0"/>
+          <a:chExt cx="0" cy="0"/>
+        </a:xfrm>
+      </p:grpSpPr>
+      <p:sp>
+        <p:nvSpPr>
+          <p:cNvPr id="4" name="Slide Number Placeholder 3"/>
+          <p:cNvSpPr>
+            <a:spLocks noGrp="1"/>
+          </p:cNvSpPr>
+          <p:nvPr>
+            <p:ph type="sldNum" sz="quarter" idx="10"/>
+          </p:nvPr>
+        </p:nvSpPr>
+        <p:spPr/>
+        <p:txBody>
+          <a:bodyPr/>
+          <a:lstStyle/>
+          <a:p>
+            <a:fld id="{7D8C2C35-2B8A-446E-BEC0-FD36716C29AC}" type="slidenum">
+              <a:rPr lang="de-DE" smtClean="0"/>
+              <a:pPr/>
+              <a:t>10</a:t>
             </a:fld>
             <a:endParaRPr lang="de-DE" dirty="0"/>
           </a:p>
@@ -8465,6 +8563,32 @@
 </p:sld>
 </file>
 
+<file path=ppt/slides/slide10.xml><?xml version="1.0" encoding="utf-8"?>
+<p:sld xmlns:a="http://schemas.openxmlformats.org/drawingml/2006/main" xmlns:r="http://schemas.openxmlformats.org/officeDocument/2006/relationships" xmlns:p="http://schemas.openxmlformats.org/presentationml/2006/main" show="0">
+  <p:cSld>
+    <p:spTree>
+      <p:nvGrpSpPr>
+        <p:cNvPr id="1" name=""/>
+        <p:cNvGrpSpPr/>
+        <p:nvPr/>
+      </p:nvGrpSpPr>
+      <p:grpSpPr>
+        <a:xfrm>
+          <a:off x="0" y="0"/>
+          <a:ext cx="0" cy="0"/>
+          <a:chOff x="0" y="0"/>
+          <a:chExt cx="0" cy="0"/>
+        </a:xfrm>
+      </p:grpSpPr>
+    </p:spTree>
+  </p:cSld>
+  <p:clrMapOvr>
+    <a:masterClrMapping/>
+  </p:clrMapOvr>
+  <p:transition spd="med"/>
+</p:sld>
+</file>
+
 <file path=ppt/slides/slide2.xml><?xml version="1.0" encoding="utf-8"?>
 <p:sld xmlns:a="http://schemas.openxmlformats.org/drawingml/2006/main" xmlns:r="http://schemas.openxmlformats.org/officeDocument/2006/relationships" xmlns:p="http://schemas.openxmlformats.org/presentationml/2006/main">
   <p:cSld>
@@ -9765,6 +9889,1215 @@
       </p:grpSpPr>
       <p:sp>
         <p:nvSpPr>
+          <p:cNvPr id="3" name="Title 2"/>
+          <p:cNvSpPr>
+            <a:spLocks noGrp="1"/>
+          </p:cNvSpPr>
+          <p:nvPr>
+            <p:ph type="title"/>
+          </p:nvPr>
+        </p:nvSpPr>
+        <p:spPr/>
+        <p:txBody>
+          <a:bodyPr/>
+          <a:lstStyle/>
+          <a:p>
+            <a:r>
+              <a:rPr lang="en-US" dirty="0"/>
+              <a:t>Basic structure of most K8s resources</a:t>
+            </a:r>
+          </a:p>
+        </p:txBody>
+      </p:sp>
+      <p:grpSp>
+        <p:nvGrpSpPr>
+          <p:cNvPr id="17" name="Group 16"/>
+          <p:cNvGrpSpPr/>
+          <p:nvPr/>
+        </p:nvGrpSpPr>
+        <p:grpSpPr>
+          <a:xfrm>
+            <a:off x="803295" y="1813069"/>
+            <a:ext cx="5833704" cy="3249281"/>
+            <a:chOff x="3639087" y="2577737"/>
+            <a:chExt cx="4599222" cy="2296676"/>
+          </a:xfrm>
+        </p:grpSpPr>
+        <p:sp>
+          <p:nvSpPr>
+            <p:cNvPr id="6" name="Rectangle 5"/>
+            <p:cNvSpPr/>
+            <p:nvPr/>
+          </p:nvSpPr>
+          <p:spPr bwMode="gray">
+            <a:xfrm>
+              <a:off x="3639087" y="2577737"/>
+              <a:ext cx="4599222" cy="365760"/>
+            </a:xfrm>
+            <a:prstGeom prst="rect">
+              <a:avLst/>
+            </a:prstGeom>
+            <a:ln>
+              <a:headEnd/>
+              <a:tailEnd/>
+            </a:ln>
+          </p:spPr>
+          <p:style>
+            <a:lnRef idx="2">
+              <a:schemeClr val="accent2">
+                <a:shade val="50000"/>
+              </a:schemeClr>
+            </a:lnRef>
+            <a:fillRef idx="1">
+              <a:schemeClr val="accent2"/>
+            </a:fillRef>
+            <a:effectRef idx="0">
+              <a:schemeClr val="accent2"/>
+            </a:effectRef>
+            <a:fontRef idx="minor">
+              <a:schemeClr val="lt1"/>
+            </a:fontRef>
+          </p:style>
+          <p:txBody>
+            <a:bodyPr lIns="90000" tIns="72000" rIns="90000" bIns="72000" rtlCol="0" anchor="ctr"/>
+            <a:lstStyle/>
+            <a:p>
+              <a:pPr marR="0" defTabSz="914400" eaLnBrk="1" fontAlgn="base" latinLnBrk="0" hangingPunct="1">
+                <a:lnSpc>
+                  <a:spcPct val="100000"/>
+                </a:lnSpc>
+                <a:spcBef>
+                  <a:spcPct val="50000"/>
+                </a:spcBef>
+                <a:spcAft>
+                  <a:spcPct val="0"/>
+                </a:spcAft>
+                <a:buClr>
+                  <a:srgbClr val="F0AB00"/>
+                </a:buClr>
+                <a:buSzPct val="80000"/>
+                <a:tabLst/>
+              </a:pPr>
+              <a:r>
+                <a:rPr lang="en-US" sz="1800" b="1" kern="0" noProof="0" dirty="0" err="1">
+                  <a:ea typeface="Arial Unicode MS" pitchFamily="34" charset="-128"/>
+                  <a:cs typeface="Arial Unicode MS" pitchFamily="34" charset="-128"/>
+                </a:rPr>
+                <a:t>apiVersion</a:t>
+              </a:r>
+              <a:endParaRPr kumimoji="0" lang="en-US" sz="1800" b="1" i="0" u="none" strike="noStrike" kern="0" cap="none" spc="0" normalizeH="0" baseline="0" noProof="0" dirty="0">
+                <a:ln>
+                  <a:noFill/>
+                </a:ln>
+                <a:effectLst/>
+                <a:uLnTx/>
+                <a:uFillTx/>
+                <a:ea typeface="Arial Unicode MS" pitchFamily="34" charset="-128"/>
+                <a:cs typeface="Arial Unicode MS" pitchFamily="34" charset="-128"/>
+              </a:endParaRPr>
+            </a:p>
+          </p:txBody>
+        </p:sp>
+        <p:sp>
+          <p:nvSpPr>
+            <p:cNvPr id="7" name="Rectangle 6"/>
+            <p:cNvSpPr/>
+            <p:nvPr/>
+          </p:nvSpPr>
+          <p:spPr bwMode="gray">
+            <a:xfrm>
+              <a:off x="3639087" y="3060466"/>
+              <a:ext cx="4599222" cy="365760"/>
+            </a:xfrm>
+            <a:prstGeom prst="rect">
+              <a:avLst/>
+            </a:prstGeom>
+            <a:ln>
+              <a:headEnd/>
+              <a:tailEnd/>
+            </a:ln>
+          </p:spPr>
+          <p:style>
+            <a:lnRef idx="2">
+              <a:schemeClr val="accent2">
+                <a:shade val="50000"/>
+              </a:schemeClr>
+            </a:lnRef>
+            <a:fillRef idx="1">
+              <a:schemeClr val="accent2"/>
+            </a:fillRef>
+            <a:effectRef idx="0">
+              <a:schemeClr val="accent2"/>
+            </a:effectRef>
+            <a:fontRef idx="minor">
+              <a:schemeClr val="lt1"/>
+            </a:fontRef>
+          </p:style>
+          <p:txBody>
+            <a:bodyPr lIns="90000" tIns="72000" rIns="90000" bIns="72000" rtlCol="0" anchor="ctr"/>
+            <a:lstStyle/>
+            <a:p>
+              <a:pPr marR="0" defTabSz="914400" eaLnBrk="1" fontAlgn="base" latinLnBrk="0" hangingPunct="1">
+                <a:lnSpc>
+                  <a:spcPct val="100000"/>
+                </a:lnSpc>
+                <a:spcBef>
+                  <a:spcPct val="50000"/>
+                </a:spcBef>
+                <a:spcAft>
+                  <a:spcPct val="0"/>
+                </a:spcAft>
+                <a:buClr>
+                  <a:srgbClr val="F0AB00"/>
+                </a:buClr>
+                <a:buSzPct val="80000"/>
+                <a:tabLst/>
+              </a:pPr>
+              <a:r>
+                <a:rPr lang="en-US" sz="1800" b="1" kern="0" dirty="0">
+                  <a:ea typeface="Arial Unicode MS" pitchFamily="34" charset="-128"/>
+                  <a:cs typeface="Arial Unicode MS" pitchFamily="34" charset="-128"/>
+                </a:rPr>
+                <a:t>kind</a:t>
+              </a:r>
+              <a:endParaRPr kumimoji="0" lang="en-US" sz="1800" b="1" i="0" u="none" strike="noStrike" kern="0" cap="none" spc="0" normalizeH="0" baseline="0" noProof="0" dirty="0" err="1">
+                <a:ln>
+                  <a:noFill/>
+                </a:ln>
+                <a:effectLst/>
+                <a:uLnTx/>
+                <a:uFillTx/>
+                <a:ea typeface="Arial Unicode MS" pitchFamily="34" charset="-128"/>
+                <a:cs typeface="Arial Unicode MS" pitchFamily="34" charset="-128"/>
+              </a:endParaRPr>
+            </a:p>
+          </p:txBody>
+        </p:sp>
+        <p:sp>
+          <p:nvSpPr>
+            <p:cNvPr id="8" name="Rectangle 7"/>
+            <p:cNvSpPr/>
+            <p:nvPr/>
+          </p:nvSpPr>
+          <p:spPr bwMode="gray">
+            <a:xfrm>
+              <a:off x="3639087" y="3543195"/>
+              <a:ext cx="4599222" cy="365760"/>
+            </a:xfrm>
+            <a:prstGeom prst="rect">
+              <a:avLst/>
+            </a:prstGeom>
+            <a:ln>
+              <a:headEnd/>
+              <a:tailEnd/>
+            </a:ln>
+          </p:spPr>
+          <p:style>
+            <a:lnRef idx="2">
+              <a:schemeClr val="accent2">
+                <a:shade val="50000"/>
+              </a:schemeClr>
+            </a:lnRef>
+            <a:fillRef idx="1">
+              <a:schemeClr val="accent2"/>
+            </a:fillRef>
+            <a:effectRef idx="0">
+              <a:schemeClr val="accent2"/>
+            </a:effectRef>
+            <a:fontRef idx="minor">
+              <a:schemeClr val="lt1"/>
+            </a:fontRef>
+          </p:style>
+          <p:txBody>
+            <a:bodyPr lIns="90000" tIns="72000" rIns="90000" bIns="72000" rtlCol="0" anchor="ctr"/>
+            <a:lstStyle/>
+            <a:p>
+              <a:pPr marR="0" defTabSz="914400" eaLnBrk="1" fontAlgn="base" latinLnBrk="0" hangingPunct="1">
+                <a:lnSpc>
+                  <a:spcPct val="100000"/>
+                </a:lnSpc>
+                <a:spcBef>
+                  <a:spcPct val="50000"/>
+                </a:spcBef>
+                <a:spcAft>
+                  <a:spcPct val="0"/>
+                </a:spcAft>
+                <a:buClr>
+                  <a:srgbClr val="F0AB00"/>
+                </a:buClr>
+                <a:buSzPct val="80000"/>
+                <a:tabLst/>
+              </a:pPr>
+              <a:r>
+                <a:rPr lang="en-US" sz="1800" b="1" kern="0" dirty="0">
+                  <a:ea typeface="Arial Unicode MS" pitchFamily="34" charset="-128"/>
+                  <a:cs typeface="Arial Unicode MS" pitchFamily="34" charset="-128"/>
+                </a:rPr>
+                <a:t>metadata</a:t>
+              </a:r>
+              <a:endParaRPr kumimoji="0" lang="en-US" sz="1800" b="1" i="0" u="none" strike="noStrike" kern="0" cap="none" spc="0" normalizeH="0" baseline="0" noProof="0" dirty="0" err="1">
+                <a:ln>
+                  <a:noFill/>
+                </a:ln>
+                <a:effectLst/>
+                <a:uLnTx/>
+                <a:uFillTx/>
+                <a:ea typeface="Arial Unicode MS" pitchFamily="34" charset="-128"/>
+                <a:cs typeface="Arial Unicode MS" pitchFamily="34" charset="-128"/>
+              </a:endParaRPr>
+            </a:p>
+          </p:txBody>
+        </p:sp>
+        <p:sp>
+          <p:nvSpPr>
+            <p:cNvPr id="9" name="Rectangle 8"/>
+            <p:cNvSpPr/>
+            <p:nvPr/>
+          </p:nvSpPr>
+          <p:spPr bwMode="gray">
+            <a:xfrm>
+              <a:off x="3639087" y="4025924"/>
+              <a:ext cx="4599222" cy="365760"/>
+            </a:xfrm>
+            <a:prstGeom prst="rect">
+              <a:avLst/>
+            </a:prstGeom>
+            <a:ln>
+              <a:headEnd/>
+              <a:tailEnd/>
+            </a:ln>
+          </p:spPr>
+          <p:style>
+            <a:lnRef idx="2">
+              <a:schemeClr val="accent2">
+                <a:shade val="50000"/>
+              </a:schemeClr>
+            </a:lnRef>
+            <a:fillRef idx="1">
+              <a:schemeClr val="accent2"/>
+            </a:fillRef>
+            <a:effectRef idx="0">
+              <a:schemeClr val="accent2"/>
+            </a:effectRef>
+            <a:fontRef idx="minor">
+              <a:schemeClr val="lt1"/>
+            </a:fontRef>
+          </p:style>
+          <p:txBody>
+            <a:bodyPr lIns="90000" tIns="72000" rIns="90000" bIns="72000" rtlCol="0" anchor="ctr"/>
+            <a:lstStyle/>
+            <a:p>
+              <a:pPr marR="0" defTabSz="914400" eaLnBrk="1" fontAlgn="base" latinLnBrk="0" hangingPunct="1">
+                <a:lnSpc>
+                  <a:spcPct val="100000"/>
+                </a:lnSpc>
+                <a:spcBef>
+                  <a:spcPct val="50000"/>
+                </a:spcBef>
+                <a:spcAft>
+                  <a:spcPct val="0"/>
+                </a:spcAft>
+                <a:buClr>
+                  <a:srgbClr val="F0AB00"/>
+                </a:buClr>
+                <a:buSzPct val="80000"/>
+                <a:tabLst/>
+              </a:pPr>
+              <a:r>
+                <a:rPr lang="en-US" sz="1800" b="1" kern="0" dirty="0">
+                  <a:ea typeface="Arial Unicode MS" pitchFamily="34" charset="-128"/>
+                  <a:cs typeface="Arial Unicode MS" pitchFamily="34" charset="-128"/>
+                </a:rPr>
+                <a:t>spec</a:t>
+              </a:r>
+              <a:endParaRPr kumimoji="0" lang="en-US" sz="1800" b="1" i="0" u="none" strike="noStrike" kern="0" cap="none" spc="0" normalizeH="0" baseline="0" noProof="0" dirty="0" err="1">
+                <a:ln>
+                  <a:noFill/>
+                </a:ln>
+                <a:effectLst/>
+                <a:uLnTx/>
+                <a:uFillTx/>
+                <a:ea typeface="Arial Unicode MS" pitchFamily="34" charset="-128"/>
+                <a:cs typeface="Arial Unicode MS" pitchFamily="34" charset="-128"/>
+              </a:endParaRPr>
+            </a:p>
+          </p:txBody>
+        </p:sp>
+        <p:sp>
+          <p:nvSpPr>
+            <p:cNvPr id="10" name="Rectangle 9"/>
+            <p:cNvSpPr/>
+            <p:nvPr/>
+          </p:nvSpPr>
+          <p:spPr bwMode="gray">
+            <a:xfrm>
+              <a:off x="3639087" y="4508653"/>
+              <a:ext cx="4599222" cy="365760"/>
+            </a:xfrm>
+            <a:prstGeom prst="rect">
+              <a:avLst/>
+            </a:prstGeom>
+            <a:ln>
+              <a:headEnd/>
+              <a:tailEnd/>
+            </a:ln>
+          </p:spPr>
+          <p:style>
+            <a:lnRef idx="2">
+              <a:schemeClr val="accent2">
+                <a:shade val="50000"/>
+              </a:schemeClr>
+            </a:lnRef>
+            <a:fillRef idx="1">
+              <a:schemeClr val="accent2"/>
+            </a:fillRef>
+            <a:effectRef idx="0">
+              <a:schemeClr val="accent2"/>
+            </a:effectRef>
+            <a:fontRef idx="minor">
+              <a:schemeClr val="lt1"/>
+            </a:fontRef>
+          </p:style>
+          <p:txBody>
+            <a:bodyPr lIns="90000" tIns="72000" rIns="90000" bIns="72000" rtlCol="0" anchor="ctr"/>
+            <a:lstStyle/>
+            <a:p>
+              <a:pPr marR="0" defTabSz="914400" eaLnBrk="1" fontAlgn="base" latinLnBrk="0" hangingPunct="1">
+                <a:lnSpc>
+                  <a:spcPct val="100000"/>
+                </a:lnSpc>
+                <a:spcBef>
+                  <a:spcPct val="50000"/>
+                </a:spcBef>
+                <a:spcAft>
+                  <a:spcPct val="0"/>
+                </a:spcAft>
+                <a:buClr>
+                  <a:srgbClr val="F0AB00"/>
+                </a:buClr>
+                <a:buSzPct val="80000"/>
+                <a:tabLst/>
+              </a:pPr>
+              <a:r>
+                <a:rPr lang="en-US" sz="1800" b="1" kern="0" dirty="0">
+                  <a:ea typeface="Arial Unicode MS" pitchFamily="34" charset="-128"/>
+                  <a:cs typeface="Arial Unicode MS" pitchFamily="34" charset="-128"/>
+                </a:rPr>
+                <a:t>status</a:t>
+              </a:r>
+              <a:endParaRPr kumimoji="0" lang="en-US" sz="1800" b="1" i="0" u="none" strike="noStrike" kern="0" cap="none" spc="0" normalizeH="0" baseline="0" noProof="0" dirty="0" err="1">
+                <a:ln>
+                  <a:noFill/>
+                </a:ln>
+                <a:effectLst/>
+                <a:uLnTx/>
+                <a:uFillTx/>
+                <a:ea typeface="Arial Unicode MS" pitchFamily="34" charset="-128"/>
+                <a:cs typeface="Arial Unicode MS" pitchFamily="34" charset="-128"/>
+              </a:endParaRPr>
+            </a:p>
+          </p:txBody>
+        </p:sp>
+        <p:sp>
+          <p:nvSpPr>
+            <p:cNvPr id="11" name="Rectangle 10"/>
+            <p:cNvSpPr/>
+            <p:nvPr/>
+          </p:nvSpPr>
+          <p:spPr bwMode="gray">
+            <a:xfrm>
+              <a:off x="5576745" y="3554081"/>
+              <a:ext cx="1921336" cy="343988"/>
+            </a:xfrm>
+            <a:prstGeom prst="rect">
+              <a:avLst/>
+            </a:prstGeom>
+            <a:solidFill>
+              <a:schemeClr val="accent1"/>
+            </a:solidFill>
+            <a:ln>
+              <a:headEnd/>
+              <a:tailEnd/>
+            </a:ln>
+          </p:spPr>
+          <p:style>
+            <a:lnRef idx="2">
+              <a:schemeClr val="accent2">
+                <a:shade val="50000"/>
+              </a:schemeClr>
+            </a:lnRef>
+            <a:fillRef idx="1">
+              <a:schemeClr val="accent2"/>
+            </a:fillRef>
+            <a:effectRef idx="0">
+              <a:schemeClr val="accent2"/>
+            </a:effectRef>
+            <a:fontRef idx="minor">
+              <a:schemeClr val="lt1"/>
+            </a:fontRef>
+          </p:style>
+          <p:txBody>
+            <a:bodyPr lIns="90000" tIns="72000" rIns="90000" bIns="72000" rtlCol="0" anchor="ctr"/>
+            <a:lstStyle/>
+            <a:p>
+              <a:pPr marR="0" algn="ctr" defTabSz="914400" eaLnBrk="1" fontAlgn="base" latinLnBrk="0" hangingPunct="1">
+                <a:lnSpc>
+                  <a:spcPct val="100000"/>
+                </a:lnSpc>
+                <a:spcBef>
+                  <a:spcPct val="50000"/>
+                </a:spcBef>
+                <a:spcAft>
+                  <a:spcPct val="0"/>
+                </a:spcAft>
+                <a:buClr>
+                  <a:srgbClr val="F0AB00"/>
+                </a:buClr>
+                <a:buSzPct val="80000"/>
+                <a:tabLst/>
+              </a:pPr>
+              <a:r>
+                <a:rPr lang="en-US" sz="1800" b="1" kern="0" dirty="0">
+                  <a:ea typeface="Arial Unicode MS" pitchFamily="34" charset="-128"/>
+                  <a:cs typeface="Arial Unicode MS" pitchFamily="34" charset="-128"/>
+                </a:rPr>
+                <a:t>metadata object</a:t>
+              </a:r>
+              <a:endParaRPr kumimoji="0" lang="en-US" sz="1800" b="1" i="0" u="none" strike="noStrike" kern="0" cap="none" spc="0" normalizeH="0" baseline="0" noProof="0" dirty="0" err="1">
+                <a:ln>
+                  <a:noFill/>
+                </a:ln>
+                <a:effectLst/>
+                <a:uLnTx/>
+                <a:uFillTx/>
+                <a:ea typeface="Arial Unicode MS" pitchFamily="34" charset="-128"/>
+                <a:cs typeface="Arial Unicode MS" pitchFamily="34" charset="-128"/>
+              </a:endParaRPr>
+            </a:p>
+          </p:txBody>
+        </p:sp>
+        <p:sp>
+          <p:nvSpPr>
+            <p:cNvPr id="12" name="Rectangle 11"/>
+            <p:cNvSpPr/>
+            <p:nvPr/>
+          </p:nvSpPr>
+          <p:spPr bwMode="gray">
+            <a:xfrm>
+              <a:off x="5576745" y="4036810"/>
+              <a:ext cx="1921336" cy="343988"/>
+            </a:xfrm>
+            <a:prstGeom prst="rect">
+              <a:avLst/>
+            </a:prstGeom>
+            <a:solidFill>
+              <a:schemeClr val="accent1"/>
+            </a:solidFill>
+            <a:ln>
+              <a:headEnd/>
+              <a:tailEnd/>
+            </a:ln>
+          </p:spPr>
+          <p:style>
+            <a:lnRef idx="2">
+              <a:schemeClr val="accent2">
+                <a:shade val="50000"/>
+              </a:schemeClr>
+            </a:lnRef>
+            <a:fillRef idx="1">
+              <a:schemeClr val="accent2"/>
+            </a:fillRef>
+            <a:effectRef idx="0">
+              <a:schemeClr val="accent2"/>
+            </a:effectRef>
+            <a:fontRef idx="minor">
+              <a:schemeClr val="lt1"/>
+            </a:fontRef>
+          </p:style>
+          <p:txBody>
+            <a:bodyPr lIns="90000" tIns="72000" rIns="90000" bIns="72000" rtlCol="0" anchor="ctr"/>
+            <a:lstStyle/>
+            <a:p>
+              <a:pPr marR="0" algn="ctr" defTabSz="914400" eaLnBrk="1" fontAlgn="base" latinLnBrk="0" hangingPunct="1">
+                <a:lnSpc>
+                  <a:spcPct val="100000"/>
+                </a:lnSpc>
+                <a:spcBef>
+                  <a:spcPct val="50000"/>
+                </a:spcBef>
+                <a:spcAft>
+                  <a:spcPct val="0"/>
+                </a:spcAft>
+                <a:buClr>
+                  <a:srgbClr val="F0AB00"/>
+                </a:buClr>
+                <a:buSzPct val="80000"/>
+                <a:tabLst/>
+              </a:pPr>
+              <a:r>
+                <a:rPr lang="en-US" sz="1800" b="1" kern="0" dirty="0">
+                  <a:ea typeface="Arial Unicode MS" pitchFamily="34" charset="-128"/>
+                  <a:cs typeface="Arial Unicode MS" pitchFamily="34" charset="-128"/>
+                </a:rPr>
+                <a:t>spec object</a:t>
+              </a:r>
+              <a:endParaRPr kumimoji="0" lang="en-US" sz="1800" b="1" i="0" u="none" strike="noStrike" kern="0" cap="none" spc="0" normalizeH="0" baseline="0" noProof="0" dirty="0" err="1">
+                <a:ln>
+                  <a:noFill/>
+                </a:ln>
+                <a:effectLst/>
+                <a:uLnTx/>
+                <a:uFillTx/>
+                <a:ea typeface="Arial Unicode MS" pitchFamily="34" charset="-128"/>
+                <a:cs typeface="Arial Unicode MS" pitchFamily="34" charset="-128"/>
+              </a:endParaRPr>
+            </a:p>
+          </p:txBody>
+        </p:sp>
+        <p:sp>
+          <p:nvSpPr>
+            <p:cNvPr id="13" name="Rectangle 12"/>
+            <p:cNvSpPr/>
+            <p:nvPr/>
+          </p:nvSpPr>
+          <p:spPr bwMode="gray">
+            <a:xfrm>
+              <a:off x="5576745" y="4517748"/>
+              <a:ext cx="1921336" cy="343988"/>
+            </a:xfrm>
+            <a:prstGeom prst="rect">
+              <a:avLst/>
+            </a:prstGeom>
+            <a:solidFill>
+              <a:schemeClr val="accent1"/>
+            </a:solidFill>
+            <a:ln>
+              <a:headEnd/>
+              <a:tailEnd/>
+            </a:ln>
+          </p:spPr>
+          <p:style>
+            <a:lnRef idx="2">
+              <a:schemeClr val="accent2">
+                <a:shade val="50000"/>
+              </a:schemeClr>
+            </a:lnRef>
+            <a:fillRef idx="1">
+              <a:schemeClr val="accent2"/>
+            </a:fillRef>
+            <a:effectRef idx="0">
+              <a:schemeClr val="accent2"/>
+            </a:effectRef>
+            <a:fontRef idx="minor">
+              <a:schemeClr val="lt1"/>
+            </a:fontRef>
+          </p:style>
+          <p:txBody>
+            <a:bodyPr lIns="90000" tIns="72000" rIns="90000" bIns="72000" rtlCol="0" anchor="ctr"/>
+            <a:lstStyle/>
+            <a:p>
+              <a:pPr marR="0" algn="ctr" defTabSz="914400" eaLnBrk="1" fontAlgn="base" latinLnBrk="0" hangingPunct="1">
+                <a:lnSpc>
+                  <a:spcPct val="100000"/>
+                </a:lnSpc>
+                <a:spcBef>
+                  <a:spcPct val="50000"/>
+                </a:spcBef>
+                <a:spcAft>
+                  <a:spcPct val="0"/>
+                </a:spcAft>
+                <a:buClr>
+                  <a:srgbClr val="F0AB00"/>
+                </a:buClr>
+                <a:buSzPct val="80000"/>
+                <a:tabLst/>
+              </a:pPr>
+              <a:r>
+                <a:rPr lang="en-US" sz="1800" b="1" kern="0" dirty="0">
+                  <a:ea typeface="Arial Unicode MS" pitchFamily="34" charset="-128"/>
+                  <a:cs typeface="Arial Unicode MS" pitchFamily="34" charset="-128"/>
+                </a:rPr>
+                <a:t>status object</a:t>
+              </a:r>
+              <a:endParaRPr kumimoji="0" lang="en-US" sz="1800" b="1" i="0" u="none" strike="noStrike" kern="0" cap="none" spc="0" normalizeH="0" baseline="0" noProof="0" dirty="0" err="1">
+                <a:ln>
+                  <a:noFill/>
+                </a:ln>
+                <a:effectLst/>
+                <a:uLnTx/>
+                <a:uFillTx/>
+                <a:ea typeface="Arial Unicode MS" pitchFamily="34" charset="-128"/>
+                <a:cs typeface="Arial Unicode MS" pitchFamily="34" charset="-128"/>
+              </a:endParaRPr>
+            </a:p>
+          </p:txBody>
+        </p:sp>
+        <p:sp>
+          <p:nvSpPr>
+            <p:cNvPr id="14" name="Rectangle 13"/>
+            <p:cNvSpPr/>
+            <p:nvPr/>
+          </p:nvSpPr>
+          <p:spPr bwMode="gray">
+            <a:xfrm>
+              <a:off x="5576745" y="2588623"/>
+              <a:ext cx="1921336" cy="343988"/>
+            </a:xfrm>
+            <a:prstGeom prst="rect">
+              <a:avLst/>
+            </a:prstGeom>
+            <a:ln>
+              <a:headEnd/>
+              <a:tailEnd/>
+            </a:ln>
+          </p:spPr>
+          <p:style>
+            <a:lnRef idx="2">
+              <a:schemeClr val="accent1"/>
+            </a:lnRef>
+            <a:fillRef idx="1">
+              <a:schemeClr val="lt1"/>
+            </a:fillRef>
+            <a:effectRef idx="0">
+              <a:schemeClr val="accent1"/>
+            </a:effectRef>
+            <a:fontRef idx="minor">
+              <a:schemeClr val="dk1"/>
+            </a:fontRef>
+          </p:style>
+          <p:txBody>
+            <a:bodyPr lIns="90000" tIns="72000" rIns="90000" bIns="72000" rtlCol="0" anchor="ctr"/>
+            <a:lstStyle/>
+            <a:p>
+              <a:pPr marR="0" algn="ctr" defTabSz="914400" eaLnBrk="1" fontAlgn="base" latinLnBrk="0" hangingPunct="1">
+                <a:lnSpc>
+                  <a:spcPct val="100000"/>
+                </a:lnSpc>
+                <a:spcBef>
+                  <a:spcPct val="50000"/>
+                </a:spcBef>
+                <a:spcAft>
+                  <a:spcPct val="0"/>
+                </a:spcAft>
+                <a:buClr>
+                  <a:srgbClr val="F0AB00"/>
+                </a:buClr>
+                <a:buSzPct val="80000"/>
+                <a:tabLst/>
+              </a:pPr>
+              <a:r>
+                <a:rPr lang="en-US" sz="1800" b="1" kern="0" dirty="0">
+                  <a:ea typeface="Arial Unicode MS" pitchFamily="34" charset="-128"/>
+                  <a:cs typeface="Arial Unicode MS" pitchFamily="34" charset="-128"/>
+                </a:rPr>
+                <a:t>value</a:t>
+              </a:r>
+              <a:endParaRPr kumimoji="0" lang="en-US" sz="1800" b="1" i="0" u="none" strike="noStrike" kern="0" cap="none" spc="0" normalizeH="0" baseline="0" noProof="0" dirty="0" err="1">
+                <a:ln>
+                  <a:noFill/>
+                </a:ln>
+                <a:effectLst/>
+                <a:uLnTx/>
+                <a:uFillTx/>
+                <a:ea typeface="Arial Unicode MS" pitchFamily="34" charset="-128"/>
+                <a:cs typeface="Arial Unicode MS" pitchFamily="34" charset="-128"/>
+              </a:endParaRPr>
+            </a:p>
+          </p:txBody>
+        </p:sp>
+        <p:sp>
+          <p:nvSpPr>
+            <p:cNvPr id="15" name="Rectangle 14"/>
+            <p:cNvSpPr/>
+            <p:nvPr/>
+          </p:nvSpPr>
+          <p:spPr bwMode="gray">
+            <a:xfrm>
+              <a:off x="5576745" y="3071352"/>
+              <a:ext cx="1921336" cy="343988"/>
+            </a:xfrm>
+            <a:prstGeom prst="rect">
+              <a:avLst/>
+            </a:prstGeom>
+            <a:ln>
+              <a:headEnd/>
+              <a:tailEnd/>
+            </a:ln>
+          </p:spPr>
+          <p:style>
+            <a:lnRef idx="2">
+              <a:schemeClr val="accent1"/>
+            </a:lnRef>
+            <a:fillRef idx="1">
+              <a:schemeClr val="lt1"/>
+            </a:fillRef>
+            <a:effectRef idx="0">
+              <a:schemeClr val="accent1"/>
+            </a:effectRef>
+            <a:fontRef idx="minor">
+              <a:schemeClr val="dk1"/>
+            </a:fontRef>
+          </p:style>
+          <p:txBody>
+            <a:bodyPr lIns="90000" tIns="72000" rIns="90000" bIns="72000" rtlCol="0" anchor="ctr"/>
+            <a:lstStyle/>
+            <a:p>
+              <a:pPr marR="0" algn="ctr" defTabSz="914400" eaLnBrk="1" fontAlgn="base" latinLnBrk="0" hangingPunct="1">
+                <a:lnSpc>
+                  <a:spcPct val="100000"/>
+                </a:lnSpc>
+                <a:spcBef>
+                  <a:spcPct val="50000"/>
+                </a:spcBef>
+                <a:spcAft>
+                  <a:spcPct val="0"/>
+                </a:spcAft>
+                <a:buClr>
+                  <a:srgbClr val="F0AB00"/>
+                </a:buClr>
+                <a:buSzPct val="80000"/>
+                <a:tabLst/>
+              </a:pPr>
+              <a:r>
+                <a:rPr lang="en-US" sz="1800" b="1" kern="0" dirty="0">
+                  <a:ea typeface="Arial Unicode MS" pitchFamily="34" charset="-128"/>
+                  <a:cs typeface="Arial Unicode MS" pitchFamily="34" charset="-128"/>
+                </a:rPr>
+                <a:t>value</a:t>
+              </a:r>
+              <a:endParaRPr kumimoji="0" lang="en-US" sz="1800" b="1" i="0" u="none" strike="noStrike" kern="0" cap="none" spc="0" normalizeH="0" baseline="0" noProof="0" dirty="0" err="1">
+                <a:ln>
+                  <a:noFill/>
+                </a:ln>
+                <a:effectLst/>
+                <a:uLnTx/>
+                <a:uFillTx/>
+                <a:ea typeface="Arial Unicode MS" pitchFamily="34" charset="-128"/>
+                <a:cs typeface="Arial Unicode MS" pitchFamily="34" charset="-128"/>
+              </a:endParaRPr>
+            </a:p>
+          </p:txBody>
+        </p:sp>
+      </p:grpSp>
+      <p:sp>
+        <p:nvSpPr>
+          <p:cNvPr id="18" name="Speech Bubble: Rectangle 17"/>
+          <p:cNvSpPr/>
+          <p:nvPr/>
+        </p:nvSpPr>
+        <p:spPr bwMode="gray">
+          <a:xfrm>
+            <a:off x="6636999" y="5497800"/>
+            <a:ext cx="4101737" cy="624325"/>
+          </a:xfrm>
+          <a:prstGeom prst="wedgeRectCallout">
+            <a:avLst>
+              <a:gd name="adj1" fmla="val -67542"/>
+              <a:gd name="adj2" fmla="val -171236"/>
+            </a:avLst>
+          </a:prstGeom>
+          <a:ln>
+            <a:headEnd/>
+            <a:tailEnd/>
+          </a:ln>
+        </p:spPr>
+        <p:style>
+          <a:lnRef idx="2">
+            <a:schemeClr val="accent5"/>
+          </a:lnRef>
+          <a:fillRef idx="1">
+            <a:schemeClr val="lt1"/>
+          </a:fillRef>
+          <a:effectRef idx="0">
+            <a:schemeClr val="accent5"/>
+          </a:effectRef>
+          <a:fontRef idx="minor">
+            <a:schemeClr val="dk1"/>
+          </a:fontRef>
+        </p:style>
+        <p:txBody>
+          <a:bodyPr lIns="90000" tIns="72000" rIns="90000" bIns="72000" rtlCol="0" anchor="ctr"/>
+          <a:lstStyle/>
+          <a:p>
+            <a:pPr marR="0" algn="ctr" defTabSz="914400" eaLnBrk="1" fontAlgn="base" latinLnBrk="0" hangingPunct="1">
+              <a:lnSpc>
+                <a:spcPct val="100000"/>
+              </a:lnSpc>
+              <a:spcBef>
+                <a:spcPct val="50000"/>
+              </a:spcBef>
+              <a:spcAft>
+                <a:spcPct val="0"/>
+              </a:spcAft>
+              <a:buClr>
+                <a:srgbClr val="F0AB00"/>
+              </a:buClr>
+              <a:buSzPct val="80000"/>
+              <a:tabLst/>
+            </a:pPr>
+            <a:r>
+              <a:rPr lang="en-US" sz="1800" kern="0" dirty="0">
+                <a:ea typeface="Arial Unicode MS" pitchFamily="34" charset="-128"/>
+                <a:cs typeface="Arial Unicode MS" pitchFamily="34" charset="-128"/>
+              </a:rPr>
+              <a:t>Information supplied by k8s, not maintained by users</a:t>
+            </a:r>
+            <a:endParaRPr kumimoji="0" lang="en-US" sz="1800" b="0" i="0" u="none" strike="noStrike" kern="0" cap="none" spc="0" normalizeH="0" baseline="0" noProof="0" dirty="0" err="1">
+              <a:ln>
+                <a:noFill/>
+              </a:ln>
+              <a:effectLst/>
+              <a:uLnTx/>
+              <a:uFillTx/>
+              <a:ea typeface="Arial Unicode MS" pitchFamily="34" charset="-128"/>
+              <a:cs typeface="Arial Unicode MS" pitchFamily="34" charset="-128"/>
+            </a:endParaRPr>
+          </a:p>
+        </p:txBody>
+      </p:sp>
+      <p:sp>
+        <p:nvSpPr>
+          <p:cNvPr id="19" name="Speech Bubble: Rectangle 18"/>
+          <p:cNvSpPr/>
+          <p:nvPr/>
+        </p:nvSpPr>
+        <p:spPr bwMode="gray">
+          <a:xfrm>
+            <a:off x="7014755" y="873332"/>
+            <a:ext cx="4101737" cy="624325"/>
+          </a:xfrm>
+          <a:prstGeom prst="wedgeRectCallout">
+            <a:avLst>
+              <a:gd name="adj1" fmla="val -78795"/>
+              <a:gd name="adj2" fmla="val 137032"/>
+            </a:avLst>
+          </a:prstGeom>
+          <a:ln>
+            <a:headEnd/>
+            <a:tailEnd/>
+          </a:ln>
+        </p:spPr>
+        <p:style>
+          <a:lnRef idx="2">
+            <a:schemeClr val="accent5"/>
+          </a:lnRef>
+          <a:fillRef idx="1">
+            <a:schemeClr val="lt1"/>
+          </a:fillRef>
+          <a:effectRef idx="0">
+            <a:schemeClr val="accent5"/>
+          </a:effectRef>
+          <a:fontRef idx="minor">
+            <a:schemeClr val="dk1"/>
+          </a:fontRef>
+        </p:style>
+        <p:txBody>
+          <a:bodyPr lIns="90000" tIns="72000" rIns="90000" bIns="72000" rtlCol="0" anchor="ctr"/>
+          <a:lstStyle/>
+          <a:p>
+            <a:pPr marR="0" algn="ctr" defTabSz="914400" eaLnBrk="1" fontAlgn="base" latinLnBrk="0" hangingPunct="1">
+              <a:lnSpc>
+                <a:spcPct val="100000"/>
+              </a:lnSpc>
+              <a:spcBef>
+                <a:spcPct val="50000"/>
+              </a:spcBef>
+              <a:spcAft>
+                <a:spcPct val="0"/>
+              </a:spcAft>
+              <a:buClr>
+                <a:srgbClr val="F0AB00"/>
+              </a:buClr>
+              <a:buSzPct val="80000"/>
+              <a:tabLst/>
+            </a:pPr>
+            <a:r>
+              <a:rPr lang="en-US" sz="1800" kern="0" noProof="0" dirty="0" err="1">
+                <a:ea typeface="Arial Unicode MS" pitchFamily="34" charset="-128"/>
+                <a:cs typeface="Arial Unicode MS" pitchFamily="34" charset="-128"/>
+              </a:rPr>
+              <a:t>api</a:t>
+            </a:r>
+            <a:r>
+              <a:rPr lang="en-US" sz="1800" kern="0" noProof="0" dirty="0">
+                <a:ea typeface="Arial Unicode MS" pitchFamily="34" charset="-128"/>
+                <a:cs typeface="Arial Unicode MS" pitchFamily="34" charset="-128"/>
+              </a:rPr>
+              <a:t> the resource belongs to, e.g. “v1”</a:t>
+            </a:r>
+            <a:endParaRPr kumimoji="0" lang="en-US" sz="1800" b="0" i="0" u="none" strike="noStrike" kern="0" cap="none" spc="0" normalizeH="0" baseline="0" noProof="0" dirty="0">
+              <a:ln>
+                <a:noFill/>
+              </a:ln>
+              <a:effectLst/>
+              <a:uLnTx/>
+              <a:uFillTx/>
+              <a:ea typeface="Arial Unicode MS" pitchFamily="34" charset="-128"/>
+              <a:cs typeface="Arial Unicode MS" pitchFamily="34" charset="-128"/>
+            </a:endParaRPr>
+          </a:p>
+        </p:txBody>
+      </p:sp>
+      <p:sp>
+        <p:nvSpPr>
+          <p:cNvPr id="20" name="Speech Bubble: Rectangle 19"/>
+          <p:cNvSpPr/>
+          <p:nvPr/>
+        </p:nvSpPr>
+        <p:spPr bwMode="gray">
+          <a:xfrm>
+            <a:off x="7588740" y="2061185"/>
+            <a:ext cx="4101737" cy="624325"/>
+          </a:xfrm>
+          <a:prstGeom prst="wedgeRectCallout">
+            <a:avLst>
+              <a:gd name="adj1" fmla="val -82617"/>
+              <a:gd name="adj2" fmla="val 51945"/>
+            </a:avLst>
+          </a:prstGeom>
+          <a:ln>
+            <a:headEnd/>
+            <a:tailEnd/>
+          </a:ln>
+        </p:spPr>
+        <p:style>
+          <a:lnRef idx="2">
+            <a:schemeClr val="accent5"/>
+          </a:lnRef>
+          <a:fillRef idx="1">
+            <a:schemeClr val="lt1"/>
+          </a:fillRef>
+          <a:effectRef idx="0">
+            <a:schemeClr val="accent5"/>
+          </a:effectRef>
+          <a:fontRef idx="minor">
+            <a:schemeClr val="dk1"/>
+          </a:fontRef>
+        </p:style>
+        <p:txBody>
+          <a:bodyPr lIns="90000" tIns="72000" rIns="90000" bIns="72000" rtlCol="0" anchor="ctr"/>
+          <a:lstStyle/>
+          <a:p>
+            <a:pPr marR="0" algn="ctr" defTabSz="914400" eaLnBrk="1" fontAlgn="base" latinLnBrk="0" hangingPunct="1">
+              <a:lnSpc>
+                <a:spcPct val="100000"/>
+              </a:lnSpc>
+              <a:spcBef>
+                <a:spcPct val="50000"/>
+              </a:spcBef>
+              <a:spcAft>
+                <a:spcPct val="0"/>
+              </a:spcAft>
+              <a:buClr>
+                <a:srgbClr val="F0AB00"/>
+              </a:buClr>
+              <a:buSzPct val="80000"/>
+              <a:tabLst/>
+            </a:pPr>
+            <a:r>
+              <a:rPr lang="en-US" sz="1800" kern="0" noProof="0" dirty="0">
+                <a:ea typeface="Arial Unicode MS" pitchFamily="34" charset="-128"/>
+                <a:cs typeface="Arial Unicode MS" pitchFamily="34" charset="-128"/>
+              </a:rPr>
+              <a:t>resource type, e.g. “pod”</a:t>
+            </a:r>
+            <a:endParaRPr kumimoji="0" lang="en-US" sz="1800" b="0" i="0" u="none" strike="noStrike" kern="0" cap="none" spc="0" normalizeH="0" baseline="0" noProof="0" dirty="0">
+              <a:ln>
+                <a:noFill/>
+              </a:ln>
+              <a:effectLst/>
+              <a:uLnTx/>
+              <a:uFillTx/>
+              <a:ea typeface="Arial Unicode MS" pitchFamily="34" charset="-128"/>
+              <a:cs typeface="Arial Unicode MS" pitchFamily="34" charset="-128"/>
+            </a:endParaRPr>
+          </a:p>
+        </p:txBody>
+      </p:sp>
+      <p:sp>
+        <p:nvSpPr>
+          <p:cNvPr id="21" name="Speech Bubble: Rectangle 20"/>
+          <p:cNvSpPr/>
+          <p:nvPr/>
+        </p:nvSpPr>
+        <p:spPr bwMode="gray">
+          <a:xfrm>
+            <a:off x="7588740" y="3063233"/>
+            <a:ext cx="4101737" cy="748951"/>
+          </a:xfrm>
+          <a:prstGeom prst="wedgeRectCallout">
+            <a:avLst>
+              <a:gd name="adj1" fmla="val -82404"/>
+              <a:gd name="adj2" fmla="val 8240"/>
+            </a:avLst>
+          </a:prstGeom>
+          <a:ln>
+            <a:headEnd/>
+            <a:tailEnd/>
+          </a:ln>
+        </p:spPr>
+        <p:style>
+          <a:lnRef idx="2">
+            <a:schemeClr val="accent5"/>
+          </a:lnRef>
+          <a:fillRef idx="1">
+            <a:schemeClr val="lt1"/>
+          </a:fillRef>
+          <a:effectRef idx="0">
+            <a:schemeClr val="accent5"/>
+          </a:effectRef>
+          <a:fontRef idx="minor">
+            <a:schemeClr val="dk1"/>
+          </a:fontRef>
+        </p:style>
+        <p:txBody>
+          <a:bodyPr lIns="90000" tIns="72000" rIns="90000" bIns="72000" rtlCol="0" anchor="ctr"/>
+          <a:lstStyle/>
+          <a:p>
+            <a:pPr marR="0" algn="ctr" defTabSz="914400" eaLnBrk="1" fontAlgn="base" latinLnBrk="0" hangingPunct="1">
+              <a:lnSpc>
+                <a:spcPct val="100000"/>
+              </a:lnSpc>
+              <a:spcBef>
+                <a:spcPct val="50000"/>
+              </a:spcBef>
+              <a:spcAft>
+                <a:spcPct val="0"/>
+              </a:spcAft>
+              <a:buClr>
+                <a:srgbClr val="F0AB00"/>
+              </a:buClr>
+              <a:buSzPct val="80000"/>
+              <a:tabLst/>
+            </a:pPr>
+            <a:r>
+              <a:rPr lang="en-US" sz="1800" kern="0" noProof="0" dirty="0">
+                <a:ea typeface="Arial Unicode MS" pitchFamily="34" charset="-128"/>
+                <a:cs typeface="Arial Unicode MS" pitchFamily="34" charset="-128"/>
+              </a:rPr>
+              <a:t>metadata like name, annotations or labels are maintained here</a:t>
+            </a:r>
+            <a:endParaRPr kumimoji="0" lang="en-US" sz="1800" b="0" i="0" u="none" strike="noStrike" kern="0" cap="none" spc="0" normalizeH="0" baseline="0" noProof="0" dirty="0">
+              <a:ln>
+                <a:noFill/>
+              </a:ln>
+              <a:effectLst/>
+              <a:uLnTx/>
+              <a:uFillTx/>
+              <a:ea typeface="Arial Unicode MS" pitchFamily="34" charset="-128"/>
+              <a:cs typeface="Arial Unicode MS" pitchFamily="34" charset="-128"/>
+            </a:endParaRPr>
+          </a:p>
+        </p:txBody>
+      </p:sp>
+      <p:sp>
+        <p:nvSpPr>
+          <p:cNvPr id="22" name="Speech Bubble: Rectangle 21"/>
+          <p:cNvSpPr/>
+          <p:nvPr/>
+        </p:nvSpPr>
+        <p:spPr bwMode="gray">
+          <a:xfrm>
+            <a:off x="7588740" y="4108290"/>
+            <a:ext cx="4101737" cy="748951"/>
+          </a:xfrm>
+          <a:prstGeom prst="wedgeRectCallout">
+            <a:avLst>
+              <a:gd name="adj1" fmla="val -86438"/>
+              <a:gd name="adj2" fmla="val -41760"/>
+            </a:avLst>
+          </a:prstGeom>
+          <a:ln>
+            <a:headEnd/>
+            <a:tailEnd/>
+          </a:ln>
+        </p:spPr>
+        <p:style>
+          <a:lnRef idx="2">
+            <a:schemeClr val="accent5"/>
+          </a:lnRef>
+          <a:fillRef idx="1">
+            <a:schemeClr val="lt1"/>
+          </a:fillRef>
+          <a:effectRef idx="0">
+            <a:schemeClr val="accent5"/>
+          </a:effectRef>
+          <a:fontRef idx="minor">
+            <a:schemeClr val="dk1"/>
+          </a:fontRef>
+        </p:style>
+        <p:txBody>
+          <a:bodyPr lIns="90000" tIns="72000" rIns="90000" bIns="72000" rtlCol="0" anchor="ctr"/>
+          <a:lstStyle/>
+          <a:p>
+            <a:pPr marR="0" algn="ctr" defTabSz="914400" eaLnBrk="1" fontAlgn="base" latinLnBrk="0" hangingPunct="1">
+              <a:lnSpc>
+                <a:spcPct val="100000"/>
+              </a:lnSpc>
+              <a:spcBef>
+                <a:spcPct val="50000"/>
+              </a:spcBef>
+              <a:spcAft>
+                <a:spcPct val="0"/>
+              </a:spcAft>
+              <a:buClr>
+                <a:srgbClr val="F0AB00"/>
+              </a:buClr>
+              <a:buSzPct val="80000"/>
+              <a:tabLst/>
+            </a:pPr>
+            <a:r>
+              <a:rPr lang="en-US" sz="1800" kern="0" dirty="0">
+                <a:ea typeface="Arial Unicode MS" pitchFamily="34" charset="-128"/>
+                <a:cs typeface="Arial Unicode MS" pitchFamily="34" charset="-128"/>
+              </a:rPr>
+              <a:t>specification of the resource based on its “kind”</a:t>
+            </a:r>
+            <a:endParaRPr kumimoji="0" lang="en-US" sz="1800" b="0" i="0" u="none" strike="noStrike" kern="0" cap="none" spc="0" normalizeH="0" baseline="0" noProof="0" dirty="0">
+              <a:ln>
+                <a:noFill/>
+              </a:ln>
+              <a:effectLst/>
+              <a:uLnTx/>
+              <a:uFillTx/>
+              <a:ea typeface="Arial Unicode MS" pitchFamily="34" charset="-128"/>
+              <a:cs typeface="Arial Unicode MS" pitchFamily="34" charset="-128"/>
+            </a:endParaRPr>
+          </a:p>
+        </p:txBody>
+      </p:sp>
+    </p:spTree>
+    <p:extLst>
+      <p:ext uri="{BB962C8B-B14F-4D97-AF65-F5344CB8AC3E}">
+        <p14:creationId xmlns:p14="http://schemas.microsoft.com/office/powerpoint/2010/main" val="4144602584"/>
+      </p:ext>
+    </p:extLst>
+  </p:cSld>
+  <p:clrMapOvr>
+    <a:masterClrMapping/>
+  </p:clrMapOvr>
+</p:sld>
+</file>
+
+<file path=ppt/slides/slide5.xml><?xml version="1.0" encoding="utf-8"?>
+<p:sld xmlns:a="http://schemas.openxmlformats.org/drawingml/2006/main" xmlns:r="http://schemas.openxmlformats.org/officeDocument/2006/relationships" xmlns:p="http://schemas.openxmlformats.org/presentationml/2006/main">
+  <p:cSld>
+    <p:spTree>
+      <p:nvGrpSpPr>
+        <p:cNvPr id="1" name=""/>
+        <p:cNvGrpSpPr/>
+        <p:nvPr/>
+      </p:nvGrpSpPr>
+      <p:grpSpPr>
+        <a:xfrm>
+          <a:off x="0" y="0"/>
+          <a:ext cx="0" cy="0"/>
+          <a:chOff x="0" y="0"/>
+          <a:chExt cx="0" cy="0"/>
+        </a:xfrm>
+      </p:grpSpPr>
+      <p:sp>
+        <p:nvSpPr>
           <p:cNvPr id="2" name="Title 1"/>
           <p:cNvSpPr>
             <a:spLocks noGrp="1"/>
@@ -9811,7 +11144,7 @@
         </p:blipFill>
         <p:spPr>
           <a:xfrm>
-            <a:off x="3349795" y="1116542"/>
+            <a:off x="1520995" y="1116542"/>
             <a:ext cx="5494887" cy="5074071"/>
           </a:xfrm>
           <a:prstGeom prst="rect">
@@ -9819,6 +11152,262 @@
           </a:prstGeom>
         </p:spPr>
       </p:pic>
+      <p:sp>
+        <p:nvSpPr>
+          <p:cNvPr id="15" name="Speech Bubble: Rectangle 14"/>
+          <p:cNvSpPr/>
+          <p:nvPr/>
+        </p:nvSpPr>
+        <p:spPr bwMode="gray">
+          <a:xfrm>
+            <a:off x="5490755" y="1116542"/>
+            <a:ext cx="5442076" cy="572921"/>
+          </a:xfrm>
+          <a:prstGeom prst="wedgeRectCallout">
+            <a:avLst>
+              <a:gd name="adj1" fmla="val -91535"/>
+              <a:gd name="adj2" fmla="val -12354"/>
+            </a:avLst>
+          </a:prstGeom>
+          <a:ln>
+            <a:headEnd/>
+            <a:tailEnd/>
+          </a:ln>
+        </p:spPr>
+        <p:style>
+          <a:lnRef idx="2">
+            <a:schemeClr val="accent5"/>
+          </a:lnRef>
+          <a:fillRef idx="1">
+            <a:schemeClr val="lt1"/>
+          </a:fillRef>
+          <a:effectRef idx="0">
+            <a:schemeClr val="accent5"/>
+          </a:effectRef>
+          <a:fontRef idx="minor">
+            <a:schemeClr val="dk1"/>
+          </a:fontRef>
+        </p:style>
+        <p:txBody>
+          <a:bodyPr lIns="90000" tIns="72000" rIns="90000" bIns="72000" rtlCol="0" anchor="ctr"/>
+          <a:lstStyle/>
+          <a:p>
+            <a:pPr marR="0" algn="ctr" defTabSz="914400" eaLnBrk="1" fontAlgn="base" latinLnBrk="0" hangingPunct="1">
+              <a:lnSpc>
+                <a:spcPct val="100000"/>
+              </a:lnSpc>
+              <a:spcBef>
+                <a:spcPct val="50000"/>
+              </a:spcBef>
+              <a:spcAft>
+                <a:spcPct val="0"/>
+              </a:spcAft>
+              <a:buClr>
+                <a:srgbClr val="F0AB00"/>
+              </a:buClr>
+              <a:buSzPct val="80000"/>
+              <a:tabLst/>
+            </a:pPr>
+            <a:r>
+              <a:rPr lang="en-US" sz="1800" kern="0" dirty="0">
+                <a:ea typeface="Arial Unicode MS" pitchFamily="34" charset="-128"/>
+                <a:cs typeface="Arial Unicode MS" pitchFamily="34" charset="-128"/>
+              </a:rPr>
+              <a:t>Resources of “</a:t>
+            </a:r>
+            <a:r>
+              <a:rPr lang="en-US" sz="1800" kern="0" dirty="0" err="1">
+                <a:ea typeface="Arial Unicode MS" pitchFamily="34" charset="-128"/>
+                <a:cs typeface="Arial Unicode MS" pitchFamily="34" charset="-128"/>
+              </a:rPr>
+              <a:t>kind:pod</a:t>
+            </a:r>
+            <a:r>
+              <a:rPr lang="en-US" sz="1800" kern="0" dirty="0">
+                <a:ea typeface="Arial Unicode MS" pitchFamily="34" charset="-128"/>
+                <a:cs typeface="Arial Unicode MS" pitchFamily="34" charset="-128"/>
+              </a:rPr>
+              <a:t>” belong to “</a:t>
+            </a:r>
+            <a:r>
+              <a:rPr lang="en-US" sz="1800" kern="0" dirty="0" err="1">
+                <a:ea typeface="Arial Unicode MS" pitchFamily="34" charset="-128"/>
+                <a:cs typeface="Arial Unicode MS" pitchFamily="34" charset="-128"/>
+              </a:rPr>
+              <a:t>apiVersion</a:t>
+            </a:r>
+            <a:r>
+              <a:rPr lang="en-US" sz="1800" kern="0" dirty="0">
+                <a:ea typeface="Arial Unicode MS" pitchFamily="34" charset="-128"/>
+                <a:cs typeface="Arial Unicode MS" pitchFamily="34" charset="-128"/>
+              </a:rPr>
+              <a:t>: v1”</a:t>
+            </a:r>
+            <a:endParaRPr kumimoji="0" lang="en-US" sz="1800" b="0" i="0" u="none" strike="noStrike" kern="0" cap="none" spc="0" normalizeH="0" baseline="0" noProof="0" dirty="0">
+              <a:ln>
+                <a:noFill/>
+              </a:ln>
+              <a:effectLst/>
+              <a:uLnTx/>
+              <a:uFillTx/>
+              <a:ea typeface="Arial Unicode MS" pitchFamily="34" charset="-128"/>
+              <a:cs typeface="Arial Unicode MS" pitchFamily="34" charset="-128"/>
+            </a:endParaRPr>
+          </a:p>
+        </p:txBody>
+      </p:sp>
+      <p:sp>
+        <p:nvSpPr>
+          <p:cNvPr id="16" name="Speech Bubble: Rectangle 15"/>
+          <p:cNvSpPr/>
+          <p:nvPr/>
+        </p:nvSpPr>
+        <p:spPr bwMode="gray">
+          <a:xfrm>
+            <a:off x="6831094" y="1932673"/>
+            <a:ext cx="4101737" cy="645064"/>
+          </a:xfrm>
+          <a:prstGeom prst="wedgeRectCallout">
+            <a:avLst>
+              <a:gd name="adj1" fmla="val -99389"/>
+              <a:gd name="adj2" fmla="val -21992"/>
+            </a:avLst>
+          </a:prstGeom>
+          <a:ln>
+            <a:headEnd/>
+            <a:tailEnd/>
+          </a:ln>
+        </p:spPr>
+        <p:style>
+          <a:lnRef idx="2">
+            <a:schemeClr val="accent5"/>
+          </a:lnRef>
+          <a:fillRef idx="1">
+            <a:schemeClr val="lt1"/>
+          </a:fillRef>
+          <a:effectRef idx="0">
+            <a:schemeClr val="accent5"/>
+          </a:effectRef>
+          <a:fontRef idx="minor">
+            <a:schemeClr val="dk1"/>
+          </a:fontRef>
+        </p:style>
+        <p:txBody>
+          <a:bodyPr lIns="90000" tIns="72000" rIns="90000" bIns="72000" rtlCol="0" anchor="ctr"/>
+          <a:lstStyle/>
+          <a:p>
+            <a:pPr marR="0" algn="ctr" defTabSz="914400" eaLnBrk="1" fontAlgn="base" latinLnBrk="0" hangingPunct="1">
+              <a:lnSpc>
+                <a:spcPct val="100000"/>
+              </a:lnSpc>
+              <a:spcBef>
+                <a:spcPct val="50000"/>
+              </a:spcBef>
+              <a:spcAft>
+                <a:spcPct val="0"/>
+              </a:spcAft>
+              <a:buClr>
+                <a:srgbClr val="F0AB00"/>
+              </a:buClr>
+              <a:buSzPct val="80000"/>
+              <a:tabLst/>
+            </a:pPr>
+            <a:r>
+              <a:rPr lang="en-US" sz="1800" kern="0" noProof="0" dirty="0">
+                <a:ea typeface="Arial Unicode MS" pitchFamily="34" charset="-128"/>
+                <a:cs typeface="Arial Unicode MS" pitchFamily="34" charset="-128"/>
+              </a:rPr>
+              <a:t>Within “metadata” the pod’s name is specified</a:t>
+            </a:r>
+            <a:endParaRPr kumimoji="0" lang="en-US" sz="1800" b="0" i="0" u="none" strike="noStrike" kern="0" cap="none" spc="0" normalizeH="0" baseline="0" noProof="0" dirty="0">
+              <a:ln>
+                <a:noFill/>
+              </a:ln>
+              <a:effectLst/>
+              <a:uLnTx/>
+              <a:uFillTx/>
+              <a:ea typeface="Arial Unicode MS" pitchFamily="34" charset="-128"/>
+              <a:cs typeface="Arial Unicode MS" pitchFamily="34" charset="-128"/>
+            </a:endParaRPr>
+          </a:p>
+        </p:txBody>
+      </p:sp>
+      <p:sp>
+        <p:nvSpPr>
+          <p:cNvPr id="17" name="Speech Bubble: Rectangle 16"/>
+          <p:cNvSpPr/>
+          <p:nvPr/>
+        </p:nvSpPr>
+        <p:spPr bwMode="gray">
+          <a:xfrm>
+            <a:off x="7244751" y="3504570"/>
+            <a:ext cx="4101737" cy="1337396"/>
+          </a:xfrm>
+          <a:prstGeom prst="wedgeRectCallout">
+            <a:avLst>
+              <a:gd name="adj1" fmla="val -92595"/>
+              <a:gd name="adj2" fmla="val -61109"/>
+            </a:avLst>
+          </a:prstGeom>
+          <a:ln>
+            <a:headEnd/>
+            <a:tailEnd/>
+          </a:ln>
+        </p:spPr>
+        <p:style>
+          <a:lnRef idx="2">
+            <a:schemeClr val="accent5"/>
+          </a:lnRef>
+          <a:fillRef idx="1">
+            <a:schemeClr val="lt1"/>
+          </a:fillRef>
+          <a:effectRef idx="0">
+            <a:schemeClr val="accent5"/>
+          </a:effectRef>
+          <a:fontRef idx="minor">
+            <a:schemeClr val="dk1"/>
+          </a:fontRef>
+        </p:style>
+        <p:txBody>
+          <a:bodyPr lIns="90000" tIns="72000" rIns="90000" bIns="72000" rtlCol="0" anchor="ctr"/>
+          <a:lstStyle/>
+          <a:p>
+            <a:pPr marR="0" algn="ctr" defTabSz="914400" eaLnBrk="1" fontAlgn="base" latinLnBrk="0" hangingPunct="1">
+              <a:lnSpc>
+                <a:spcPct val="100000"/>
+              </a:lnSpc>
+              <a:spcBef>
+                <a:spcPct val="50000"/>
+              </a:spcBef>
+              <a:spcAft>
+                <a:spcPct val="0"/>
+              </a:spcAft>
+              <a:buClr>
+                <a:srgbClr val="F0AB00"/>
+              </a:buClr>
+              <a:buSzPct val="80000"/>
+              <a:tabLst/>
+            </a:pPr>
+            <a:r>
+              <a:rPr lang="en-US" sz="1800" kern="0" noProof="0" dirty="0">
+                <a:ea typeface="Arial Unicode MS" pitchFamily="34" charset="-128"/>
+                <a:cs typeface="Arial Unicode MS" pitchFamily="34" charset="-128"/>
+              </a:rPr>
+              <a:t>The pod’s “spec” provides all the necessary details, like the image to use, to actually start a container</a:t>
+            </a:r>
+            <a:endParaRPr kumimoji="0" lang="en-US" sz="1800" b="0" i="0" u="none" strike="noStrike" kern="0" cap="none" spc="0" normalizeH="0" baseline="0" noProof="0" dirty="0">
+              <a:ln>
+                <a:noFill/>
+              </a:ln>
+              <a:effectLst/>
+              <a:uLnTx/>
+              <a:uFillTx/>
+              <a:ea typeface="Arial Unicode MS" pitchFamily="34" charset="-128"/>
+              <a:cs typeface="Arial Unicode MS" pitchFamily="34" charset="-128"/>
+            </a:endParaRPr>
+          </a:p>
+        </p:txBody>
+      </p:sp>
     </p:spTree>
     <p:extLst>
       <p:ext uri="{BB962C8B-B14F-4D97-AF65-F5344CB8AC3E}">
@@ -9832,7 +11421,7 @@
 </p:sld>
 </file>
 
-<file path=ppt/slides/slide5.xml><?xml version="1.0" encoding="utf-8"?>
+<file path=ppt/slides/slide6.xml><?xml version="1.0" encoding="utf-8"?>
 <p:sld xmlns:a="http://schemas.openxmlformats.org/drawingml/2006/main" xmlns:r="http://schemas.openxmlformats.org/officeDocument/2006/relationships" xmlns:p="http://schemas.openxmlformats.org/presentationml/2006/main">
   <p:cSld>
     <p:spTree>
@@ -10702,7 +12291,7 @@
 </p:sld>
 </file>
 
-<file path=ppt/slides/slide6.xml><?xml version="1.0" encoding="utf-8"?>
+<file path=ppt/slides/slide7.xml><?xml version="1.0" encoding="utf-8"?>
 <p:sld xmlns:a="http://schemas.openxmlformats.org/drawingml/2006/main" xmlns:r="http://schemas.openxmlformats.org/officeDocument/2006/relationships" xmlns:p="http://schemas.openxmlformats.org/presentationml/2006/main">
   <p:cSld>
     <p:spTree>
@@ -10836,7 +12425,7 @@
 </p:sld>
 </file>
 
-<file path=ppt/slides/slide7.xml><?xml version="1.0" encoding="utf-8"?>
+<file path=ppt/slides/slide8.xml><?xml version="1.0" encoding="utf-8"?>
 <p:sld xmlns:a="http://schemas.openxmlformats.org/drawingml/2006/main" xmlns:r="http://schemas.openxmlformats.org/officeDocument/2006/relationships" xmlns:p="http://schemas.openxmlformats.org/presentationml/2006/main" show="0">
   <p:cSld>
     <p:spTree>
@@ -10952,7 +12541,7 @@
 </p:sld>
 </file>
 
-<file path=ppt/slides/slide8.xml><?xml version="1.0" encoding="utf-8"?>
+<file path=ppt/slides/slide9.xml><?xml version="1.0" encoding="utf-8"?>
 <p:sld xmlns:a="http://schemas.openxmlformats.org/drawingml/2006/main" xmlns:r="http://schemas.openxmlformats.org/officeDocument/2006/relationships" xmlns:p="http://schemas.openxmlformats.org/presentationml/2006/main">
   <p:cSld>
     <p:spTree>
@@ -11810,32 +13399,6 @@
 </p:sld>
 </file>
 
-<file path=ppt/slides/slide9.xml><?xml version="1.0" encoding="utf-8"?>
-<p:sld xmlns:a="http://schemas.openxmlformats.org/drawingml/2006/main" xmlns:r="http://schemas.openxmlformats.org/officeDocument/2006/relationships" xmlns:p="http://schemas.openxmlformats.org/presentationml/2006/main" show="0">
-  <p:cSld>
-    <p:spTree>
-      <p:nvGrpSpPr>
-        <p:cNvPr id="1" name=""/>
-        <p:cNvGrpSpPr/>
-        <p:nvPr/>
-      </p:nvGrpSpPr>
-      <p:grpSpPr>
-        <a:xfrm>
-          <a:off x="0" y="0"/>
-          <a:ext cx="0" cy="0"/>
-          <a:chOff x="0" y="0"/>
-          <a:chExt cx="0" cy="0"/>
-        </a:xfrm>
-      </p:grpSpPr>
-    </p:spTree>
-  </p:cSld>
-  <p:clrMapOvr>
-    <a:masterClrMapping/>
-  </p:clrMapOvr>
-  <p:transition spd="med"/>
-</p:sld>
-</file>
-
 <file path=ppt/theme/theme1.xml><?xml version="1.0" encoding="utf-8"?>
 <a:theme xmlns:a="http://schemas.openxmlformats.org/drawingml/2006/main" name="SAP_2017_16x9_black">
   <a:themeElements>

</xml_diff>

<commit_message>
urther work on liveness probe
</commit_message>
<xml_diff>
--- a/kubernetes/02_namespaces_pods.pptx
+++ b/kubernetes/02_namespaces_pods.pptx
@@ -5,10 +5,10 @@
     <p:sldMasterId id="2147483733" r:id="rId1"/>
   </p:sldMasterIdLst>
   <p:notesMasterIdLst>
-    <p:notesMasterId r:id="rId12"/>
+    <p:notesMasterId r:id="rId13"/>
   </p:notesMasterIdLst>
   <p:handoutMasterIdLst>
-    <p:handoutMasterId r:id="rId13"/>
+    <p:handoutMasterId r:id="rId14"/>
   </p:handoutMasterIdLst>
   <p:sldIdLst>
     <p:sldId id="433" r:id="rId2"/>
@@ -16,11 +16,12 @@
     <p:sldId id="437" r:id="rId4"/>
     <p:sldId id="445" r:id="rId5"/>
     <p:sldId id="438" r:id="rId6"/>
-    <p:sldId id="440" r:id="rId7"/>
-    <p:sldId id="436" r:id="rId8"/>
-    <p:sldId id="443" r:id="rId9"/>
-    <p:sldId id="444" r:id="rId10"/>
-    <p:sldId id="265" r:id="rId11"/>
+    <p:sldId id="446" r:id="rId7"/>
+    <p:sldId id="440" r:id="rId8"/>
+    <p:sldId id="436" r:id="rId9"/>
+    <p:sldId id="443" r:id="rId10"/>
+    <p:sldId id="444" r:id="rId11"/>
+    <p:sldId id="265" r:id="rId12"/>
   </p:sldIdLst>
   <p:sldSz cx="12195175" cy="6858000"/>
   <p:notesSz cx="6858000" cy="9144000"/>
@@ -788,7 +789,7 @@
           </a:bodyPr>
           <a:lstStyle/>
           <a:p>
-            <a:endParaRPr lang="en-US"/>
+            <a:endParaRPr lang="en-US" dirty="0"/>
           </a:p>
         </p:txBody>
       </p:sp>
@@ -824,6 +825,107 @@
       </p:grpSpPr>
       <p:sp>
         <p:nvSpPr>
+          <p:cNvPr id="2" name="Slide Image Placeholder 1"/>
+          <p:cNvSpPr>
+            <a:spLocks noGrp="1" noRot="1" noChangeAspect="1"/>
+          </p:cNvSpPr>
+          <p:nvPr>
+            <p:ph type="sldImg"/>
+          </p:nvPr>
+        </p:nvSpPr>
+        <p:spPr/>
+      </p:sp>
+      <p:sp>
+        <p:nvSpPr>
+          <p:cNvPr id="3" name="Notes Placeholder 2"/>
+          <p:cNvSpPr>
+            <a:spLocks noGrp="1"/>
+          </p:cNvSpPr>
+          <p:nvPr>
+            <p:ph type="body" idx="1"/>
+          </p:nvPr>
+        </p:nvSpPr>
+        <p:spPr/>
+        <p:txBody>
+          <a:bodyPr/>
+          <a:lstStyle/>
+          <a:p>
+            <a:r>
+              <a:rPr lang="en-US" dirty="0"/>
+              <a:t>Demo: http &amp; exec</a:t>
+            </a:r>
+            <a:r>
+              <a:rPr lang="en-US" baseline="0" dirty="0"/>
+              <a:t> liveness pods</a:t>
+            </a:r>
+            <a:endParaRPr lang="en-US" dirty="0"/>
+          </a:p>
+          <a:p>
+            <a:r>
+              <a:rPr lang="en-US" dirty="0"/>
+              <a:t>Consequence of failed probe:</a:t>
+            </a:r>
+          </a:p>
+          <a:p>
+            <a:pPr marL="285750" indent="-285750">
+              <a:buFontTx/>
+              <a:buChar char="-"/>
+            </a:pPr>
+            <a:r>
+              <a:rPr lang="en-US" dirty="0"/>
+              <a:t>liveness: kill the pod &amp; restart</a:t>
+            </a:r>
+          </a:p>
+          <a:p>
+            <a:pPr marL="285750" indent="-285750">
+              <a:buFontTx/>
+              <a:buChar char="-"/>
+            </a:pPr>
+            <a:r>
+              <a:rPr lang="en-US" dirty="0"/>
+              <a:t>Readiness: mark pod</a:t>
+            </a:r>
+            <a:r>
+              <a:rPr lang="en-US" baseline="0" dirty="0"/>
+              <a:t> as not ready and don’t route service traffic to it</a:t>
+            </a:r>
+            <a:endParaRPr lang="en-US" dirty="0"/>
+          </a:p>
+          <a:p>
+            <a:r>
+              <a:rPr lang="en-US" dirty="0"/>
+              <a:t>Other options</a:t>
+            </a:r>
+            <a:r>
+              <a:rPr lang="en-US" baseline="0" dirty="0"/>
+              <a:t> for probes: </a:t>
+            </a:r>
+          </a:p>
+          <a:p>
+            <a:pPr marL="285750" indent="-285750">
+              <a:buFontTx/>
+              <a:buChar char="-"/>
+            </a:pPr>
+            <a:r>
+              <a:rPr lang="en-US" baseline="0" dirty="0"/>
+              <a:t>TCP: can a connection be opened successfully?</a:t>
+            </a:r>
+          </a:p>
+          <a:p>
+            <a:pPr marL="285750" indent="-285750">
+              <a:buFontTx/>
+              <a:buChar char="-"/>
+            </a:pPr>
+            <a:r>
+              <a:rPr lang="en-US" baseline="0" dirty="0"/>
+              <a:t>EXEC: run a command and evaluate return/exit code</a:t>
+            </a:r>
+            <a:endParaRPr lang="en-US" dirty="0"/>
+          </a:p>
+        </p:txBody>
+      </p:sp>
+      <p:sp>
+        <p:nvSpPr>
           <p:cNvPr id="4" name="Slide Number Placeholder 3"/>
           <p:cNvSpPr>
             <a:spLocks noGrp="1"/>
@@ -840,54 +942,16 @@
             <a:fld id="{7D8C2C35-2B8A-446E-BEC0-FD36716C29AC}" type="slidenum">
               <a:rPr lang="de-DE" smtClean="0"/>
               <a:pPr/>
-              <a:t>7</a:t>
+              <a:t>6</a:t>
             </a:fld>
             <a:endParaRPr lang="de-DE" dirty="0"/>
-          </a:p>
-        </p:txBody>
-      </p:sp>
-      <p:sp>
-        <p:nvSpPr>
-          <p:cNvPr id="9" name="Slide Image Placeholder 8"/>
-          <p:cNvSpPr>
-            <a:spLocks noGrp="1" noRot="1" noChangeAspect="1"/>
-          </p:cNvSpPr>
-          <p:nvPr>
-            <p:ph type="sldImg"/>
-          </p:nvPr>
-        </p:nvSpPr>
-        <p:spPr>
-          <a:xfrm>
-            <a:off x="547688" y="612775"/>
-            <a:ext cx="5762625" cy="3241675"/>
-          </a:xfrm>
-        </p:spPr>
-      </p:sp>
-      <p:sp>
-        <p:nvSpPr>
-          <p:cNvPr id="10" name="Notes Placeholder 9"/>
-          <p:cNvSpPr>
-            <a:spLocks noGrp="1"/>
-          </p:cNvSpPr>
-          <p:nvPr>
-            <p:ph type="body" idx="1"/>
-          </p:nvPr>
-        </p:nvSpPr>
-        <p:spPr/>
-        <p:txBody>
-          <a:bodyPr>
-            <a:normAutofit/>
-          </a:bodyPr>
-          <a:lstStyle/>
-          <a:p>
-            <a:endParaRPr lang="en-US"/>
           </a:p>
         </p:txBody>
       </p:sp>
     </p:spTree>
     <p:extLst>
       <p:ext uri="{BB962C8B-B14F-4D97-AF65-F5344CB8AC3E}">
-        <p14:creationId xmlns:p14="http://schemas.microsoft.com/office/powerpoint/2010/main" val="3094605481"/>
+        <p14:creationId xmlns:p14="http://schemas.microsoft.com/office/powerpoint/2010/main" val="3950672114"/>
       </p:ext>
     </p:extLst>
   </p:cSld>
@@ -932,7 +996,99 @@
             <a:fld id="{7D8C2C35-2B8A-446E-BEC0-FD36716C29AC}" type="slidenum">
               <a:rPr lang="de-DE" smtClean="0"/>
               <a:pPr/>
-              <a:t>10</a:t>
+              <a:t>8</a:t>
+            </a:fld>
+            <a:endParaRPr lang="de-DE" dirty="0"/>
+          </a:p>
+        </p:txBody>
+      </p:sp>
+      <p:sp>
+        <p:nvSpPr>
+          <p:cNvPr id="9" name="Slide Image Placeholder 8"/>
+          <p:cNvSpPr>
+            <a:spLocks noGrp="1" noRot="1" noChangeAspect="1"/>
+          </p:cNvSpPr>
+          <p:nvPr>
+            <p:ph type="sldImg"/>
+          </p:nvPr>
+        </p:nvSpPr>
+        <p:spPr>
+          <a:xfrm>
+            <a:off x="547688" y="612775"/>
+            <a:ext cx="5762625" cy="3241675"/>
+          </a:xfrm>
+        </p:spPr>
+      </p:sp>
+      <p:sp>
+        <p:nvSpPr>
+          <p:cNvPr id="10" name="Notes Placeholder 9"/>
+          <p:cNvSpPr>
+            <a:spLocks noGrp="1"/>
+          </p:cNvSpPr>
+          <p:nvPr>
+            <p:ph type="body" idx="1"/>
+          </p:nvPr>
+        </p:nvSpPr>
+        <p:spPr/>
+        <p:txBody>
+          <a:bodyPr>
+            <a:normAutofit/>
+          </a:bodyPr>
+          <a:lstStyle/>
+          <a:p>
+            <a:endParaRPr lang="en-US" dirty="0"/>
+          </a:p>
+        </p:txBody>
+      </p:sp>
+    </p:spTree>
+    <p:extLst>
+      <p:ext uri="{BB962C8B-B14F-4D97-AF65-F5344CB8AC3E}">
+        <p14:creationId xmlns:p14="http://schemas.microsoft.com/office/powerpoint/2010/main" val="3094605481"/>
+      </p:ext>
+    </p:extLst>
+  </p:cSld>
+  <p:clrMapOvr>
+    <a:masterClrMapping/>
+  </p:clrMapOvr>
+</p:notes>
+</file>
+
+<file path=ppt/notesSlides/notesSlide6.xml><?xml version="1.0" encoding="utf-8"?>
+<p:notes xmlns:a="http://schemas.openxmlformats.org/drawingml/2006/main" xmlns:r="http://schemas.openxmlformats.org/officeDocument/2006/relationships" xmlns:p="http://schemas.openxmlformats.org/presentationml/2006/main">
+  <p:cSld>
+    <p:spTree>
+      <p:nvGrpSpPr>
+        <p:cNvPr id="1" name=""/>
+        <p:cNvGrpSpPr/>
+        <p:nvPr/>
+      </p:nvGrpSpPr>
+      <p:grpSpPr>
+        <a:xfrm>
+          <a:off x="0" y="0"/>
+          <a:ext cx="0" cy="0"/>
+          <a:chOff x="0" y="0"/>
+          <a:chExt cx="0" cy="0"/>
+        </a:xfrm>
+      </p:grpSpPr>
+      <p:sp>
+        <p:nvSpPr>
+          <p:cNvPr id="4" name="Slide Number Placeholder 3"/>
+          <p:cNvSpPr>
+            <a:spLocks noGrp="1"/>
+          </p:cNvSpPr>
+          <p:nvPr>
+            <p:ph type="sldNum" sz="quarter" idx="10"/>
+          </p:nvPr>
+        </p:nvSpPr>
+        <p:spPr/>
+        <p:txBody>
+          <a:bodyPr/>
+          <a:lstStyle/>
+          <a:p>
+            <a:fld id="{7D8C2C35-2B8A-446E-BEC0-FD36716C29AC}" type="slidenum">
+              <a:rPr lang="de-DE" smtClean="0"/>
+              <a:pPr/>
+              <a:t>11</a:t>
             </a:fld>
             <a:endParaRPr lang="de-DE" dirty="0"/>
           </a:p>
@@ -8564,6 +8720,864 @@
 </file>
 
 <file path=ppt/slides/slide10.xml><?xml version="1.0" encoding="utf-8"?>
+<p:sld xmlns:a="http://schemas.openxmlformats.org/drawingml/2006/main" xmlns:r="http://schemas.openxmlformats.org/officeDocument/2006/relationships" xmlns:p="http://schemas.openxmlformats.org/presentationml/2006/main">
+  <p:cSld>
+    <p:spTree>
+      <p:nvGrpSpPr>
+        <p:cNvPr id="1" name=""/>
+        <p:cNvGrpSpPr/>
+        <p:nvPr/>
+      </p:nvGrpSpPr>
+      <p:grpSpPr>
+        <a:xfrm>
+          <a:off x="0" y="0"/>
+          <a:ext cx="0" cy="0"/>
+          <a:chOff x="0" y="0"/>
+          <a:chExt cx="0" cy="0"/>
+        </a:xfrm>
+      </p:grpSpPr>
+      <p:sp>
+        <p:nvSpPr>
+          <p:cNvPr id="3" name="Title 2"/>
+          <p:cNvSpPr>
+            <a:spLocks noGrp="1"/>
+          </p:cNvSpPr>
+          <p:nvPr>
+            <p:ph type="title"/>
+          </p:nvPr>
+        </p:nvSpPr>
+        <p:spPr/>
+        <p:txBody>
+          <a:bodyPr/>
+          <a:lstStyle/>
+          <a:p>
+            <a:r>
+              <a:rPr lang="en-US" dirty="0"/>
+              <a:t>What YOU will do during the next exercise…</a:t>
+            </a:r>
+          </a:p>
+        </p:txBody>
+      </p:sp>
+      <p:grpSp>
+        <p:nvGrpSpPr>
+          <p:cNvPr id="13" name="Group 12"/>
+          <p:cNvGrpSpPr/>
+          <p:nvPr/>
+        </p:nvGrpSpPr>
+        <p:grpSpPr>
+          <a:xfrm>
+            <a:off x="2674620" y="2948940"/>
+            <a:ext cx="6187440" cy="1752600"/>
+            <a:chOff x="2697480" y="2743200"/>
+            <a:chExt cx="6187440" cy="2034540"/>
+          </a:xfrm>
+        </p:grpSpPr>
+        <p:sp>
+          <p:nvSpPr>
+            <p:cNvPr id="12" name="Rectangle: Rounded Corners 11"/>
+            <p:cNvSpPr/>
+            <p:nvPr/>
+          </p:nvSpPr>
+          <p:spPr bwMode="gray">
+            <a:xfrm>
+              <a:off x="2697480" y="2743200"/>
+              <a:ext cx="6187440" cy="2034540"/>
+            </a:xfrm>
+            <a:prstGeom prst="roundRect">
+              <a:avLst/>
+            </a:prstGeom>
+            <a:ln>
+              <a:headEnd/>
+              <a:tailEnd/>
+            </a:ln>
+          </p:spPr>
+          <p:style>
+            <a:lnRef idx="2">
+              <a:schemeClr val="accent1"/>
+            </a:lnRef>
+            <a:fillRef idx="1">
+              <a:schemeClr val="lt1"/>
+            </a:fillRef>
+            <a:effectRef idx="0">
+              <a:schemeClr val="accent1"/>
+            </a:effectRef>
+            <a:fontRef idx="minor">
+              <a:schemeClr val="dk1"/>
+            </a:fontRef>
+          </p:style>
+          <p:txBody>
+            <a:bodyPr lIns="90000" tIns="72000" rIns="90000" bIns="72000" rtlCol="0" anchor="ctr"/>
+            <a:lstStyle/>
+            <a:p>
+              <a:pPr marR="0" algn="ctr" defTabSz="914400" eaLnBrk="1" fontAlgn="base" latinLnBrk="0" hangingPunct="1">
+                <a:lnSpc>
+                  <a:spcPct val="100000"/>
+                </a:lnSpc>
+                <a:spcBef>
+                  <a:spcPct val="50000"/>
+                </a:spcBef>
+                <a:spcAft>
+                  <a:spcPct val="0"/>
+                </a:spcAft>
+                <a:buClr>
+                  <a:srgbClr val="F0AB00"/>
+                </a:buClr>
+                <a:buSzPct val="80000"/>
+                <a:tabLst/>
+              </a:pPr>
+              <a:endParaRPr kumimoji="0" lang="en-US" sz="1800" b="0" i="0" u="none" strike="noStrike" kern="0" cap="none" spc="0" normalizeH="0" baseline="0" noProof="0" dirty="0" err="1">
+                <a:ln>
+                  <a:noFill/>
+                </a:ln>
+                <a:effectLst/>
+                <a:uLnTx/>
+                <a:uFillTx/>
+                <a:ea typeface="Arial Unicode MS" pitchFamily="34" charset="-128"/>
+                <a:cs typeface="Arial Unicode MS" pitchFamily="34" charset="-128"/>
+              </a:endParaRPr>
+            </a:p>
+          </p:txBody>
+        </p:sp>
+        <p:sp>
+          <p:nvSpPr>
+            <p:cNvPr id="4" name="Rectangle 3"/>
+            <p:cNvSpPr/>
+            <p:nvPr/>
+          </p:nvSpPr>
+          <p:spPr bwMode="gray">
+            <a:xfrm>
+              <a:off x="2989653" y="3164976"/>
+              <a:ext cx="1627931" cy="1156258"/>
+            </a:xfrm>
+            <a:prstGeom prst="rect">
+              <a:avLst/>
+            </a:prstGeom>
+            <a:solidFill>
+              <a:schemeClr val="accent4"/>
+            </a:solidFill>
+            <a:ln>
+              <a:headEnd/>
+              <a:tailEnd/>
+            </a:ln>
+          </p:spPr>
+          <p:style>
+            <a:lnRef idx="2">
+              <a:schemeClr val="accent2"/>
+            </a:lnRef>
+            <a:fillRef idx="1">
+              <a:schemeClr val="lt1"/>
+            </a:fillRef>
+            <a:effectRef idx="0">
+              <a:schemeClr val="accent2"/>
+            </a:effectRef>
+            <a:fontRef idx="minor">
+              <a:schemeClr val="dk1"/>
+            </a:fontRef>
+          </p:style>
+          <p:txBody>
+            <a:bodyPr lIns="90000" tIns="72000" rIns="90000" bIns="72000" rtlCol="0" anchor="ctr"/>
+            <a:lstStyle/>
+            <a:p>
+              <a:pPr marR="0" algn="ctr" defTabSz="914400" eaLnBrk="1" fontAlgn="base" latinLnBrk="0" hangingPunct="1">
+                <a:lnSpc>
+                  <a:spcPct val="100000"/>
+                </a:lnSpc>
+                <a:spcBef>
+                  <a:spcPct val="50000"/>
+                </a:spcBef>
+                <a:spcAft>
+                  <a:spcPct val="0"/>
+                </a:spcAft>
+                <a:buClr>
+                  <a:srgbClr val="F0AB00"/>
+                </a:buClr>
+                <a:buSzPct val="80000"/>
+                <a:tabLst/>
+              </a:pPr>
+              <a:r>
+                <a:rPr lang="de-DE" sz="1800" kern="0" dirty="0" err="1">
+                  <a:ea typeface="Arial Unicode MS" pitchFamily="34" charset="-128"/>
+                  <a:cs typeface="Arial Unicode MS" pitchFamily="34" charset="-128"/>
+                </a:rPr>
+                <a:t>nginx</a:t>
+              </a:r>
+              <a:endParaRPr kumimoji="0" lang="de-DE" sz="1800" b="0" i="0" u="none" strike="noStrike" kern="0" cap="none" spc="0" normalizeH="0" baseline="0" noProof="0" dirty="0">
+                <a:ln>
+                  <a:noFill/>
+                </a:ln>
+                <a:effectLst/>
+                <a:uLnTx/>
+                <a:uFillTx/>
+                <a:ea typeface="Arial Unicode MS" pitchFamily="34" charset="-128"/>
+                <a:cs typeface="Arial Unicode MS" pitchFamily="34" charset="-128"/>
+              </a:endParaRPr>
+            </a:p>
+          </p:txBody>
+        </p:sp>
+        <p:sp>
+          <p:nvSpPr>
+            <p:cNvPr id="6" name="Rectangle 5"/>
+            <p:cNvSpPr/>
+            <p:nvPr/>
+          </p:nvSpPr>
+          <p:spPr bwMode="gray">
+            <a:xfrm>
+              <a:off x="6855115" y="3164976"/>
+              <a:ext cx="1627931" cy="1156258"/>
+            </a:xfrm>
+            <a:prstGeom prst="rect">
+              <a:avLst/>
+            </a:prstGeom>
+            <a:solidFill>
+              <a:schemeClr val="bg2"/>
+            </a:solidFill>
+            <a:ln>
+              <a:headEnd/>
+              <a:tailEnd/>
+            </a:ln>
+          </p:spPr>
+          <p:style>
+            <a:lnRef idx="2">
+              <a:schemeClr val="accent2"/>
+            </a:lnRef>
+            <a:fillRef idx="1">
+              <a:schemeClr val="lt1"/>
+            </a:fillRef>
+            <a:effectRef idx="0">
+              <a:schemeClr val="accent2"/>
+            </a:effectRef>
+            <a:fontRef idx="minor">
+              <a:schemeClr val="dk1"/>
+            </a:fontRef>
+          </p:style>
+          <p:txBody>
+            <a:bodyPr lIns="90000" tIns="72000" rIns="90000" bIns="72000" rtlCol="0" anchor="ctr"/>
+            <a:lstStyle/>
+            <a:p>
+              <a:pPr marR="0" algn="ctr" defTabSz="914400" eaLnBrk="1" fontAlgn="base" latinLnBrk="0" hangingPunct="1">
+                <a:lnSpc>
+                  <a:spcPct val="100000"/>
+                </a:lnSpc>
+                <a:spcBef>
+                  <a:spcPct val="50000"/>
+                </a:spcBef>
+                <a:spcAft>
+                  <a:spcPct val="0"/>
+                </a:spcAft>
+                <a:buClr>
+                  <a:srgbClr val="F0AB00"/>
+                </a:buClr>
+                <a:buSzPct val="80000"/>
+                <a:tabLst/>
+              </a:pPr>
+              <a:r>
+                <a:rPr lang="de-DE" sz="1800" kern="0" dirty="0" err="1">
+                  <a:ea typeface="Arial Unicode MS" pitchFamily="34" charset="-128"/>
+                  <a:cs typeface="Arial Unicode MS" pitchFamily="34" charset="-128"/>
+                </a:rPr>
+                <a:t>nginx</a:t>
+              </a:r>
+              <a:endParaRPr kumimoji="0" lang="de-DE" sz="1800" b="0" i="0" u="none" strike="noStrike" kern="0" cap="none" spc="0" normalizeH="0" baseline="0" noProof="0" dirty="0">
+                <a:ln>
+                  <a:noFill/>
+                </a:ln>
+                <a:effectLst/>
+                <a:uLnTx/>
+                <a:uFillTx/>
+                <a:ea typeface="Arial Unicode MS" pitchFamily="34" charset="-128"/>
+                <a:cs typeface="Arial Unicode MS" pitchFamily="34" charset="-128"/>
+              </a:endParaRPr>
+            </a:p>
+          </p:txBody>
+        </p:sp>
+        <p:sp>
+          <p:nvSpPr>
+            <p:cNvPr id="7" name="Rectangle 6"/>
+            <p:cNvSpPr/>
+            <p:nvPr/>
+          </p:nvSpPr>
+          <p:spPr bwMode="gray">
+            <a:xfrm>
+              <a:off x="4922384" y="3164976"/>
+              <a:ext cx="1627931" cy="1156258"/>
+            </a:xfrm>
+            <a:prstGeom prst="rect">
+              <a:avLst/>
+            </a:prstGeom>
+            <a:solidFill>
+              <a:schemeClr val="bg2"/>
+            </a:solidFill>
+            <a:ln>
+              <a:headEnd/>
+              <a:tailEnd/>
+            </a:ln>
+          </p:spPr>
+          <p:style>
+            <a:lnRef idx="2">
+              <a:schemeClr val="accent2"/>
+            </a:lnRef>
+            <a:fillRef idx="1">
+              <a:schemeClr val="lt1"/>
+            </a:fillRef>
+            <a:effectRef idx="0">
+              <a:schemeClr val="accent2"/>
+            </a:effectRef>
+            <a:fontRef idx="minor">
+              <a:schemeClr val="dk1"/>
+            </a:fontRef>
+          </p:style>
+          <p:txBody>
+            <a:bodyPr lIns="90000" tIns="72000" rIns="90000" bIns="72000" rtlCol="0" anchor="ctr"/>
+            <a:lstStyle/>
+            <a:p>
+              <a:pPr marR="0" algn="ctr" defTabSz="914400" eaLnBrk="1" fontAlgn="base" latinLnBrk="0" hangingPunct="1">
+                <a:lnSpc>
+                  <a:spcPct val="100000"/>
+                </a:lnSpc>
+                <a:spcBef>
+                  <a:spcPct val="50000"/>
+                </a:spcBef>
+                <a:spcAft>
+                  <a:spcPct val="0"/>
+                </a:spcAft>
+                <a:buClr>
+                  <a:srgbClr val="F0AB00"/>
+                </a:buClr>
+                <a:buSzPct val="80000"/>
+                <a:tabLst/>
+              </a:pPr>
+              <a:r>
+                <a:rPr lang="de-DE" sz="1800" kern="0" dirty="0" err="1">
+                  <a:ea typeface="Arial Unicode MS" pitchFamily="34" charset="-128"/>
+                  <a:cs typeface="Arial Unicode MS" pitchFamily="34" charset="-128"/>
+                </a:rPr>
+                <a:t>nginx</a:t>
+              </a:r>
+              <a:endParaRPr kumimoji="0" lang="de-DE" sz="1800" b="0" i="0" u="none" strike="noStrike" kern="0" cap="none" spc="0" normalizeH="0" baseline="0" noProof="0" dirty="0">
+                <a:ln>
+                  <a:noFill/>
+                </a:ln>
+                <a:effectLst/>
+                <a:uLnTx/>
+                <a:uFillTx/>
+                <a:ea typeface="Arial Unicode MS" pitchFamily="34" charset="-128"/>
+                <a:cs typeface="Arial Unicode MS" pitchFamily="34" charset="-128"/>
+              </a:endParaRPr>
+            </a:p>
+          </p:txBody>
+        </p:sp>
+      </p:grpSp>
+      <p:grpSp>
+        <p:nvGrpSpPr>
+          <p:cNvPr id="15" name="Group 14"/>
+          <p:cNvGrpSpPr/>
+          <p:nvPr/>
+        </p:nvGrpSpPr>
+        <p:grpSpPr>
+          <a:xfrm>
+            <a:off x="3482340" y="5176656"/>
+            <a:ext cx="4572000" cy="1363980"/>
+            <a:chOff x="3421380" y="5067300"/>
+            <a:chExt cx="4572000" cy="1363980"/>
+          </a:xfrm>
+        </p:grpSpPr>
+        <p:sp>
+          <p:nvSpPr>
+            <p:cNvPr id="14" name="Rectangle: Rounded Corners 13"/>
+            <p:cNvSpPr/>
+            <p:nvPr/>
+          </p:nvSpPr>
+          <p:spPr bwMode="gray">
+            <a:xfrm>
+              <a:off x="3421380" y="5067300"/>
+              <a:ext cx="4572000" cy="1363980"/>
+            </a:xfrm>
+            <a:prstGeom prst="roundRect">
+              <a:avLst/>
+            </a:prstGeom>
+            <a:ln>
+              <a:headEnd/>
+              <a:tailEnd/>
+            </a:ln>
+          </p:spPr>
+          <p:style>
+            <a:lnRef idx="2">
+              <a:schemeClr val="accent1"/>
+            </a:lnRef>
+            <a:fillRef idx="1">
+              <a:schemeClr val="lt1"/>
+            </a:fillRef>
+            <a:effectRef idx="0">
+              <a:schemeClr val="accent1"/>
+            </a:effectRef>
+            <a:fontRef idx="minor">
+              <a:schemeClr val="dk1"/>
+            </a:fontRef>
+          </p:style>
+          <p:txBody>
+            <a:bodyPr lIns="90000" tIns="72000" rIns="90000" bIns="72000" rtlCol="0" anchor="ctr"/>
+            <a:lstStyle/>
+            <a:p>
+              <a:pPr marR="0" algn="ctr" defTabSz="914400" eaLnBrk="1" fontAlgn="base" latinLnBrk="0" hangingPunct="1">
+                <a:lnSpc>
+                  <a:spcPct val="100000"/>
+                </a:lnSpc>
+                <a:spcBef>
+                  <a:spcPct val="50000"/>
+                </a:spcBef>
+                <a:spcAft>
+                  <a:spcPct val="0"/>
+                </a:spcAft>
+                <a:buClr>
+                  <a:srgbClr val="F0AB00"/>
+                </a:buClr>
+                <a:buSzPct val="80000"/>
+                <a:tabLst/>
+              </a:pPr>
+              <a:endParaRPr kumimoji="0" lang="en-US" sz="1800" b="0" i="0" u="none" strike="noStrike" kern="0" cap="none" spc="0" normalizeH="0" baseline="0" noProof="0" dirty="0" err="1">
+                <a:ln>
+                  <a:noFill/>
+                </a:ln>
+                <a:effectLst/>
+                <a:uLnTx/>
+                <a:uFillTx/>
+                <a:ea typeface="Arial Unicode MS" pitchFamily="34" charset="-128"/>
+                <a:cs typeface="Arial Unicode MS" pitchFamily="34" charset="-128"/>
+              </a:endParaRPr>
+            </a:p>
+          </p:txBody>
+        </p:sp>
+        <p:sp>
+          <p:nvSpPr>
+            <p:cNvPr id="8" name="Cylinder 7"/>
+            <p:cNvSpPr/>
+            <p:nvPr/>
+          </p:nvSpPr>
+          <p:spPr bwMode="gray">
+            <a:xfrm>
+              <a:off x="3946888" y="5248563"/>
+              <a:ext cx="998220" cy="1004248"/>
+            </a:xfrm>
+            <a:prstGeom prst="can">
+              <a:avLst/>
+            </a:prstGeom>
+            <a:ln>
+              <a:headEnd/>
+              <a:tailEnd/>
+            </a:ln>
+          </p:spPr>
+          <p:style>
+            <a:lnRef idx="2">
+              <a:schemeClr val="accent2"/>
+            </a:lnRef>
+            <a:fillRef idx="1">
+              <a:schemeClr val="lt1"/>
+            </a:fillRef>
+            <a:effectRef idx="0">
+              <a:schemeClr val="accent2"/>
+            </a:effectRef>
+            <a:fontRef idx="minor">
+              <a:schemeClr val="dk1"/>
+            </a:fontRef>
+          </p:style>
+          <p:txBody>
+            <a:bodyPr lIns="90000" tIns="72000" rIns="90000" bIns="72000" rtlCol="0" anchor="ctr"/>
+            <a:lstStyle/>
+            <a:p>
+              <a:pPr marR="0" algn="ctr" defTabSz="914400" eaLnBrk="1" fontAlgn="base" latinLnBrk="0" hangingPunct="1">
+                <a:lnSpc>
+                  <a:spcPct val="100000"/>
+                </a:lnSpc>
+                <a:spcBef>
+                  <a:spcPct val="50000"/>
+                </a:spcBef>
+                <a:spcAft>
+                  <a:spcPct val="0"/>
+                </a:spcAft>
+                <a:buClr>
+                  <a:srgbClr val="F0AB00"/>
+                </a:buClr>
+                <a:buSzPct val="80000"/>
+                <a:tabLst/>
+              </a:pPr>
+              <a:r>
+                <a:rPr kumimoji="0" lang="de-DE" sz="1800" b="0" i="0" u="none" strike="noStrike" kern="0" cap="none" spc="0" normalizeH="0" baseline="0" noProof="0" dirty="0" err="1">
+                  <a:ln>
+                    <a:noFill/>
+                  </a:ln>
+                  <a:effectLst/>
+                  <a:uLnTx/>
+                  <a:uFillTx/>
+                  <a:ea typeface="Arial Unicode MS" pitchFamily="34" charset="-128"/>
+                  <a:cs typeface="Arial Unicode MS" pitchFamily="34" charset="-128"/>
+                </a:rPr>
+                <a:t>content</a:t>
+              </a:r>
+              <a:endParaRPr kumimoji="0" lang="de-DE" sz="1800" b="0" i="0" u="none" strike="noStrike" kern="0" cap="none" spc="0" normalizeH="0" baseline="0" noProof="0" dirty="0">
+                <a:ln>
+                  <a:noFill/>
+                </a:ln>
+                <a:effectLst/>
+                <a:uLnTx/>
+                <a:uFillTx/>
+                <a:ea typeface="Arial Unicode MS" pitchFamily="34" charset="-128"/>
+                <a:cs typeface="Arial Unicode MS" pitchFamily="34" charset="-128"/>
+              </a:endParaRPr>
+            </a:p>
+          </p:txBody>
+        </p:sp>
+        <p:sp>
+          <p:nvSpPr>
+            <p:cNvPr id="9" name="Cylinder 8"/>
+            <p:cNvSpPr/>
+            <p:nvPr/>
+          </p:nvSpPr>
+          <p:spPr bwMode="gray">
+            <a:xfrm>
+              <a:off x="5214379" y="5248563"/>
+              <a:ext cx="998220" cy="1004248"/>
+            </a:xfrm>
+            <a:prstGeom prst="can">
+              <a:avLst/>
+            </a:prstGeom>
+            <a:ln>
+              <a:headEnd/>
+              <a:tailEnd/>
+            </a:ln>
+          </p:spPr>
+          <p:style>
+            <a:lnRef idx="2">
+              <a:schemeClr val="accent2"/>
+            </a:lnRef>
+            <a:fillRef idx="1">
+              <a:schemeClr val="lt1"/>
+            </a:fillRef>
+            <a:effectRef idx="0">
+              <a:schemeClr val="accent2"/>
+            </a:effectRef>
+            <a:fontRef idx="minor">
+              <a:schemeClr val="dk1"/>
+            </a:fontRef>
+          </p:style>
+          <p:txBody>
+            <a:bodyPr lIns="90000" tIns="72000" rIns="90000" bIns="72000" rtlCol="0" anchor="ctr"/>
+            <a:lstStyle/>
+            <a:p>
+              <a:pPr marR="0" algn="ctr" defTabSz="914400" eaLnBrk="1" fontAlgn="base" latinLnBrk="0" hangingPunct="1">
+                <a:lnSpc>
+                  <a:spcPct val="100000"/>
+                </a:lnSpc>
+                <a:spcBef>
+                  <a:spcPct val="50000"/>
+                </a:spcBef>
+                <a:spcAft>
+                  <a:spcPct val="0"/>
+                </a:spcAft>
+                <a:buClr>
+                  <a:srgbClr val="F0AB00"/>
+                </a:buClr>
+                <a:buSzPct val="80000"/>
+                <a:tabLst/>
+              </a:pPr>
+              <a:r>
+                <a:rPr kumimoji="0" lang="de-DE" sz="1800" b="0" i="0" u="none" strike="noStrike" kern="0" cap="none" spc="0" normalizeH="0" baseline="0" noProof="0" dirty="0" err="1">
+                  <a:ln>
+                    <a:noFill/>
+                  </a:ln>
+                  <a:effectLst/>
+                  <a:uLnTx/>
+                  <a:uFillTx/>
+                  <a:ea typeface="Arial Unicode MS" pitchFamily="34" charset="-128"/>
+                  <a:cs typeface="Arial Unicode MS" pitchFamily="34" charset="-128"/>
+                </a:rPr>
+                <a:t>config</a:t>
+              </a:r>
+              <a:endParaRPr kumimoji="0" lang="de-DE" sz="1800" b="0" i="0" u="none" strike="noStrike" kern="0" cap="none" spc="0" normalizeH="0" baseline="0" noProof="0" dirty="0">
+                <a:ln>
+                  <a:noFill/>
+                </a:ln>
+                <a:effectLst/>
+                <a:uLnTx/>
+                <a:uFillTx/>
+                <a:ea typeface="Arial Unicode MS" pitchFamily="34" charset="-128"/>
+                <a:cs typeface="Arial Unicode MS" pitchFamily="34" charset="-128"/>
+              </a:endParaRPr>
+            </a:p>
+          </p:txBody>
+        </p:sp>
+        <p:sp>
+          <p:nvSpPr>
+            <p:cNvPr id="10" name="Cylinder 9"/>
+            <p:cNvSpPr/>
+            <p:nvPr/>
+          </p:nvSpPr>
+          <p:spPr bwMode="gray">
+            <a:xfrm>
+              <a:off x="6481870" y="5248563"/>
+              <a:ext cx="998220" cy="1004248"/>
+            </a:xfrm>
+            <a:prstGeom prst="can">
+              <a:avLst/>
+            </a:prstGeom>
+            <a:ln>
+              <a:headEnd/>
+              <a:tailEnd/>
+            </a:ln>
+          </p:spPr>
+          <p:style>
+            <a:lnRef idx="2">
+              <a:schemeClr val="accent2"/>
+            </a:lnRef>
+            <a:fillRef idx="1">
+              <a:schemeClr val="lt1"/>
+            </a:fillRef>
+            <a:effectRef idx="0">
+              <a:schemeClr val="accent2"/>
+            </a:effectRef>
+            <a:fontRef idx="minor">
+              <a:schemeClr val="dk1"/>
+            </a:fontRef>
+          </p:style>
+          <p:txBody>
+            <a:bodyPr lIns="90000" tIns="72000" rIns="90000" bIns="72000" rtlCol="0" anchor="ctr"/>
+            <a:lstStyle/>
+            <a:p>
+              <a:pPr marR="0" algn="ctr" defTabSz="914400" eaLnBrk="1" fontAlgn="base" latinLnBrk="0" hangingPunct="1">
+                <a:lnSpc>
+                  <a:spcPct val="100000"/>
+                </a:lnSpc>
+                <a:spcBef>
+                  <a:spcPct val="50000"/>
+                </a:spcBef>
+                <a:spcAft>
+                  <a:spcPct val="0"/>
+                </a:spcAft>
+                <a:buClr>
+                  <a:srgbClr val="F0AB00"/>
+                </a:buClr>
+                <a:buSzPct val="80000"/>
+                <a:tabLst/>
+              </a:pPr>
+              <a:r>
+                <a:rPr lang="de-DE" sz="1800" kern="0" dirty="0" err="1">
+                  <a:ea typeface="Arial Unicode MS" pitchFamily="34" charset="-128"/>
+                  <a:cs typeface="Arial Unicode MS" pitchFamily="34" charset="-128"/>
+                </a:rPr>
+                <a:t>tls</a:t>
+              </a:r>
+              <a:r>
+                <a:rPr lang="de-DE" sz="1800" kern="0" dirty="0">
+                  <a:ea typeface="Arial Unicode MS" pitchFamily="34" charset="-128"/>
+                  <a:cs typeface="Arial Unicode MS" pitchFamily="34" charset="-128"/>
+                </a:rPr>
+                <a:t> </a:t>
+              </a:r>
+              <a:r>
+                <a:rPr lang="de-DE" sz="1800" kern="0" dirty="0" err="1">
+                  <a:ea typeface="Arial Unicode MS" pitchFamily="34" charset="-128"/>
+                  <a:cs typeface="Arial Unicode MS" pitchFamily="34" charset="-128"/>
+                </a:rPr>
+                <a:t>certs</a:t>
+              </a:r>
+              <a:endParaRPr kumimoji="0" lang="de-DE" sz="1800" b="0" i="0" u="none" strike="noStrike" kern="0" cap="none" spc="0" normalizeH="0" baseline="0" noProof="0" dirty="0">
+                <a:ln>
+                  <a:noFill/>
+                </a:ln>
+                <a:effectLst/>
+                <a:uLnTx/>
+                <a:uFillTx/>
+                <a:ea typeface="Arial Unicode MS" pitchFamily="34" charset="-128"/>
+                <a:cs typeface="Arial Unicode MS" pitchFamily="34" charset="-128"/>
+              </a:endParaRPr>
+            </a:p>
+          </p:txBody>
+        </p:sp>
+      </p:grpSp>
+      <p:sp>
+        <p:nvSpPr>
+          <p:cNvPr id="16" name="Arrow: Up-Down 15"/>
+          <p:cNvSpPr/>
+          <p:nvPr/>
+        </p:nvSpPr>
+        <p:spPr bwMode="gray">
+          <a:xfrm>
+            <a:off x="5657231" y="4400550"/>
+            <a:ext cx="222219" cy="845820"/>
+          </a:xfrm>
+          <a:prstGeom prst="upDownArrow">
+            <a:avLst/>
+          </a:prstGeom>
+          <a:solidFill>
+            <a:schemeClr val="accent1"/>
+          </a:solidFill>
+          <a:ln w="6350" algn="ctr">
+            <a:noFill/>
+            <a:miter lim="800000"/>
+            <a:headEnd/>
+            <a:tailEnd/>
+          </a:ln>
+        </p:spPr>
+        <p:txBody>
+          <a:bodyPr lIns="90000" tIns="72000" rIns="90000" bIns="72000" rtlCol="0" anchor="ctr"/>
+          <a:lstStyle/>
+          <a:p>
+            <a:pPr marR="0" algn="ctr" defTabSz="914400" eaLnBrk="1" fontAlgn="base" latinLnBrk="0" hangingPunct="1">
+              <a:lnSpc>
+                <a:spcPct val="100000"/>
+              </a:lnSpc>
+              <a:spcBef>
+                <a:spcPct val="50000"/>
+              </a:spcBef>
+              <a:spcAft>
+                <a:spcPct val="0"/>
+              </a:spcAft>
+              <a:buClr>
+                <a:srgbClr val="F0AB00"/>
+              </a:buClr>
+              <a:buSzPct val="80000"/>
+              <a:tabLst/>
+            </a:pPr>
+            <a:endParaRPr kumimoji="0" lang="en-US" sz="1800" b="0" i="0" u="none" strike="noStrike" kern="0" cap="none" spc="0" normalizeH="0" baseline="0" noProof="0" dirty="0" err="1">
+              <a:ln>
+                <a:noFill/>
+              </a:ln>
+              <a:effectLst/>
+              <a:uLnTx/>
+              <a:uFillTx/>
+              <a:ea typeface="Arial Unicode MS" pitchFamily="34" charset="-128"/>
+              <a:cs typeface="Arial Unicode MS" pitchFamily="34" charset="-128"/>
+            </a:endParaRPr>
+          </a:p>
+        </p:txBody>
+      </p:sp>
+      <p:sp>
+        <p:nvSpPr>
+          <p:cNvPr id="17" name="Cloud 16"/>
+          <p:cNvSpPr/>
+          <p:nvPr/>
+        </p:nvSpPr>
+        <p:spPr bwMode="gray">
+          <a:xfrm>
+            <a:off x="4077319" y="1126276"/>
+            <a:ext cx="3382042" cy="914400"/>
+          </a:xfrm>
+          <a:prstGeom prst="cloud">
+            <a:avLst/>
+          </a:prstGeom>
+          <a:solidFill>
+            <a:schemeClr val="accent1"/>
+          </a:solidFill>
+          <a:ln w="6350" algn="ctr">
+            <a:noFill/>
+            <a:miter lim="800000"/>
+            <a:headEnd/>
+            <a:tailEnd/>
+          </a:ln>
+        </p:spPr>
+        <p:txBody>
+          <a:bodyPr lIns="90000" tIns="72000" rIns="90000" bIns="72000" rtlCol="0" anchor="ctr"/>
+          <a:lstStyle/>
+          <a:p>
+            <a:pPr marR="0" algn="ctr" defTabSz="914400" eaLnBrk="1" fontAlgn="base" latinLnBrk="0" hangingPunct="1">
+              <a:lnSpc>
+                <a:spcPct val="100000"/>
+              </a:lnSpc>
+              <a:spcBef>
+                <a:spcPct val="50000"/>
+              </a:spcBef>
+              <a:spcAft>
+                <a:spcPct val="0"/>
+              </a:spcAft>
+              <a:buClr>
+                <a:srgbClr val="F0AB00"/>
+              </a:buClr>
+              <a:buSzPct val="80000"/>
+              <a:tabLst/>
+            </a:pPr>
+            <a:endParaRPr kumimoji="0" lang="en-US" sz="1800" b="0" i="0" u="none" strike="noStrike" kern="0" cap="none" spc="0" normalizeH="0" baseline="0" noProof="0" dirty="0" err="1">
+              <a:ln>
+                <a:noFill/>
+              </a:ln>
+              <a:effectLst/>
+              <a:uLnTx/>
+              <a:uFillTx/>
+              <a:ea typeface="Arial Unicode MS" pitchFamily="34" charset="-128"/>
+              <a:cs typeface="Arial Unicode MS" pitchFamily="34" charset="-128"/>
+            </a:endParaRPr>
+          </a:p>
+        </p:txBody>
+      </p:sp>
+      <p:sp>
+        <p:nvSpPr>
+          <p:cNvPr id="18" name="Arrow: Up-Down 17"/>
+          <p:cNvSpPr/>
+          <p:nvPr/>
+        </p:nvSpPr>
+        <p:spPr bwMode="gray">
+          <a:xfrm>
+            <a:off x="5657231" y="2071898"/>
+            <a:ext cx="222219" cy="845820"/>
+          </a:xfrm>
+          <a:prstGeom prst="upDownArrow">
+            <a:avLst/>
+          </a:prstGeom>
+          <a:solidFill>
+            <a:schemeClr val="accent1"/>
+          </a:solidFill>
+          <a:ln w="6350" algn="ctr">
+            <a:noFill/>
+            <a:miter lim="800000"/>
+            <a:headEnd/>
+            <a:tailEnd/>
+          </a:ln>
+        </p:spPr>
+        <p:txBody>
+          <a:bodyPr lIns="90000" tIns="72000" rIns="90000" bIns="72000" rtlCol="0" anchor="ctr"/>
+          <a:lstStyle/>
+          <a:p>
+            <a:pPr marR="0" algn="ctr" defTabSz="914400" eaLnBrk="1" fontAlgn="base" latinLnBrk="0" hangingPunct="1">
+              <a:lnSpc>
+                <a:spcPct val="100000"/>
+              </a:lnSpc>
+              <a:spcBef>
+                <a:spcPct val="50000"/>
+              </a:spcBef>
+              <a:spcAft>
+                <a:spcPct val="0"/>
+              </a:spcAft>
+              <a:buClr>
+                <a:srgbClr val="F0AB00"/>
+              </a:buClr>
+              <a:buSzPct val="80000"/>
+              <a:tabLst/>
+            </a:pPr>
+            <a:endParaRPr kumimoji="0" lang="en-US" sz="1800" b="0" i="0" u="none" strike="noStrike" kern="0" cap="none" spc="0" normalizeH="0" baseline="0" noProof="0" dirty="0" err="1">
+              <a:ln>
+                <a:noFill/>
+              </a:ln>
+              <a:effectLst/>
+              <a:uLnTx/>
+              <a:uFillTx/>
+              <a:ea typeface="Arial Unicode MS" pitchFamily="34" charset="-128"/>
+              <a:cs typeface="Arial Unicode MS" pitchFamily="34" charset="-128"/>
+            </a:endParaRPr>
+          </a:p>
+        </p:txBody>
+      </p:sp>
+    </p:spTree>
+    <p:extLst>
+      <p:ext uri="{BB962C8B-B14F-4D97-AF65-F5344CB8AC3E}">
+        <p14:creationId xmlns:p14="http://schemas.microsoft.com/office/powerpoint/2010/main" val="4085581448"/>
+      </p:ext>
+    </p:extLst>
+  </p:cSld>
+  <p:clrMapOvr>
+    <a:masterClrMapping/>
+  </p:clrMapOvr>
+</p:sld>
+</file>
+
+<file path=ppt/slides/slide11.xml><?xml version="1.0" encoding="utf-8"?>
 <p:sld xmlns:a="http://schemas.openxmlformats.org/drawingml/2006/main" xmlns:r="http://schemas.openxmlformats.org/officeDocument/2006/relationships" xmlns:p="http://schemas.openxmlformats.org/presentationml/2006/main" show="0">
   <p:cSld>
     <p:spTree>
@@ -9791,7 +10805,7 @@
             <a:pPr lvl="1"/>
             <a:r>
               <a:rPr lang="en-US" dirty="0"/>
-              <a:t>Pod phases / status:</a:t>
+              <a:t>Most important pod phases / status:</a:t>
             </a:r>
           </a:p>
           <a:p>
@@ -11096,6 +12110,30 @@
           <a:chExt cx="0" cy="0"/>
         </a:xfrm>
       </p:grpSpPr>
+      <p:pic>
+        <p:nvPicPr>
+          <p:cNvPr id="3" name="Picture 2"/>
+          <p:cNvPicPr>
+            <a:picLocks noChangeAspect="1"/>
+          </p:cNvPicPr>
+          <p:nvPr/>
+        </p:nvPicPr>
+        <p:blipFill>
+          <a:blip r:embed="rId3"/>
+          <a:stretch>
+            <a:fillRect/>
+          </a:stretch>
+        </p:blipFill>
+        <p:spPr>
+          <a:xfrm>
+            <a:off x="504001" y="1116542"/>
+            <a:ext cx="3867974" cy="5120670"/>
+          </a:xfrm>
+          <a:prstGeom prst="rect">
+            <a:avLst/>
+          </a:prstGeom>
+        </p:spPr>
+      </p:pic>
       <p:sp>
         <p:nvSpPr>
           <p:cNvPr id="2" name="Title 1"/>
@@ -11117,7 +12155,7 @@
             </a:r>
             <a:r>
               <a:rPr lang="en-US" b="0" dirty="0">
-                <a:hlinkClick r:id="rId3"/>
+                <a:hlinkClick r:id="rId4"/>
               </a:rPr>
               <a:t>https://kubernetes.io/docs/api-reference/v1.8/#pod-v1-core</a:t>
             </a:r>
@@ -11128,30 +12166,6 @@
           </a:p>
         </p:txBody>
       </p:sp>
-      <p:pic>
-        <p:nvPicPr>
-          <p:cNvPr id="4" name="Picture 3"/>
-          <p:cNvPicPr>
-            <a:picLocks noChangeAspect="1"/>
-          </p:cNvPicPr>
-          <p:nvPr/>
-        </p:nvPicPr>
-        <p:blipFill>
-          <a:blip r:embed="rId4"/>
-          <a:stretch>
-            <a:fillRect/>
-          </a:stretch>
-        </p:blipFill>
-        <p:spPr>
-          <a:xfrm>
-            <a:off x="1520995" y="1116542"/>
-            <a:ext cx="5494887" cy="5074071"/>
-          </a:xfrm>
-          <a:prstGeom prst="rect">
-            <a:avLst/>
-          </a:prstGeom>
-        </p:spPr>
-      </p:pic>
       <p:sp>
         <p:nvSpPr>
           <p:cNvPr id="15" name="Speech Bubble: Rectangle 14"/>
@@ -11264,12 +12278,12 @@
         </p:nvSpPr>
         <p:spPr bwMode="gray">
           <a:xfrm>
-            <a:off x="6831094" y="1932673"/>
-            <a:ext cx="4101737" cy="645064"/>
+            <a:off x="5490755" y="1905960"/>
+            <a:ext cx="5442076" cy="645064"/>
           </a:xfrm>
           <a:prstGeom prst="wedgeRectCallout">
             <a:avLst>
-              <a:gd name="adj1" fmla="val -99389"/>
+              <a:gd name="adj1" fmla="val -84512"/>
               <a:gd name="adj2" fmla="val -21992"/>
             </a:avLst>
           </a:prstGeom>
@@ -11340,13 +12354,13 @@
         </p:nvSpPr>
         <p:spPr bwMode="gray">
           <a:xfrm>
-            <a:off x="7244751" y="3504570"/>
-            <a:ext cx="4101737" cy="1337396"/>
+            <a:off x="5490755" y="2872296"/>
+            <a:ext cx="5442076" cy="1337396"/>
           </a:xfrm>
           <a:prstGeom prst="wedgeRectCallout">
             <a:avLst>
-              <a:gd name="adj1" fmla="val -92595"/>
-              <a:gd name="adj2" fmla="val -61109"/>
+              <a:gd name="adj1" fmla="val -84859"/>
+              <a:gd name="adj2" fmla="val -34045"/>
             </a:avLst>
           </a:prstGeom>
           <a:ln>
@@ -11408,6 +12422,96 @@
           </a:p>
         </p:txBody>
       </p:sp>
+      <p:sp>
+        <p:nvSpPr>
+          <p:cNvPr id="8" name="Speech Bubble: Rectangle 7"/>
+          <p:cNvSpPr/>
+          <p:nvPr/>
+        </p:nvSpPr>
+        <p:spPr bwMode="gray">
+          <a:xfrm>
+            <a:off x="5490755" y="4697372"/>
+            <a:ext cx="5442076" cy="1337396"/>
+          </a:xfrm>
+          <a:prstGeom prst="wedgeRectCallout">
+            <a:avLst>
+              <a:gd name="adj1" fmla="val -86609"/>
+              <a:gd name="adj2" fmla="val -26211"/>
+            </a:avLst>
+          </a:prstGeom>
+          <a:ln>
+            <a:headEnd/>
+            <a:tailEnd/>
+          </a:ln>
+        </p:spPr>
+        <p:style>
+          <a:lnRef idx="2">
+            <a:schemeClr val="accent5"/>
+          </a:lnRef>
+          <a:fillRef idx="1">
+            <a:schemeClr val="lt1"/>
+          </a:fillRef>
+          <a:effectRef idx="0">
+            <a:schemeClr val="accent5"/>
+          </a:effectRef>
+          <a:fontRef idx="minor">
+            <a:schemeClr val="dk1"/>
+          </a:fontRef>
+        </p:style>
+        <p:txBody>
+          <a:bodyPr lIns="90000" tIns="72000" rIns="90000" bIns="72000" rtlCol="0" anchor="ctr"/>
+          <a:lstStyle/>
+          <a:p>
+            <a:pPr marR="0" algn="ctr" defTabSz="914400" eaLnBrk="1" fontAlgn="base" latinLnBrk="0" hangingPunct="1">
+              <a:lnSpc>
+                <a:spcPct val="100000"/>
+              </a:lnSpc>
+              <a:spcBef>
+                <a:spcPct val="50000"/>
+              </a:spcBef>
+              <a:spcAft>
+                <a:spcPct val="0"/>
+              </a:spcAft>
+              <a:buClr>
+                <a:srgbClr val="F0AB00"/>
+              </a:buClr>
+              <a:buSzPct val="80000"/>
+              <a:tabLst/>
+            </a:pPr>
+            <a:r>
+              <a:rPr lang="en-US" sz="1800" kern="0" noProof="0" dirty="0">
+                <a:ea typeface="Arial Unicode MS" pitchFamily="34" charset="-128"/>
+                <a:cs typeface="Arial Unicode MS" pitchFamily="34" charset="-128"/>
+              </a:rPr>
+              <a:t>The </a:t>
+            </a:r>
+            <a:r>
+              <a:rPr lang="en-US" sz="1800" kern="0" noProof="0" dirty="0" err="1">
+                <a:ea typeface="Arial Unicode MS" pitchFamily="34" charset="-128"/>
+                <a:cs typeface="Arial Unicode MS" pitchFamily="34" charset="-128"/>
+              </a:rPr>
+              <a:t>livenessProbe</a:t>
+            </a:r>
+            <a:r>
+              <a:rPr lang="en-US" sz="1800" kern="0" noProof="0" dirty="0">
+                <a:ea typeface="Arial Unicode MS" pitchFamily="34" charset="-128"/>
+                <a:cs typeface="Arial Unicode MS" pitchFamily="34" charset="-128"/>
+              </a:rPr>
+              <a:t> defines a check, to determine, if the pod is in a healthy state</a:t>
+            </a:r>
+            <a:endParaRPr kumimoji="0" lang="en-US" sz="1800" b="0" i="0" u="none" strike="noStrike" kern="0" cap="none" spc="0" normalizeH="0" baseline="0" noProof="0" dirty="0">
+              <a:ln>
+                <a:noFill/>
+              </a:ln>
+              <a:effectLst/>
+              <a:uLnTx/>
+              <a:uFillTx/>
+              <a:ea typeface="Arial Unicode MS" pitchFamily="34" charset="-128"/>
+              <a:cs typeface="Arial Unicode MS" pitchFamily="34" charset="-128"/>
+            </a:endParaRPr>
+          </a:p>
+        </p:txBody>
+      </p:sp>
     </p:spTree>
     <p:extLst>
       <p:ext uri="{BB962C8B-B14F-4D97-AF65-F5344CB8AC3E}">
@@ -11422,6 +12526,496 @@
 </file>
 
 <file path=ppt/slides/slide6.xml><?xml version="1.0" encoding="utf-8"?>
+<p:sld xmlns:a="http://schemas.openxmlformats.org/drawingml/2006/main" xmlns:r="http://schemas.openxmlformats.org/officeDocument/2006/relationships" xmlns:p="http://schemas.openxmlformats.org/presentationml/2006/main">
+  <p:cSld>
+    <p:spTree>
+      <p:nvGrpSpPr>
+        <p:cNvPr id="1" name=""/>
+        <p:cNvGrpSpPr/>
+        <p:nvPr/>
+      </p:nvGrpSpPr>
+      <p:grpSpPr>
+        <a:xfrm>
+          <a:off x="0" y="0"/>
+          <a:ext cx="0" cy="0"/>
+          <a:chOff x="0" y="0"/>
+          <a:chExt cx="0" cy="0"/>
+        </a:xfrm>
+      </p:grpSpPr>
+      <p:sp>
+        <p:nvSpPr>
+          <p:cNvPr id="3" name="Title 2"/>
+          <p:cNvSpPr>
+            <a:spLocks noGrp="1"/>
+          </p:cNvSpPr>
+          <p:nvPr>
+            <p:ph type="title"/>
+          </p:nvPr>
+        </p:nvSpPr>
+        <p:spPr/>
+        <p:txBody>
+          <a:bodyPr/>
+          <a:lstStyle/>
+          <a:p>
+            <a:r>
+              <a:rPr lang="en-US" dirty="0"/>
+              <a:t>Liveness &amp; Readiness Probes</a:t>
+            </a:r>
+          </a:p>
+        </p:txBody>
+      </p:sp>
+      <p:sp>
+        <p:nvSpPr>
+          <p:cNvPr id="4" name="Rectangle 3"/>
+          <p:cNvSpPr/>
+          <p:nvPr/>
+        </p:nvSpPr>
+        <p:spPr bwMode="gray">
+          <a:xfrm>
+            <a:off x="4886151" y="4398607"/>
+            <a:ext cx="2422872" cy="1775537"/>
+          </a:xfrm>
+          <a:prstGeom prst="rect">
+            <a:avLst/>
+          </a:prstGeom>
+          <a:ln>
+            <a:headEnd/>
+            <a:tailEnd/>
+          </a:ln>
+        </p:spPr>
+        <p:style>
+          <a:lnRef idx="2">
+            <a:schemeClr val="accent2">
+              <a:shade val="50000"/>
+            </a:schemeClr>
+          </a:lnRef>
+          <a:fillRef idx="1">
+            <a:schemeClr val="accent2"/>
+          </a:fillRef>
+          <a:effectRef idx="0">
+            <a:schemeClr val="accent2"/>
+          </a:effectRef>
+          <a:fontRef idx="minor">
+            <a:schemeClr val="lt1"/>
+          </a:fontRef>
+        </p:style>
+        <p:txBody>
+          <a:bodyPr lIns="90000" tIns="72000" rIns="90000" bIns="72000" rtlCol="0" anchor="ctr"/>
+          <a:lstStyle/>
+          <a:p>
+            <a:pPr marR="0" algn="ctr" defTabSz="914400" eaLnBrk="1" fontAlgn="base" latinLnBrk="0" hangingPunct="1">
+              <a:lnSpc>
+                <a:spcPct val="100000"/>
+              </a:lnSpc>
+              <a:spcBef>
+                <a:spcPct val="50000"/>
+              </a:spcBef>
+              <a:spcAft>
+                <a:spcPct val="0"/>
+              </a:spcAft>
+              <a:buClr>
+                <a:srgbClr val="F0AB00"/>
+              </a:buClr>
+              <a:buSzPct val="80000"/>
+              <a:tabLst/>
+            </a:pPr>
+            <a:r>
+              <a:rPr lang="de-DE" sz="2800" b="1" kern="0" noProof="0" dirty="0" err="1">
+                <a:ea typeface="Arial Unicode MS" pitchFamily="34" charset="-128"/>
+                <a:cs typeface="Arial Unicode MS" pitchFamily="34" charset="-128"/>
+              </a:rPr>
+              <a:t>nginx-pod</a:t>
+            </a:r>
+            <a:endParaRPr kumimoji="0" lang="de-DE" sz="2800" b="1" i="0" u="none" strike="noStrike" kern="0" cap="none" spc="0" normalizeH="0" baseline="0" noProof="0" dirty="0">
+              <a:ln>
+                <a:noFill/>
+              </a:ln>
+              <a:effectLst/>
+              <a:uLnTx/>
+              <a:uFillTx/>
+              <a:ea typeface="Arial Unicode MS" pitchFamily="34" charset="-128"/>
+              <a:cs typeface="Arial Unicode MS" pitchFamily="34" charset="-128"/>
+            </a:endParaRPr>
+          </a:p>
+        </p:txBody>
+      </p:sp>
+      <p:sp>
+        <p:nvSpPr>
+          <p:cNvPr id="5" name="Speech Bubble: Rectangle 4"/>
+          <p:cNvSpPr/>
+          <p:nvPr/>
+        </p:nvSpPr>
+        <p:spPr bwMode="gray">
+          <a:xfrm>
+            <a:off x="3867149" y="3333751"/>
+            <a:ext cx="1746423" cy="912456"/>
+          </a:xfrm>
+          <a:prstGeom prst="wedgeRectCallout">
+            <a:avLst>
+              <a:gd name="adj1" fmla="val 46475"/>
+              <a:gd name="adj2" fmla="val 98925"/>
+            </a:avLst>
+          </a:prstGeom>
+          <a:solidFill>
+            <a:schemeClr val="accent1"/>
+          </a:solidFill>
+          <a:ln w="6350" algn="ctr">
+            <a:noFill/>
+            <a:miter lim="800000"/>
+            <a:headEnd/>
+            <a:tailEnd/>
+          </a:ln>
+        </p:spPr>
+        <p:txBody>
+          <a:bodyPr lIns="90000" tIns="72000" rIns="90000" bIns="72000" rtlCol="0" anchor="ctr"/>
+          <a:lstStyle/>
+          <a:p>
+            <a:pPr marR="0" algn="ctr" defTabSz="914400" eaLnBrk="1" fontAlgn="base" latinLnBrk="0" hangingPunct="1">
+              <a:lnSpc>
+                <a:spcPct val="100000"/>
+              </a:lnSpc>
+              <a:spcBef>
+                <a:spcPct val="50000"/>
+              </a:spcBef>
+              <a:spcAft>
+                <a:spcPct val="0"/>
+              </a:spcAft>
+              <a:buClr>
+                <a:srgbClr val="F0AB00"/>
+              </a:buClr>
+              <a:buSzPct val="80000"/>
+              <a:tabLst/>
+            </a:pPr>
+            <a:r>
+              <a:rPr kumimoji="0" lang="en-US" sz="1800" b="0" i="0" u="none" strike="noStrike" kern="0" cap="none" spc="0" normalizeH="0" baseline="0" noProof="0" dirty="0">
+                <a:ln>
+                  <a:noFill/>
+                </a:ln>
+                <a:effectLst/>
+                <a:uLnTx/>
+                <a:uFillTx/>
+                <a:ea typeface="Arial Unicode MS" pitchFamily="34" charset="-128"/>
+                <a:cs typeface="Arial Unicode MS" pitchFamily="34" charset="-128"/>
+              </a:rPr>
+              <a:t>HTTP 200 ‘OK’</a:t>
+            </a:r>
+          </a:p>
+        </p:txBody>
+      </p:sp>
+      <p:sp>
+        <p:nvSpPr>
+          <p:cNvPr id="7" name="Speech Bubble: Rectangle 6"/>
+          <p:cNvSpPr/>
+          <p:nvPr/>
+        </p:nvSpPr>
+        <p:spPr bwMode="gray">
+          <a:xfrm>
+            <a:off x="6616786" y="3333751"/>
+            <a:ext cx="1746423" cy="912456"/>
+          </a:xfrm>
+          <a:prstGeom prst="wedgeRectCallout">
+            <a:avLst>
+              <a:gd name="adj1" fmla="val -48425"/>
+              <a:gd name="adj2" fmla="val 98925"/>
+            </a:avLst>
+          </a:prstGeom>
+          <a:solidFill>
+            <a:schemeClr val="accent1"/>
+          </a:solidFill>
+          <a:ln w="6350" algn="ctr">
+            <a:noFill/>
+            <a:miter lim="800000"/>
+            <a:headEnd/>
+            <a:tailEnd/>
+          </a:ln>
+        </p:spPr>
+        <p:txBody>
+          <a:bodyPr lIns="90000" tIns="72000" rIns="90000" bIns="72000" rtlCol="0" anchor="ctr"/>
+          <a:lstStyle/>
+          <a:p>
+            <a:pPr marR="0" algn="ctr" defTabSz="914400" eaLnBrk="1" fontAlgn="base" latinLnBrk="0" hangingPunct="1">
+              <a:lnSpc>
+                <a:spcPct val="100000"/>
+              </a:lnSpc>
+              <a:spcBef>
+                <a:spcPct val="50000"/>
+              </a:spcBef>
+              <a:spcAft>
+                <a:spcPct val="0"/>
+              </a:spcAft>
+              <a:buClr>
+                <a:srgbClr val="F0AB00"/>
+              </a:buClr>
+              <a:buSzPct val="80000"/>
+              <a:tabLst/>
+            </a:pPr>
+            <a:r>
+              <a:rPr lang="en-US" sz="1800" kern="0" dirty="0">
+                <a:ea typeface="Arial Unicode MS" pitchFamily="34" charset="-128"/>
+                <a:cs typeface="Arial Unicode MS" pitchFamily="34" charset="-128"/>
+              </a:rPr>
+              <a:t>i</a:t>
+            </a:r>
+            <a:r>
+              <a:rPr kumimoji="0" lang="en-US" sz="1800" b="0" i="0" u="none" strike="noStrike" kern="0" cap="none" spc="0" normalizeH="0" baseline="0" noProof="0" dirty="0">
+                <a:ln>
+                  <a:noFill/>
+                </a:ln>
+                <a:effectLst/>
+                <a:uLnTx/>
+                <a:uFillTx/>
+                <a:ea typeface="Arial Unicode MS" pitchFamily="34" charset="-128"/>
+                <a:cs typeface="Arial Unicode MS" pitchFamily="34" charset="-128"/>
+              </a:rPr>
+              <a:t>ndex.html</a:t>
+            </a:r>
+          </a:p>
+        </p:txBody>
+      </p:sp>
+      <p:sp>
+        <p:nvSpPr>
+          <p:cNvPr id="8" name="Rectangle 7"/>
+          <p:cNvSpPr/>
+          <p:nvPr/>
+        </p:nvSpPr>
+        <p:spPr bwMode="gray">
+          <a:xfrm>
+            <a:off x="739647" y="1215772"/>
+            <a:ext cx="3127502" cy="1775537"/>
+          </a:xfrm>
+          <a:prstGeom prst="rect">
+            <a:avLst/>
+          </a:prstGeom>
+          <a:ln>
+            <a:headEnd/>
+            <a:tailEnd/>
+          </a:ln>
+        </p:spPr>
+        <p:style>
+          <a:lnRef idx="2">
+            <a:schemeClr val="accent2">
+              <a:shade val="50000"/>
+            </a:schemeClr>
+          </a:lnRef>
+          <a:fillRef idx="1">
+            <a:schemeClr val="accent2"/>
+          </a:fillRef>
+          <a:effectRef idx="0">
+            <a:schemeClr val="accent2"/>
+          </a:effectRef>
+          <a:fontRef idx="minor">
+            <a:schemeClr val="lt1"/>
+          </a:fontRef>
+        </p:style>
+        <p:txBody>
+          <a:bodyPr lIns="90000" tIns="72000" rIns="90000" bIns="72000" rtlCol="0" anchor="ctr"/>
+          <a:lstStyle/>
+          <a:p>
+            <a:pPr marR="0" algn="ctr" defTabSz="914400" eaLnBrk="1" fontAlgn="base" latinLnBrk="0" hangingPunct="1">
+              <a:lnSpc>
+                <a:spcPct val="100000"/>
+              </a:lnSpc>
+              <a:spcBef>
+                <a:spcPct val="50000"/>
+              </a:spcBef>
+              <a:spcAft>
+                <a:spcPct val="0"/>
+              </a:spcAft>
+              <a:buClr>
+                <a:srgbClr val="F0AB00"/>
+              </a:buClr>
+              <a:buSzPct val="80000"/>
+              <a:tabLst/>
+            </a:pPr>
+            <a:r>
+              <a:rPr lang="en-US" sz="2800" b="1" kern="0" dirty="0">
+                <a:ea typeface="Arial Unicode MS" pitchFamily="34" charset="-128"/>
+                <a:cs typeface="Arial Unicode MS" pitchFamily="34" charset="-128"/>
+              </a:rPr>
+              <a:t>Respond with HTTP 200, if you are alive!</a:t>
+            </a:r>
+            <a:endParaRPr kumimoji="0" lang="en-US" sz="2800" b="1" i="0" u="none" strike="noStrike" kern="0" cap="none" spc="0" normalizeH="0" baseline="0" dirty="0">
+              <a:ln>
+                <a:noFill/>
+              </a:ln>
+              <a:effectLst/>
+              <a:uLnTx/>
+              <a:uFillTx/>
+              <a:ea typeface="Arial Unicode MS" pitchFamily="34" charset="-128"/>
+              <a:cs typeface="Arial Unicode MS" pitchFamily="34" charset="-128"/>
+            </a:endParaRPr>
+          </a:p>
+        </p:txBody>
+      </p:sp>
+      <p:sp>
+        <p:nvSpPr>
+          <p:cNvPr id="9" name="Rectangle 8"/>
+          <p:cNvSpPr/>
+          <p:nvPr/>
+        </p:nvSpPr>
+        <p:spPr bwMode="gray">
+          <a:xfrm>
+            <a:off x="8363209" y="1215771"/>
+            <a:ext cx="3127502" cy="1775537"/>
+          </a:xfrm>
+          <a:prstGeom prst="rect">
+            <a:avLst/>
+          </a:prstGeom>
+          <a:ln>
+            <a:headEnd/>
+            <a:tailEnd/>
+          </a:ln>
+        </p:spPr>
+        <p:style>
+          <a:lnRef idx="2">
+            <a:schemeClr val="accent2">
+              <a:shade val="50000"/>
+            </a:schemeClr>
+          </a:lnRef>
+          <a:fillRef idx="1">
+            <a:schemeClr val="accent2"/>
+          </a:fillRef>
+          <a:effectRef idx="0">
+            <a:schemeClr val="accent2"/>
+          </a:effectRef>
+          <a:fontRef idx="minor">
+            <a:schemeClr val="lt1"/>
+          </a:fontRef>
+        </p:style>
+        <p:txBody>
+          <a:bodyPr lIns="90000" tIns="72000" rIns="90000" bIns="72000" rtlCol="0" anchor="ctr"/>
+          <a:lstStyle/>
+          <a:p>
+            <a:pPr marR="0" algn="ctr" defTabSz="914400" eaLnBrk="1" fontAlgn="base" latinLnBrk="0" hangingPunct="1">
+              <a:lnSpc>
+                <a:spcPct val="100000"/>
+              </a:lnSpc>
+              <a:spcBef>
+                <a:spcPct val="50000"/>
+              </a:spcBef>
+              <a:spcAft>
+                <a:spcPct val="0"/>
+              </a:spcAft>
+              <a:buClr>
+                <a:srgbClr val="F0AB00"/>
+              </a:buClr>
+              <a:buSzPct val="80000"/>
+              <a:tabLst/>
+            </a:pPr>
+            <a:r>
+              <a:rPr lang="en-US" sz="2800" b="1" kern="0" dirty="0">
+                <a:ea typeface="Arial Unicode MS" pitchFamily="34" charset="-128"/>
+                <a:cs typeface="Arial Unicode MS" pitchFamily="34" charset="-128"/>
+              </a:rPr>
+              <a:t>Send back the index.html, if you are ready!</a:t>
+            </a:r>
+            <a:endParaRPr kumimoji="0" lang="en-US" sz="2800" b="1" i="0" u="none" strike="noStrike" kern="0" cap="none" spc="0" normalizeH="0" baseline="0" dirty="0">
+              <a:ln>
+                <a:noFill/>
+              </a:ln>
+              <a:effectLst/>
+              <a:uLnTx/>
+              <a:uFillTx/>
+              <a:ea typeface="Arial Unicode MS" pitchFamily="34" charset="-128"/>
+              <a:cs typeface="Arial Unicode MS" pitchFamily="34" charset="-128"/>
+            </a:endParaRPr>
+          </a:p>
+        </p:txBody>
+      </p:sp>
+      <p:cxnSp>
+        <p:nvCxnSpPr>
+          <p:cNvPr id="14" name="Connector: Elbow 13"/>
+          <p:cNvCxnSpPr>
+            <a:stCxn id="8" idx="2"/>
+            <a:endCxn id="4" idx="1"/>
+          </p:cNvCxnSpPr>
+          <p:nvPr/>
+        </p:nvCxnSpPr>
+        <p:spPr>
+          <a:xfrm rot="16200000" flipH="1">
+            <a:off x="2447241" y="2847465"/>
+            <a:ext cx="2295067" cy="2582753"/>
+          </a:xfrm>
+          <a:prstGeom prst="bentConnector2">
+            <a:avLst/>
+          </a:prstGeom>
+          <a:ln w="76200">
+            <a:solidFill>
+              <a:schemeClr val="tx2"/>
+            </a:solidFill>
+            <a:headEnd type="none" w="med" len="med"/>
+            <a:tailEnd type="triangle"/>
+          </a:ln>
+        </p:spPr>
+        <p:style>
+          <a:lnRef idx="1">
+            <a:schemeClr val="accent1"/>
+          </a:lnRef>
+          <a:fillRef idx="0">
+            <a:schemeClr val="accent1"/>
+          </a:fillRef>
+          <a:effectRef idx="0">
+            <a:schemeClr val="accent1"/>
+          </a:effectRef>
+          <a:fontRef idx="minor">
+            <a:schemeClr val="tx1"/>
+          </a:fontRef>
+        </p:style>
+      </p:cxnSp>
+      <p:cxnSp>
+        <p:nvCxnSpPr>
+          <p:cNvPr id="16" name="Connector: Elbow 15"/>
+          <p:cNvCxnSpPr>
+            <a:stCxn id="9" idx="2"/>
+            <a:endCxn id="4" idx="3"/>
+          </p:cNvCxnSpPr>
+          <p:nvPr/>
+        </p:nvCxnSpPr>
+        <p:spPr>
+          <a:xfrm rot="5400000">
+            <a:off x="7470458" y="2829874"/>
+            <a:ext cx="2295068" cy="2617937"/>
+          </a:xfrm>
+          <a:prstGeom prst="bentConnector2">
+            <a:avLst/>
+          </a:prstGeom>
+          <a:ln w="76200">
+            <a:solidFill>
+              <a:schemeClr val="tx2"/>
+            </a:solidFill>
+            <a:headEnd type="none" w="med" len="med"/>
+            <a:tailEnd type="triangle"/>
+          </a:ln>
+        </p:spPr>
+        <p:style>
+          <a:lnRef idx="1">
+            <a:schemeClr val="accent1"/>
+          </a:lnRef>
+          <a:fillRef idx="0">
+            <a:schemeClr val="accent1"/>
+          </a:fillRef>
+          <a:effectRef idx="0">
+            <a:schemeClr val="accent1"/>
+          </a:effectRef>
+          <a:fontRef idx="minor">
+            <a:schemeClr val="tx1"/>
+          </a:fontRef>
+        </p:style>
+      </p:cxnSp>
+    </p:spTree>
+    <p:extLst>
+      <p:ext uri="{BB962C8B-B14F-4D97-AF65-F5344CB8AC3E}">
+        <p14:creationId xmlns:p14="http://schemas.microsoft.com/office/powerpoint/2010/main" val="3826080233"/>
+      </p:ext>
+    </p:extLst>
+  </p:cSld>
+  <p:clrMapOvr>
+    <a:masterClrMapping/>
+  </p:clrMapOvr>
+</p:sld>
+</file>
+
+<file path=ppt/slides/slide7.xml><?xml version="1.0" encoding="utf-8"?>
 <p:sld xmlns:a="http://schemas.openxmlformats.org/drawingml/2006/main" xmlns:r="http://schemas.openxmlformats.org/officeDocument/2006/relationships" xmlns:p="http://schemas.openxmlformats.org/presentationml/2006/main">
   <p:cSld>
     <p:spTree>
@@ -12291,7 +13885,7 @@
 </p:sld>
 </file>
 
-<file path=ppt/slides/slide7.xml><?xml version="1.0" encoding="utf-8"?>
+<file path=ppt/slides/slide8.xml><?xml version="1.0" encoding="utf-8"?>
 <p:sld xmlns:a="http://schemas.openxmlformats.org/drawingml/2006/main" xmlns:r="http://schemas.openxmlformats.org/officeDocument/2006/relationships" xmlns:p="http://schemas.openxmlformats.org/presentationml/2006/main">
   <p:cSld>
     <p:spTree>
@@ -12425,7 +14019,7 @@
 </p:sld>
 </file>
 
-<file path=ppt/slides/slide8.xml><?xml version="1.0" encoding="utf-8"?>
+<file path=ppt/slides/slide9.xml><?xml version="1.0" encoding="utf-8"?>
 <p:sld xmlns:a="http://schemas.openxmlformats.org/drawingml/2006/main" xmlns:r="http://schemas.openxmlformats.org/officeDocument/2006/relationships" xmlns:p="http://schemas.openxmlformats.org/presentationml/2006/main" show="0">
   <p:cSld>
     <p:spTree>
@@ -12452,7 +14046,12 @@
             <p:ph type="body" sz="quarter" idx="10"/>
           </p:nvPr>
         </p:nvSpPr>
-        <p:spPr/>
+        <p:spPr>
+          <a:xfrm>
+            <a:off x="504001" y="1181850"/>
+            <a:ext cx="11185200" cy="4552200"/>
+          </a:xfrm>
+        </p:spPr>
         <p:txBody>
           <a:bodyPr/>
           <a:lstStyle/>
@@ -12502,6 +14101,90 @@
             <a:r>
               <a:rPr lang="en-US" dirty="0"/>
               <a:t> </a:t>
+            </a:r>
+          </a:p>
+          <a:p>
+            <a:pPr marL="342900" indent="-342900">
+              <a:buFontTx/>
+              <a:buChar char="-"/>
+            </a:pPr>
+            <a:r>
+              <a:rPr lang="en-US" dirty="0"/>
+              <a:t>Access </a:t>
+            </a:r>
+            <a:r>
+              <a:rPr lang="en-US" dirty="0" err="1"/>
+              <a:t>nginx</a:t>
+            </a:r>
+            <a:r>
+              <a:rPr lang="en-US" dirty="0"/>
+              <a:t>:</a:t>
+            </a:r>
+          </a:p>
+          <a:p>
+            <a:pPr marL="522864" lvl="1" indent="-342900">
+              <a:buFontTx/>
+              <a:buChar char="-"/>
+            </a:pPr>
+            <a:r>
+              <a:rPr lang="en-US" dirty="0"/>
+              <a:t>Run </a:t>
+            </a:r>
+            <a:r>
+              <a:rPr lang="en-US" dirty="0" err="1"/>
+              <a:t>kubectl</a:t>
+            </a:r>
+            <a:r>
+              <a:rPr lang="en-US" dirty="0"/>
+              <a:t> proxy</a:t>
+            </a:r>
+          </a:p>
+          <a:p>
+            <a:pPr marL="522864" lvl="1" indent="-342900">
+              <a:buFontTx/>
+              <a:buChar char="-"/>
+            </a:pPr>
+            <a:r>
+              <a:rPr lang="en-US" dirty="0"/>
+              <a:t>Open a browser and connect to localhost&lt;proxy-port&gt;/</a:t>
+            </a:r>
+            <a:r>
+              <a:rPr lang="en-US" dirty="0" err="1"/>
+              <a:t>api</a:t>
+            </a:r>
+            <a:r>
+              <a:rPr lang="en-US" dirty="0"/>
+              <a:t>/v1/namespaces/&lt;namespace&gt;/pods/&lt;pod-name&gt;:&lt;port&gt;/proxy</a:t>
+            </a:r>
+          </a:p>
+          <a:p>
+            <a:pPr marL="522864" lvl="1" indent="-342900">
+              <a:buFontTx/>
+              <a:buChar char="-"/>
+            </a:pPr>
+            <a:r>
+              <a:rPr lang="en-US" dirty="0"/>
+              <a:t>Example: </a:t>
+            </a:r>
+            <a:r>
+              <a:rPr lang="en-US" dirty="0">
+                <a:hlinkClick r:id="rId3"/>
+              </a:rPr>
+              <a:t>http://localhost:8001/api/v1/namespaces/pvxka22/pods/nginx-7f7fdf788c-ljmjs:80/proxy/</a:t>
+            </a:r>
+            <a:r>
+              <a:rPr lang="en-US" dirty="0"/>
+              <a:t> </a:t>
+            </a:r>
+          </a:p>
+          <a:p>
+            <a:pPr marL="342900" indent="-342900">
+              <a:buFontTx/>
+              <a:buChar char="-"/>
+            </a:pPr>
+            <a:r>
+              <a:rPr lang="en-US" dirty="0"/>
+              <a:t>Show logs</a:t>
             </a:r>
           </a:p>
         </p:txBody>
@@ -12532,864 +14215,6 @@
     <p:extLst>
       <p:ext uri="{BB962C8B-B14F-4D97-AF65-F5344CB8AC3E}">
         <p14:creationId xmlns:p14="http://schemas.microsoft.com/office/powerpoint/2010/main" val="2631106931"/>
-      </p:ext>
-    </p:extLst>
-  </p:cSld>
-  <p:clrMapOvr>
-    <a:masterClrMapping/>
-  </p:clrMapOvr>
-</p:sld>
-</file>
-
-<file path=ppt/slides/slide9.xml><?xml version="1.0" encoding="utf-8"?>
-<p:sld xmlns:a="http://schemas.openxmlformats.org/drawingml/2006/main" xmlns:r="http://schemas.openxmlformats.org/officeDocument/2006/relationships" xmlns:p="http://schemas.openxmlformats.org/presentationml/2006/main">
-  <p:cSld>
-    <p:spTree>
-      <p:nvGrpSpPr>
-        <p:cNvPr id="1" name=""/>
-        <p:cNvGrpSpPr/>
-        <p:nvPr/>
-      </p:nvGrpSpPr>
-      <p:grpSpPr>
-        <a:xfrm>
-          <a:off x="0" y="0"/>
-          <a:ext cx="0" cy="0"/>
-          <a:chOff x="0" y="0"/>
-          <a:chExt cx="0" cy="0"/>
-        </a:xfrm>
-      </p:grpSpPr>
-      <p:sp>
-        <p:nvSpPr>
-          <p:cNvPr id="3" name="Title 2"/>
-          <p:cNvSpPr>
-            <a:spLocks noGrp="1"/>
-          </p:cNvSpPr>
-          <p:nvPr>
-            <p:ph type="title"/>
-          </p:nvPr>
-        </p:nvSpPr>
-        <p:spPr/>
-        <p:txBody>
-          <a:bodyPr/>
-          <a:lstStyle/>
-          <a:p>
-            <a:r>
-              <a:rPr lang="en-US" dirty="0"/>
-              <a:t>What YOU will do during the next exercise…</a:t>
-            </a:r>
-          </a:p>
-        </p:txBody>
-      </p:sp>
-      <p:grpSp>
-        <p:nvGrpSpPr>
-          <p:cNvPr id="13" name="Group 12"/>
-          <p:cNvGrpSpPr/>
-          <p:nvPr/>
-        </p:nvGrpSpPr>
-        <p:grpSpPr>
-          <a:xfrm>
-            <a:off x="2674620" y="2948940"/>
-            <a:ext cx="6187440" cy="1752600"/>
-            <a:chOff x="2697480" y="2743200"/>
-            <a:chExt cx="6187440" cy="2034540"/>
-          </a:xfrm>
-        </p:grpSpPr>
-        <p:sp>
-          <p:nvSpPr>
-            <p:cNvPr id="12" name="Rectangle: Rounded Corners 11"/>
-            <p:cNvSpPr/>
-            <p:nvPr/>
-          </p:nvSpPr>
-          <p:spPr bwMode="gray">
-            <a:xfrm>
-              <a:off x="2697480" y="2743200"/>
-              <a:ext cx="6187440" cy="2034540"/>
-            </a:xfrm>
-            <a:prstGeom prst="roundRect">
-              <a:avLst/>
-            </a:prstGeom>
-            <a:ln>
-              <a:headEnd/>
-              <a:tailEnd/>
-            </a:ln>
-          </p:spPr>
-          <p:style>
-            <a:lnRef idx="2">
-              <a:schemeClr val="accent1"/>
-            </a:lnRef>
-            <a:fillRef idx="1">
-              <a:schemeClr val="lt1"/>
-            </a:fillRef>
-            <a:effectRef idx="0">
-              <a:schemeClr val="accent1"/>
-            </a:effectRef>
-            <a:fontRef idx="minor">
-              <a:schemeClr val="dk1"/>
-            </a:fontRef>
-          </p:style>
-          <p:txBody>
-            <a:bodyPr lIns="90000" tIns="72000" rIns="90000" bIns="72000" rtlCol="0" anchor="ctr"/>
-            <a:lstStyle/>
-            <a:p>
-              <a:pPr marR="0" algn="ctr" defTabSz="914400" eaLnBrk="1" fontAlgn="base" latinLnBrk="0" hangingPunct="1">
-                <a:lnSpc>
-                  <a:spcPct val="100000"/>
-                </a:lnSpc>
-                <a:spcBef>
-                  <a:spcPct val="50000"/>
-                </a:spcBef>
-                <a:spcAft>
-                  <a:spcPct val="0"/>
-                </a:spcAft>
-                <a:buClr>
-                  <a:srgbClr val="F0AB00"/>
-                </a:buClr>
-                <a:buSzPct val="80000"/>
-                <a:tabLst/>
-              </a:pPr>
-              <a:endParaRPr kumimoji="0" lang="en-US" sz="1800" b="0" i="0" u="none" strike="noStrike" kern="0" cap="none" spc="0" normalizeH="0" baseline="0" noProof="0" dirty="0" err="1">
-                <a:ln>
-                  <a:noFill/>
-                </a:ln>
-                <a:effectLst/>
-                <a:uLnTx/>
-                <a:uFillTx/>
-                <a:ea typeface="Arial Unicode MS" pitchFamily="34" charset="-128"/>
-                <a:cs typeface="Arial Unicode MS" pitchFamily="34" charset="-128"/>
-              </a:endParaRPr>
-            </a:p>
-          </p:txBody>
-        </p:sp>
-        <p:sp>
-          <p:nvSpPr>
-            <p:cNvPr id="4" name="Rectangle 3"/>
-            <p:cNvSpPr/>
-            <p:nvPr/>
-          </p:nvSpPr>
-          <p:spPr bwMode="gray">
-            <a:xfrm>
-              <a:off x="2989653" y="3164976"/>
-              <a:ext cx="1627931" cy="1156258"/>
-            </a:xfrm>
-            <a:prstGeom prst="rect">
-              <a:avLst/>
-            </a:prstGeom>
-            <a:solidFill>
-              <a:schemeClr val="accent4"/>
-            </a:solidFill>
-            <a:ln>
-              <a:headEnd/>
-              <a:tailEnd/>
-            </a:ln>
-          </p:spPr>
-          <p:style>
-            <a:lnRef idx="2">
-              <a:schemeClr val="accent2"/>
-            </a:lnRef>
-            <a:fillRef idx="1">
-              <a:schemeClr val="lt1"/>
-            </a:fillRef>
-            <a:effectRef idx="0">
-              <a:schemeClr val="accent2"/>
-            </a:effectRef>
-            <a:fontRef idx="minor">
-              <a:schemeClr val="dk1"/>
-            </a:fontRef>
-          </p:style>
-          <p:txBody>
-            <a:bodyPr lIns="90000" tIns="72000" rIns="90000" bIns="72000" rtlCol="0" anchor="ctr"/>
-            <a:lstStyle/>
-            <a:p>
-              <a:pPr marR="0" algn="ctr" defTabSz="914400" eaLnBrk="1" fontAlgn="base" latinLnBrk="0" hangingPunct="1">
-                <a:lnSpc>
-                  <a:spcPct val="100000"/>
-                </a:lnSpc>
-                <a:spcBef>
-                  <a:spcPct val="50000"/>
-                </a:spcBef>
-                <a:spcAft>
-                  <a:spcPct val="0"/>
-                </a:spcAft>
-                <a:buClr>
-                  <a:srgbClr val="F0AB00"/>
-                </a:buClr>
-                <a:buSzPct val="80000"/>
-                <a:tabLst/>
-              </a:pPr>
-              <a:r>
-                <a:rPr lang="de-DE" sz="1800" kern="0" dirty="0" err="1">
-                  <a:ea typeface="Arial Unicode MS" pitchFamily="34" charset="-128"/>
-                  <a:cs typeface="Arial Unicode MS" pitchFamily="34" charset="-128"/>
-                </a:rPr>
-                <a:t>nginx</a:t>
-              </a:r>
-              <a:endParaRPr kumimoji="0" lang="de-DE" sz="1800" b="0" i="0" u="none" strike="noStrike" kern="0" cap="none" spc="0" normalizeH="0" baseline="0" noProof="0" dirty="0">
-                <a:ln>
-                  <a:noFill/>
-                </a:ln>
-                <a:effectLst/>
-                <a:uLnTx/>
-                <a:uFillTx/>
-                <a:ea typeface="Arial Unicode MS" pitchFamily="34" charset="-128"/>
-                <a:cs typeface="Arial Unicode MS" pitchFamily="34" charset="-128"/>
-              </a:endParaRPr>
-            </a:p>
-          </p:txBody>
-        </p:sp>
-        <p:sp>
-          <p:nvSpPr>
-            <p:cNvPr id="6" name="Rectangle 5"/>
-            <p:cNvSpPr/>
-            <p:nvPr/>
-          </p:nvSpPr>
-          <p:spPr bwMode="gray">
-            <a:xfrm>
-              <a:off x="6855115" y="3164976"/>
-              <a:ext cx="1627931" cy="1156258"/>
-            </a:xfrm>
-            <a:prstGeom prst="rect">
-              <a:avLst/>
-            </a:prstGeom>
-            <a:solidFill>
-              <a:schemeClr val="bg2"/>
-            </a:solidFill>
-            <a:ln>
-              <a:headEnd/>
-              <a:tailEnd/>
-            </a:ln>
-          </p:spPr>
-          <p:style>
-            <a:lnRef idx="2">
-              <a:schemeClr val="accent2"/>
-            </a:lnRef>
-            <a:fillRef idx="1">
-              <a:schemeClr val="lt1"/>
-            </a:fillRef>
-            <a:effectRef idx="0">
-              <a:schemeClr val="accent2"/>
-            </a:effectRef>
-            <a:fontRef idx="minor">
-              <a:schemeClr val="dk1"/>
-            </a:fontRef>
-          </p:style>
-          <p:txBody>
-            <a:bodyPr lIns="90000" tIns="72000" rIns="90000" bIns="72000" rtlCol="0" anchor="ctr"/>
-            <a:lstStyle/>
-            <a:p>
-              <a:pPr marR="0" algn="ctr" defTabSz="914400" eaLnBrk="1" fontAlgn="base" latinLnBrk="0" hangingPunct="1">
-                <a:lnSpc>
-                  <a:spcPct val="100000"/>
-                </a:lnSpc>
-                <a:spcBef>
-                  <a:spcPct val="50000"/>
-                </a:spcBef>
-                <a:spcAft>
-                  <a:spcPct val="0"/>
-                </a:spcAft>
-                <a:buClr>
-                  <a:srgbClr val="F0AB00"/>
-                </a:buClr>
-                <a:buSzPct val="80000"/>
-                <a:tabLst/>
-              </a:pPr>
-              <a:r>
-                <a:rPr lang="de-DE" sz="1800" kern="0" dirty="0" err="1">
-                  <a:ea typeface="Arial Unicode MS" pitchFamily="34" charset="-128"/>
-                  <a:cs typeface="Arial Unicode MS" pitchFamily="34" charset="-128"/>
-                </a:rPr>
-                <a:t>nginx</a:t>
-              </a:r>
-              <a:endParaRPr kumimoji="0" lang="de-DE" sz="1800" b="0" i="0" u="none" strike="noStrike" kern="0" cap="none" spc="0" normalizeH="0" baseline="0" noProof="0" dirty="0">
-                <a:ln>
-                  <a:noFill/>
-                </a:ln>
-                <a:effectLst/>
-                <a:uLnTx/>
-                <a:uFillTx/>
-                <a:ea typeface="Arial Unicode MS" pitchFamily="34" charset="-128"/>
-                <a:cs typeface="Arial Unicode MS" pitchFamily="34" charset="-128"/>
-              </a:endParaRPr>
-            </a:p>
-          </p:txBody>
-        </p:sp>
-        <p:sp>
-          <p:nvSpPr>
-            <p:cNvPr id="7" name="Rectangle 6"/>
-            <p:cNvSpPr/>
-            <p:nvPr/>
-          </p:nvSpPr>
-          <p:spPr bwMode="gray">
-            <a:xfrm>
-              <a:off x="4922384" y="3164976"/>
-              <a:ext cx="1627931" cy="1156258"/>
-            </a:xfrm>
-            <a:prstGeom prst="rect">
-              <a:avLst/>
-            </a:prstGeom>
-            <a:solidFill>
-              <a:schemeClr val="bg2"/>
-            </a:solidFill>
-            <a:ln>
-              <a:headEnd/>
-              <a:tailEnd/>
-            </a:ln>
-          </p:spPr>
-          <p:style>
-            <a:lnRef idx="2">
-              <a:schemeClr val="accent2"/>
-            </a:lnRef>
-            <a:fillRef idx="1">
-              <a:schemeClr val="lt1"/>
-            </a:fillRef>
-            <a:effectRef idx="0">
-              <a:schemeClr val="accent2"/>
-            </a:effectRef>
-            <a:fontRef idx="minor">
-              <a:schemeClr val="dk1"/>
-            </a:fontRef>
-          </p:style>
-          <p:txBody>
-            <a:bodyPr lIns="90000" tIns="72000" rIns="90000" bIns="72000" rtlCol="0" anchor="ctr"/>
-            <a:lstStyle/>
-            <a:p>
-              <a:pPr marR="0" algn="ctr" defTabSz="914400" eaLnBrk="1" fontAlgn="base" latinLnBrk="0" hangingPunct="1">
-                <a:lnSpc>
-                  <a:spcPct val="100000"/>
-                </a:lnSpc>
-                <a:spcBef>
-                  <a:spcPct val="50000"/>
-                </a:spcBef>
-                <a:spcAft>
-                  <a:spcPct val="0"/>
-                </a:spcAft>
-                <a:buClr>
-                  <a:srgbClr val="F0AB00"/>
-                </a:buClr>
-                <a:buSzPct val="80000"/>
-                <a:tabLst/>
-              </a:pPr>
-              <a:r>
-                <a:rPr lang="de-DE" sz="1800" kern="0" dirty="0" err="1">
-                  <a:ea typeface="Arial Unicode MS" pitchFamily="34" charset="-128"/>
-                  <a:cs typeface="Arial Unicode MS" pitchFamily="34" charset="-128"/>
-                </a:rPr>
-                <a:t>nginx</a:t>
-              </a:r>
-              <a:endParaRPr kumimoji="0" lang="de-DE" sz="1800" b="0" i="0" u="none" strike="noStrike" kern="0" cap="none" spc="0" normalizeH="0" baseline="0" noProof="0" dirty="0">
-                <a:ln>
-                  <a:noFill/>
-                </a:ln>
-                <a:effectLst/>
-                <a:uLnTx/>
-                <a:uFillTx/>
-                <a:ea typeface="Arial Unicode MS" pitchFamily="34" charset="-128"/>
-                <a:cs typeface="Arial Unicode MS" pitchFamily="34" charset="-128"/>
-              </a:endParaRPr>
-            </a:p>
-          </p:txBody>
-        </p:sp>
-      </p:grpSp>
-      <p:grpSp>
-        <p:nvGrpSpPr>
-          <p:cNvPr id="15" name="Group 14"/>
-          <p:cNvGrpSpPr/>
-          <p:nvPr/>
-        </p:nvGrpSpPr>
-        <p:grpSpPr>
-          <a:xfrm>
-            <a:off x="3482340" y="5176656"/>
-            <a:ext cx="4572000" cy="1363980"/>
-            <a:chOff x="3421380" y="5067300"/>
-            <a:chExt cx="4572000" cy="1363980"/>
-          </a:xfrm>
-        </p:grpSpPr>
-        <p:sp>
-          <p:nvSpPr>
-            <p:cNvPr id="14" name="Rectangle: Rounded Corners 13"/>
-            <p:cNvSpPr/>
-            <p:nvPr/>
-          </p:nvSpPr>
-          <p:spPr bwMode="gray">
-            <a:xfrm>
-              <a:off x="3421380" y="5067300"/>
-              <a:ext cx="4572000" cy="1363980"/>
-            </a:xfrm>
-            <a:prstGeom prst="roundRect">
-              <a:avLst/>
-            </a:prstGeom>
-            <a:ln>
-              <a:headEnd/>
-              <a:tailEnd/>
-            </a:ln>
-          </p:spPr>
-          <p:style>
-            <a:lnRef idx="2">
-              <a:schemeClr val="accent1"/>
-            </a:lnRef>
-            <a:fillRef idx="1">
-              <a:schemeClr val="lt1"/>
-            </a:fillRef>
-            <a:effectRef idx="0">
-              <a:schemeClr val="accent1"/>
-            </a:effectRef>
-            <a:fontRef idx="minor">
-              <a:schemeClr val="dk1"/>
-            </a:fontRef>
-          </p:style>
-          <p:txBody>
-            <a:bodyPr lIns="90000" tIns="72000" rIns="90000" bIns="72000" rtlCol="0" anchor="ctr"/>
-            <a:lstStyle/>
-            <a:p>
-              <a:pPr marR="0" algn="ctr" defTabSz="914400" eaLnBrk="1" fontAlgn="base" latinLnBrk="0" hangingPunct="1">
-                <a:lnSpc>
-                  <a:spcPct val="100000"/>
-                </a:lnSpc>
-                <a:spcBef>
-                  <a:spcPct val="50000"/>
-                </a:spcBef>
-                <a:spcAft>
-                  <a:spcPct val="0"/>
-                </a:spcAft>
-                <a:buClr>
-                  <a:srgbClr val="F0AB00"/>
-                </a:buClr>
-                <a:buSzPct val="80000"/>
-                <a:tabLst/>
-              </a:pPr>
-              <a:endParaRPr kumimoji="0" lang="en-US" sz="1800" b="0" i="0" u="none" strike="noStrike" kern="0" cap="none" spc="0" normalizeH="0" baseline="0" noProof="0" dirty="0" err="1">
-                <a:ln>
-                  <a:noFill/>
-                </a:ln>
-                <a:effectLst/>
-                <a:uLnTx/>
-                <a:uFillTx/>
-                <a:ea typeface="Arial Unicode MS" pitchFamily="34" charset="-128"/>
-                <a:cs typeface="Arial Unicode MS" pitchFamily="34" charset="-128"/>
-              </a:endParaRPr>
-            </a:p>
-          </p:txBody>
-        </p:sp>
-        <p:sp>
-          <p:nvSpPr>
-            <p:cNvPr id="8" name="Cylinder 7"/>
-            <p:cNvSpPr/>
-            <p:nvPr/>
-          </p:nvSpPr>
-          <p:spPr bwMode="gray">
-            <a:xfrm>
-              <a:off x="3946888" y="5248563"/>
-              <a:ext cx="998220" cy="1004248"/>
-            </a:xfrm>
-            <a:prstGeom prst="can">
-              <a:avLst/>
-            </a:prstGeom>
-            <a:ln>
-              <a:headEnd/>
-              <a:tailEnd/>
-            </a:ln>
-          </p:spPr>
-          <p:style>
-            <a:lnRef idx="2">
-              <a:schemeClr val="accent2"/>
-            </a:lnRef>
-            <a:fillRef idx="1">
-              <a:schemeClr val="lt1"/>
-            </a:fillRef>
-            <a:effectRef idx="0">
-              <a:schemeClr val="accent2"/>
-            </a:effectRef>
-            <a:fontRef idx="minor">
-              <a:schemeClr val="dk1"/>
-            </a:fontRef>
-          </p:style>
-          <p:txBody>
-            <a:bodyPr lIns="90000" tIns="72000" rIns="90000" bIns="72000" rtlCol="0" anchor="ctr"/>
-            <a:lstStyle/>
-            <a:p>
-              <a:pPr marR="0" algn="ctr" defTabSz="914400" eaLnBrk="1" fontAlgn="base" latinLnBrk="0" hangingPunct="1">
-                <a:lnSpc>
-                  <a:spcPct val="100000"/>
-                </a:lnSpc>
-                <a:spcBef>
-                  <a:spcPct val="50000"/>
-                </a:spcBef>
-                <a:spcAft>
-                  <a:spcPct val="0"/>
-                </a:spcAft>
-                <a:buClr>
-                  <a:srgbClr val="F0AB00"/>
-                </a:buClr>
-                <a:buSzPct val="80000"/>
-                <a:tabLst/>
-              </a:pPr>
-              <a:r>
-                <a:rPr kumimoji="0" lang="de-DE" sz="1800" b="0" i="0" u="none" strike="noStrike" kern="0" cap="none" spc="0" normalizeH="0" baseline="0" noProof="0" dirty="0" err="1">
-                  <a:ln>
-                    <a:noFill/>
-                  </a:ln>
-                  <a:effectLst/>
-                  <a:uLnTx/>
-                  <a:uFillTx/>
-                  <a:ea typeface="Arial Unicode MS" pitchFamily="34" charset="-128"/>
-                  <a:cs typeface="Arial Unicode MS" pitchFamily="34" charset="-128"/>
-                </a:rPr>
-                <a:t>content</a:t>
-              </a:r>
-              <a:endParaRPr kumimoji="0" lang="de-DE" sz="1800" b="0" i="0" u="none" strike="noStrike" kern="0" cap="none" spc="0" normalizeH="0" baseline="0" noProof="0" dirty="0">
-                <a:ln>
-                  <a:noFill/>
-                </a:ln>
-                <a:effectLst/>
-                <a:uLnTx/>
-                <a:uFillTx/>
-                <a:ea typeface="Arial Unicode MS" pitchFamily="34" charset="-128"/>
-                <a:cs typeface="Arial Unicode MS" pitchFamily="34" charset="-128"/>
-              </a:endParaRPr>
-            </a:p>
-          </p:txBody>
-        </p:sp>
-        <p:sp>
-          <p:nvSpPr>
-            <p:cNvPr id="9" name="Cylinder 8"/>
-            <p:cNvSpPr/>
-            <p:nvPr/>
-          </p:nvSpPr>
-          <p:spPr bwMode="gray">
-            <a:xfrm>
-              <a:off x="5214379" y="5248563"/>
-              <a:ext cx="998220" cy="1004248"/>
-            </a:xfrm>
-            <a:prstGeom prst="can">
-              <a:avLst/>
-            </a:prstGeom>
-            <a:ln>
-              <a:headEnd/>
-              <a:tailEnd/>
-            </a:ln>
-          </p:spPr>
-          <p:style>
-            <a:lnRef idx="2">
-              <a:schemeClr val="accent2"/>
-            </a:lnRef>
-            <a:fillRef idx="1">
-              <a:schemeClr val="lt1"/>
-            </a:fillRef>
-            <a:effectRef idx="0">
-              <a:schemeClr val="accent2"/>
-            </a:effectRef>
-            <a:fontRef idx="minor">
-              <a:schemeClr val="dk1"/>
-            </a:fontRef>
-          </p:style>
-          <p:txBody>
-            <a:bodyPr lIns="90000" tIns="72000" rIns="90000" bIns="72000" rtlCol="0" anchor="ctr"/>
-            <a:lstStyle/>
-            <a:p>
-              <a:pPr marR="0" algn="ctr" defTabSz="914400" eaLnBrk="1" fontAlgn="base" latinLnBrk="0" hangingPunct="1">
-                <a:lnSpc>
-                  <a:spcPct val="100000"/>
-                </a:lnSpc>
-                <a:spcBef>
-                  <a:spcPct val="50000"/>
-                </a:spcBef>
-                <a:spcAft>
-                  <a:spcPct val="0"/>
-                </a:spcAft>
-                <a:buClr>
-                  <a:srgbClr val="F0AB00"/>
-                </a:buClr>
-                <a:buSzPct val="80000"/>
-                <a:tabLst/>
-              </a:pPr>
-              <a:r>
-                <a:rPr kumimoji="0" lang="de-DE" sz="1800" b="0" i="0" u="none" strike="noStrike" kern="0" cap="none" spc="0" normalizeH="0" baseline="0" noProof="0" dirty="0" err="1">
-                  <a:ln>
-                    <a:noFill/>
-                  </a:ln>
-                  <a:effectLst/>
-                  <a:uLnTx/>
-                  <a:uFillTx/>
-                  <a:ea typeface="Arial Unicode MS" pitchFamily="34" charset="-128"/>
-                  <a:cs typeface="Arial Unicode MS" pitchFamily="34" charset="-128"/>
-                </a:rPr>
-                <a:t>config</a:t>
-              </a:r>
-              <a:endParaRPr kumimoji="0" lang="de-DE" sz="1800" b="0" i="0" u="none" strike="noStrike" kern="0" cap="none" spc="0" normalizeH="0" baseline="0" noProof="0" dirty="0">
-                <a:ln>
-                  <a:noFill/>
-                </a:ln>
-                <a:effectLst/>
-                <a:uLnTx/>
-                <a:uFillTx/>
-                <a:ea typeface="Arial Unicode MS" pitchFamily="34" charset="-128"/>
-                <a:cs typeface="Arial Unicode MS" pitchFamily="34" charset="-128"/>
-              </a:endParaRPr>
-            </a:p>
-          </p:txBody>
-        </p:sp>
-        <p:sp>
-          <p:nvSpPr>
-            <p:cNvPr id="10" name="Cylinder 9"/>
-            <p:cNvSpPr/>
-            <p:nvPr/>
-          </p:nvSpPr>
-          <p:spPr bwMode="gray">
-            <a:xfrm>
-              <a:off x="6481870" y="5248563"/>
-              <a:ext cx="998220" cy="1004248"/>
-            </a:xfrm>
-            <a:prstGeom prst="can">
-              <a:avLst/>
-            </a:prstGeom>
-            <a:ln>
-              <a:headEnd/>
-              <a:tailEnd/>
-            </a:ln>
-          </p:spPr>
-          <p:style>
-            <a:lnRef idx="2">
-              <a:schemeClr val="accent2"/>
-            </a:lnRef>
-            <a:fillRef idx="1">
-              <a:schemeClr val="lt1"/>
-            </a:fillRef>
-            <a:effectRef idx="0">
-              <a:schemeClr val="accent2"/>
-            </a:effectRef>
-            <a:fontRef idx="minor">
-              <a:schemeClr val="dk1"/>
-            </a:fontRef>
-          </p:style>
-          <p:txBody>
-            <a:bodyPr lIns="90000" tIns="72000" rIns="90000" bIns="72000" rtlCol="0" anchor="ctr"/>
-            <a:lstStyle/>
-            <a:p>
-              <a:pPr marR="0" algn="ctr" defTabSz="914400" eaLnBrk="1" fontAlgn="base" latinLnBrk="0" hangingPunct="1">
-                <a:lnSpc>
-                  <a:spcPct val="100000"/>
-                </a:lnSpc>
-                <a:spcBef>
-                  <a:spcPct val="50000"/>
-                </a:spcBef>
-                <a:spcAft>
-                  <a:spcPct val="0"/>
-                </a:spcAft>
-                <a:buClr>
-                  <a:srgbClr val="F0AB00"/>
-                </a:buClr>
-                <a:buSzPct val="80000"/>
-                <a:tabLst/>
-              </a:pPr>
-              <a:r>
-                <a:rPr lang="de-DE" sz="1800" kern="0" dirty="0" err="1">
-                  <a:ea typeface="Arial Unicode MS" pitchFamily="34" charset="-128"/>
-                  <a:cs typeface="Arial Unicode MS" pitchFamily="34" charset="-128"/>
-                </a:rPr>
-                <a:t>tls</a:t>
-              </a:r>
-              <a:r>
-                <a:rPr lang="de-DE" sz="1800" kern="0" dirty="0">
-                  <a:ea typeface="Arial Unicode MS" pitchFamily="34" charset="-128"/>
-                  <a:cs typeface="Arial Unicode MS" pitchFamily="34" charset="-128"/>
-                </a:rPr>
-                <a:t> </a:t>
-              </a:r>
-              <a:r>
-                <a:rPr lang="de-DE" sz="1800" kern="0" dirty="0" err="1">
-                  <a:ea typeface="Arial Unicode MS" pitchFamily="34" charset="-128"/>
-                  <a:cs typeface="Arial Unicode MS" pitchFamily="34" charset="-128"/>
-                </a:rPr>
-                <a:t>certs</a:t>
-              </a:r>
-              <a:endParaRPr kumimoji="0" lang="de-DE" sz="1800" b="0" i="0" u="none" strike="noStrike" kern="0" cap="none" spc="0" normalizeH="0" baseline="0" noProof="0" dirty="0">
-                <a:ln>
-                  <a:noFill/>
-                </a:ln>
-                <a:effectLst/>
-                <a:uLnTx/>
-                <a:uFillTx/>
-                <a:ea typeface="Arial Unicode MS" pitchFamily="34" charset="-128"/>
-                <a:cs typeface="Arial Unicode MS" pitchFamily="34" charset="-128"/>
-              </a:endParaRPr>
-            </a:p>
-          </p:txBody>
-        </p:sp>
-      </p:grpSp>
-      <p:sp>
-        <p:nvSpPr>
-          <p:cNvPr id="16" name="Arrow: Up-Down 15"/>
-          <p:cNvSpPr/>
-          <p:nvPr/>
-        </p:nvSpPr>
-        <p:spPr bwMode="gray">
-          <a:xfrm>
-            <a:off x="5657231" y="4400550"/>
-            <a:ext cx="222219" cy="845820"/>
-          </a:xfrm>
-          <a:prstGeom prst="upDownArrow">
-            <a:avLst/>
-          </a:prstGeom>
-          <a:solidFill>
-            <a:schemeClr val="accent1"/>
-          </a:solidFill>
-          <a:ln w="6350" algn="ctr">
-            <a:noFill/>
-            <a:miter lim="800000"/>
-            <a:headEnd/>
-            <a:tailEnd/>
-          </a:ln>
-        </p:spPr>
-        <p:txBody>
-          <a:bodyPr lIns="90000" tIns="72000" rIns="90000" bIns="72000" rtlCol="0" anchor="ctr"/>
-          <a:lstStyle/>
-          <a:p>
-            <a:pPr marR="0" algn="ctr" defTabSz="914400" eaLnBrk="1" fontAlgn="base" latinLnBrk="0" hangingPunct="1">
-              <a:lnSpc>
-                <a:spcPct val="100000"/>
-              </a:lnSpc>
-              <a:spcBef>
-                <a:spcPct val="50000"/>
-              </a:spcBef>
-              <a:spcAft>
-                <a:spcPct val="0"/>
-              </a:spcAft>
-              <a:buClr>
-                <a:srgbClr val="F0AB00"/>
-              </a:buClr>
-              <a:buSzPct val="80000"/>
-              <a:tabLst/>
-            </a:pPr>
-            <a:endParaRPr kumimoji="0" lang="en-US" sz="1800" b="0" i="0" u="none" strike="noStrike" kern="0" cap="none" spc="0" normalizeH="0" baseline="0" noProof="0" dirty="0" err="1">
-              <a:ln>
-                <a:noFill/>
-              </a:ln>
-              <a:effectLst/>
-              <a:uLnTx/>
-              <a:uFillTx/>
-              <a:ea typeface="Arial Unicode MS" pitchFamily="34" charset="-128"/>
-              <a:cs typeface="Arial Unicode MS" pitchFamily="34" charset="-128"/>
-            </a:endParaRPr>
-          </a:p>
-        </p:txBody>
-      </p:sp>
-      <p:sp>
-        <p:nvSpPr>
-          <p:cNvPr id="17" name="Cloud 16"/>
-          <p:cNvSpPr/>
-          <p:nvPr/>
-        </p:nvSpPr>
-        <p:spPr bwMode="gray">
-          <a:xfrm>
-            <a:off x="4077319" y="1126276"/>
-            <a:ext cx="3382042" cy="914400"/>
-          </a:xfrm>
-          <a:prstGeom prst="cloud">
-            <a:avLst/>
-          </a:prstGeom>
-          <a:solidFill>
-            <a:schemeClr val="accent1"/>
-          </a:solidFill>
-          <a:ln w="6350" algn="ctr">
-            <a:noFill/>
-            <a:miter lim="800000"/>
-            <a:headEnd/>
-            <a:tailEnd/>
-          </a:ln>
-        </p:spPr>
-        <p:txBody>
-          <a:bodyPr lIns="90000" tIns="72000" rIns="90000" bIns="72000" rtlCol="0" anchor="ctr"/>
-          <a:lstStyle/>
-          <a:p>
-            <a:pPr marR="0" algn="ctr" defTabSz="914400" eaLnBrk="1" fontAlgn="base" latinLnBrk="0" hangingPunct="1">
-              <a:lnSpc>
-                <a:spcPct val="100000"/>
-              </a:lnSpc>
-              <a:spcBef>
-                <a:spcPct val="50000"/>
-              </a:spcBef>
-              <a:spcAft>
-                <a:spcPct val="0"/>
-              </a:spcAft>
-              <a:buClr>
-                <a:srgbClr val="F0AB00"/>
-              </a:buClr>
-              <a:buSzPct val="80000"/>
-              <a:tabLst/>
-            </a:pPr>
-            <a:endParaRPr kumimoji="0" lang="en-US" sz="1800" b="0" i="0" u="none" strike="noStrike" kern="0" cap="none" spc="0" normalizeH="0" baseline="0" noProof="0" dirty="0" err="1">
-              <a:ln>
-                <a:noFill/>
-              </a:ln>
-              <a:effectLst/>
-              <a:uLnTx/>
-              <a:uFillTx/>
-              <a:ea typeface="Arial Unicode MS" pitchFamily="34" charset="-128"/>
-              <a:cs typeface="Arial Unicode MS" pitchFamily="34" charset="-128"/>
-            </a:endParaRPr>
-          </a:p>
-        </p:txBody>
-      </p:sp>
-      <p:sp>
-        <p:nvSpPr>
-          <p:cNvPr id="18" name="Arrow: Up-Down 17"/>
-          <p:cNvSpPr/>
-          <p:nvPr/>
-        </p:nvSpPr>
-        <p:spPr bwMode="gray">
-          <a:xfrm>
-            <a:off x="5657231" y="2071898"/>
-            <a:ext cx="222219" cy="845820"/>
-          </a:xfrm>
-          <a:prstGeom prst="upDownArrow">
-            <a:avLst/>
-          </a:prstGeom>
-          <a:solidFill>
-            <a:schemeClr val="accent1"/>
-          </a:solidFill>
-          <a:ln w="6350" algn="ctr">
-            <a:noFill/>
-            <a:miter lim="800000"/>
-            <a:headEnd/>
-            <a:tailEnd/>
-          </a:ln>
-        </p:spPr>
-        <p:txBody>
-          <a:bodyPr lIns="90000" tIns="72000" rIns="90000" bIns="72000" rtlCol="0" anchor="ctr"/>
-          <a:lstStyle/>
-          <a:p>
-            <a:pPr marR="0" algn="ctr" defTabSz="914400" eaLnBrk="1" fontAlgn="base" latinLnBrk="0" hangingPunct="1">
-              <a:lnSpc>
-                <a:spcPct val="100000"/>
-              </a:lnSpc>
-              <a:spcBef>
-                <a:spcPct val="50000"/>
-              </a:spcBef>
-              <a:spcAft>
-                <a:spcPct val="0"/>
-              </a:spcAft>
-              <a:buClr>
-                <a:srgbClr val="F0AB00"/>
-              </a:buClr>
-              <a:buSzPct val="80000"/>
-              <a:tabLst/>
-            </a:pPr>
-            <a:endParaRPr kumimoji="0" lang="en-US" sz="1800" b="0" i="0" u="none" strike="noStrike" kern="0" cap="none" spc="0" normalizeH="0" baseline="0" noProof="0" dirty="0" err="1">
-              <a:ln>
-                <a:noFill/>
-              </a:ln>
-              <a:effectLst/>
-              <a:uLnTx/>
-              <a:uFillTx/>
-              <a:ea typeface="Arial Unicode MS" pitchFamily="34" charset="-128"/>
-              <a:cs typeface="Arial Unicode MS" pitchFamily="34" charset="-128"/>
-            </a:endParaRPr>
-          </a:p>
-        </p:txBody>
-      </p:sp>
-    </p:spTree>
-    <p:extLst>
-      <p:ext uri="{BB962C8B-B14F-4D97-AF65-F5344CB8AC3E}">
-        <p14:creationId xmlns:p14="http://schemas.microsoft.com/office/powerpoint/2010/main" val="4085581448"/>
       </p:ext>
     </p:extLst>
   </p:cSld>

</xml_diff>

<commit_message>
added slide on sidecar pattern (use 2 container in a pod)
</commit_message>
<xml_diff>
--- a/kubernetes/02_namespaces_pods.pptx
+++ b/kubernetes/02_namespaces_pods.pptx
@@ -5,23 +5,24 @@
     <p:sldMasterId id="2147483733" r:id="rId1"/>
   </p:sldMasterIdLst>
   <p:notesMasterIdLst>
-    <p:notesMasterId r:id="rId13"/>
+    <p:notesMasterId r:id="rId14"/>
   </p:notesMasterIdLst>
   <p:handoutMasterIdLst>
-    <p:handoutMasterId r:id="rId14"/>
+    <p:handoutMasterId r:id="rId15"/>
   </p:handoutMasterIdLst>
   <p:sldIdLst>
     <p:sldId id="433" r:id="rId2"/>
     <p:sldId id="441" r:id="rId3"/>
-    <p:sldId id="437" r:id="rId4"/>
-    <p:sldId id="445" r:id="rId5"/>
-    <p:sldId id="438" r:id="rId6"/>
-    <p:sldId id="446" r:id="rId7"/>
-    <p:sldId id="440" r:id="rId8"/>
-    <p:sldId id="436" r:id="rId9"/>
-    <p:sldId id="443" r:id="rId10"/>
-    <p:sldId id="444" r:id="rId11"/>
-    <p:sldId id="265" r:id="rId12"/>
+    <p:sldId id="447" r:id="rId4"/>
+    <p:sldId id="437" r:id="rId5"/>
+    <p:sldId id="445" r:id="rId6"/>
+    <p:sldId id="438" r:id="rId7"/>
+    <p:sldId id="446" r:id="rId8"/>
+    <p:sldId id="440" r:id="rId9"/>
+    <p:sldId id="436" r:id="rId10"/>
+    <p:sldId id="443" r:id="rId11"/>
+    <p:sldId id="444" r:id="rId12"/>
+    <p:sldId id="265" r:id="rId13"/>
   </p:sldIdLst>
   <p:sldSz cx="12195175" cy="6858000"/>
   <p:notesSz cx="6858000" cy="9144000"/>
@@ -658,7 +659,45 @@
           <a:bodyPr/>
           <a:lstStyle/>
           <a:p>
-            <a:endParaRPr lang="en-US"/>
+            <a:r>
+              <a:rPr lang="en-US" dirty="0"/>
+              <a:t>The proxy-mode of </a:t>
+            </a:r>
+            <a:r>
+              <a:rPr lang="en-US" dirty="0" err="1"/>
+              <a:t>kubectl</a:t>
+            </a:r>
+            <a:r>
+              <a:rPr lang="en-US" dirty="0"/>
+              <a:t> allows you to easily access the </a:t>
+            </a:r>
+            <a:r>
+              <a:rPr lang="en-US" dirty="0" err="1"/>
+              <a:t>api</a:t>
+            </a:r>
+            <a:r>
+              <a:rPr lang="en-US" dirty="0"/>
+              <a:t>-server of the cluster. </a:t>
+            </a:r>
+          </a:p>
+          <a:p>
+            <a:r>
+              <a:rPr lang="en-US" dirty="0"/>
+              <a:t>Showing the structure of the REST </a:t>
+            </a:r>
+            <a:r>
+              <a:rPr lang="en-US" dirty="0" err="1"/>
+              <a:t>api</a:t>
+            </a:r>
+            <a:r>
+              <a:rPr lang="en-US" dirty="0"/>
+              <a:t> might help as well. Just navigate through it until finding the scheduled pod (by name). Appending the port and “/proxy” will allow browser-based access to the pod via the proxy (without the need </a:t>
+            </a:r>
+            <a:r>
+              <a:rPr lang="en-US"/>
+              <a:t>to expose the pod).</a:t>
+            </a:r>
+            <a:endParaRPr lang="en-US" dirty="0"/>
           </a:p>
         </p:txBody>
       </p:sp>
@@ -689,7 +728,7 @@
     </p:spTree>
     <p:extLst>
       <p:ext uri="{BB962C8B-B14F-4D97-AF65-F5344CB8AC3E}">
-        <p14:creationId xmlns:p14="http://schemas.microsoft.com/office/powerpoint/2010/main" val="2480745755"/>
+        <p14:creationId xmlns:p14="http://schemas.microsoft.com/office/powerpoint/2010/main" val="2327213927"/>
       </p:ext>
     </p:extLst>
   </p:cSld>
@@ -718,6 +757,37 @@
       </p:grpSpPr>
       <p:sp>
         <p:nvSpPr>
+          <p:cNvPr id="2" name="Slide Image Placeholder 1"/>
+          <p:cNvSpPr>
+            <a:spLocks noGrp="1" noRot="1" noChangeAspect="1"/>
+          </p:cNvSpPr>
+          <p:nvPr>
+            <p:ph type="sldImg"/>
+          </p:nvPr>
+        </p:nvSpPr>
+        <p:spPr/>
+      </p:sp>
+      <p:sp>
+        <p:nvSpPr>
+          <p:cNvPr id="3" name="Notes Placeholder 2"/>
+          <p:cNvSpPr>
+            <a:spLocks noGrp="1"/>
+          </p:cNvSpPr>
+          <p:nvPr>
+            <p:ph type="body" idx="1"/>
+          </p:nvPr>
+        </p:nvSpPr>
+        <p:spPr/>
+        <p:txBody>
+          <a:bodyPr/>
+          <a:lstStyle/>
+          <a:p>
+            <a:endParaRPr lang="en-US"/>
+          </a:p>
+        </p:txBody>
+      </p:sp>
+      <p:sp>
+        <p:nvSpPr>
           <p:cNvPr id="4" name="Slide Number Placeholder 3"/>
           <p:cNvSpPr>
             <a:spLocks noGrp="1"/>
@@ -735,6 +805,60 @@
               <a:rPr lang="de-DE" smtClean="0"/>
               <a:pPr/>
               <a:t>11</a:t>
+            </a:fld>
+            <a:endParaRPr lang="de-DE" dirty="0"/>
+          </a:p>
+        </p:txBody>
+      </p:sp>
+    </p:spTree>
+    <p:extLst>
+      <p:ext uri="{BB962C8B-B14F-4D97-AF65-F5344CB8AC3E}">
+        <p14:creationId xmlns:p14="http://schemas.microsoft.com/office/powerpoint/2010/main" val="2480745755"/>
+      </p:ext>
+    </p:extLst>
+  </p:cSld>
+  <p:clrMapOvr>
+    <a:masterClrMapping/>
+  </p:clrMapOvr>
+</p:notes>
+</file>
+
+<file path=ppt/notesSlides/notesSlide12.xml><?xml version="1.0" encoding="utf-8"?>
+<p:notes xmlns:a="http://schemas.openxmlformats.org/drawingml/2006/main" xmlns:r="http://schemas.openxmlformats.org/officeDocument/2006/relationships" xmlns:p="http://schemas.openxmlformats.org/presentationml/2006/main">
+  <p:cSld>
+    <p:spTree>
+      <p:nvGrpSpPr>
+        <p:cNvPr id="1" name=""/>
+        <p:cNvGrpSpPr/>
+        <p:nvPr/>
+      </p:nvGrpSpPr>
+      <p:grpSpPr>
+        <a:xfrm>
+          <a:off x="0" y="0"/>
+          <a:ext cx="0" cy="0"/>
+          <a:chOff x="0" y="0"/>
+          <a:chExt cx="0" cy="0"/>
+        </a:xfrm>
+      </p:grpSpPr>
+      <p:sp>
+        <p:nvSpPr>
+          <p:cNvPr id="4" name="Slide Number Placeholder 3"/>
+          <p:cNvSpPr>
+            <a:spLocks noGrp="1"/>
+          </p:cNvSpPr>
+          <p:nvPr>
+            <p:ph type="sldNum" sz="quarter" idx="10"/>
+          </p:nvPr>
+        </p:nvSpPr>
+        <p:spPr/>
+        <p:txBody>
+          <a:bodyPr/>
+          <a:lstStyle/>
+          <a:p>
+            <a:fld id="{7D8C2C35-2B8A-446E-BEC0-FD36716C29AC}" type="slidenum">
+              <a:rPr lang="de-DE" smtClean="0"/>
+              <a:pPr/>
+              <a:t>12</a:t>
             </a:fld>
             <a:endParaRPr lang="de-DE" dirty="0"/>
           </a:p>
@@ -916,6 +1040,140 @@
       </p:grpSpPr>
       <p:sp>
         <p:nvSpPr>
+          <p:cNvPr id="2" name="Slide Image Placeholder 1"/>
+          <p:cNvSpPr>
+            <a:spLocks noGrp="1" noRot="1" noChangeAspect="1"/>
+          </p:cNvSpPr>
+          <p:nvPr>
+            <p:ph type="sldImg"/>
+          </p:nvPr>
+        </p:nvSpPr>
+        <p:spPr/>
+      </p:sp>
+      <p:sp>
+        <p:nvSpPr>
+          <p:cNvPr id="3" name="Notes Placeholder 2"/>
+          <p:cNvSpPr>
+            <a:spLocks noGrp="1"/>
+          </p:cNvSpPr>
+          <p:nvPr>
+            <p:ph type="body" idx="1"/>
+          </p:nvPr>
+        </p:nvSpPr>
+        <p:spPr/>
+        <p:txBody>
+          <a:bodyPr>
+            <a:normAutofit lnSpcReduction="10000"/>
+          </a:bodyPr>
+          <a:lstStyle/>
+          <a:p>
+            <a:r>
+              <a:rPr lang="en-US" dirty="0"/>
+              <a:t>We said that a pod may consist of more than one container. But when should you use such a feature? The so called ‘sidecar’ pattern gives a few ideas:</a:t>
+            </a:r>
+          </a:p>
+          <a:p>
+            <a:pPr marL="285750" indent="-285750">
+              <a:buFontTx/>
+              <a:buChar char="-"/>
+            </a:pPr>
+            <a:r>
+              <a:rPr lang="en-US" dirty="0"/>
+              <a:t>In general there is always one ‘main’ container, often also referred to as the application container. This primary container hosts the core logic of your application. In our example this is a </a:t>
+            </a:r>
+            <a:r>
+              <a:rPr lang="en-US" dirty="0" err="1"/>
+              <a:t>ngnix</a:t>
+            </a:r>
+            <a:r>
+              <a:rPr lang="en-US" dirty="0"/>
+              <a:t> webserver</a:t>
+            </a:r>
+          </a:p>
+          <a:p>
+            <a:pPr marL="285750" indent="-285750">
+              <a:buFontTx/>
+              <a:buChar char="-"/>
+            </a:pPr>
+            <a:r>
+              <a:rPr lang="en-US" dirty="0"/>
+              <a:t>The 2</a:t>
+            </a:r>
+            <a:r>
+              <a:rPr lang="en-US" baseline="30000" dirty="0"/>
+              <a:t>nd</a:t>
+            </a:r>
+            <a:r>
+              <a:rPr lang="en-US" dirty="0"/>
+              <a:t> (sidecar) container provides augmentation to improve the application container. To do so, both container need to share certain resources like disk space or network.</a:t>
+            </a:r>
+          </a:p>
+          <a:p>
+            <a:pPr marL="0" indent="0">
+              <a:buFontTx/>
+              <a:buNone/>
+            </a:pPr>
+            <a:endParaRPr lang="en-US" dirty="0"/>
+          </a:p>
+          <a:p>
+            <a:pPr marL="0" indent="0">
+              <a:buFontTx/>
+              <a:buNone/>
+            </a:pPr>
+            <a:r>
+              <a:rPr lang="en-US" dirty="0"/>
+              <a:t>Think of the following setup: You have a webserver serving on port 80 (plain http). To add https you would need to touch your application. Alternatively you could add a proxy container that augments your webserver with https. Simply let your primary container serve port 80 only to localhost and capture that traffic in your proxy container, which then provides https.</a:t>
+            </a:r>
+          </a:p>
+          <a:p>
+            <a:pPr marL="0" indent="0">
+              <a:buFontTx/>
+              <a:buNone/>
+            </a:pPr>
+            <a:endParaRPr lang="en-US" dirty="0"/>
+          </a:p>
+          <a:p>
+            <a:pPr marL="0" indent="0">
+              <a:buFontTx/>
+              <a:buNone/>
+            </a:pPr>
+            <a:r>
+              <a:rPr lang="en-US" dirty="0"/>
+              <a:t>Another example would be a configuration update mechanism realized with a helper container. A </a:t>
+            </a:r>
+            <a:r>
+              <a:rPr lang="en-US" dirty="0" err="1"/>
+              <a:t>nginx</a:t>
+            </a:r>
+            <a:r>
+              <a:rPr lang="en-US" dirty="0"/>
+              <a:t> webserver reads its configuration from a file. If this file is updated, a restart would be required. Think of a helper container, which takes notice of the configuration change and restarts the </a:t>
+            </a:r>
+            <a:r>
+              <a:rPr lang="en-US" dirty="0" err="1"/>
+              <a:t>nginx</a:t>
+            </a:r>
+            <a:r>
+              <a:rPr lang="en-US" dirty="0"/>
+              <a:t> in order to make it re-load the configuration. This is possible, since both container share the same volume (disks) and also the process namespace (if </a:t>
+            </a:r>
+            <a:r>
+              <a:rPr lang="en-US"/>
+              <a:t>configured properly).</a:t>
+            </a:r>
+            <a:endParaRPr lang="en-US" dirty="0"/>
+          </a:p>
+          <a:p>
+            <a:pPr marL="285750" indent="-285750">
+              <a:buFontTx/>
+              <a:buChar char="-"/>
+            </a:pPr>
+            <a:endParaRPr lang="en-US" dirty="0"/>
+          </a:p>
+        </p:txBody>
+      </p:sp>
+      <p:sp>
+        <p:nvSpPr>
           <p:cNvPr id="4" name="Slide Number Placeholder 3"/>
           <p:cNvSpPr>
             <a:spLocks noGrp="1"/>
@@ -938,48 +1196,10 @@
           </a:p>
         </p:txBody>
       </p:sp>
-      <p:sp>
-        <p:nvSpPr>
-          <p:cNvPr id="9" name="Slide Image Placeholder 8"/>
-          <p:cNvSpPr>
-            <a:spLocks noGrp="1" noRot="1" noChangeAspect="1"/>
-          </p:cNvSpPr>
-          <p:nvPr>
-            <p:ph type="sldImg"/>
-          </p:nvPr>
-        </p:nvSpPr>
-        <p:spPr>
-          <a:xfrm>
-            <a:off x="547688" y="612775"/>
-            <a:ext cx="5762625" cy="3241675"/>
-          </a:xfrm>
-        </p:spPr>
-      </p:sp>
-      <p:sp>
-        <p:nvSpPr>
-          <p:cNvPr id="10" name="Notes Placeholder 9"/>
-          <p:cNvSpPr>
-            <a:spLocks noGrp="1"/>
-          </p:cNvSpPr>
-          <p:nvPr>
-            <p:ph type="body" idx="1"/>
-          </p:nvPr>
-        </p:nvSpPr>
-        <p:spPr/>
-        <p:txBody>
-          <a:bodyPr>
-            <a:normAutofit/>
-          </a:bodyPr>
-          <a:lstStyle/>
-          <a:p>
-            <a:endParaRPr lang="en-US"/>
-          </a:p>
-        </p:txBody>
-      </p:sp>
     </p:spTree>
     <p:extLst>
       <p:ext uri="{BB962C8B-B14F-4D97-AF65-F5344CB8AC3E}">
-        <p14:creationId xmlns:p14="http://schemas.microsoft.com/office/powerpoint/2010/main" val="3887584667"/>
+        <p14:creationId xmlns:p14="http://schemas.microsoft.com/office/powerpoint/2010/main" val="2955753376"/>
       </p:ext>
     </p:extLst>
   </p:cSld>
@@ -1008,76 +1228,6 @@
       </p:grpSpPr>
       <p:sp>
         <p:nvSpPr>
-          <p:cNvPr id="2" name="Slide Image Placeholder 1"/>
-          <p:cNvSpPr>
-            <a:spLocks noGrp="1" noRot="1" noChangeAspect="1"/>
-          </p:cNvSpPr>
-          <p:nvPr>
-            <p:ph type="sldImg"/>
-          </p:nvPr>
-        </p:nvSpPr>
-        <p:spPr/>
-      </p:sp>
-      <p:sp>
-        <p:nvSpPr>
-          <p:cNvPr id="3" name="Notes Placeholder 2"/>
-          <p:cNvSpPr>
-            <a:spLocks noGrp="1"/>
-          </p:cNvSpPr>
-          <p:nvPr>
-            <p:ph type="body" idx="1"/>
-          </p:nvPr>
-        </p:nvSpPr>
-        <p:spPr/>
-        <p:txBody>
-          <a:bodyPr/>
-          <a:lstStyle/>
-          <a:p>
-            <a:r>
-              <a:rPr lang="en-US" dirty="0"/>
-              <a:t>Example</a:t>
-            </a:r>
-            <a:r>
-              <a:rPr lang="en-US" baseline="0" dirty="0"/>
-              <a:t> for a resource with different structure: </a:t>
-            </a:r>
-            <a:r>
-              <a:rPr lang="en-US" baseline="0" dirty="0" err="1"/>
-              <a:t>configMap</a:t>
-            </a:r>
-            <a:endParaRPr lang="en-US" baseline="0" dirty="0"/>
-          </a:p>
-          <a:p>
-            <a:r>
-              <a:rPr lang="en-US" dirty="0" err="1"/>
-              <a:t>configMaps</a:t>
-            </a:r>
-            <a:r>
-              <a:rPr lang="en-US" dirty="0"/>
-              <a:t> have no spec, but a data sections.</a:t>
-            </a:r>
-          </a:p>
-          <a:p>
-            <a:endParaRPr lang="en-US" dirty="0"/>
-          </a:p>
-          <a:p>
-            <a:r>
-              <a:rPr lang="en-US" dirty="0"/>
-              <a:t>When looking at the </a:t>
-            </a:r>
-            <a:r>
-              <a:rPr lang="en-US" dirty="0" err="1"/>
-              <a:t>api</a:t>
-            </a:r>
-            <a:r>
-              <a:rPr lang="en-US" dirty="0"/>
-              <a:t> reference, you can see this basic structure too. Simply navigate to a resource, like pod, and see with fields and object there are. Usually fields have either a list or string/integer as values. Objects link to their object definition.</a:t>
-            </a:r>
-          </a:p>
-        </p:txBody>
-      </p:sp>
-      <p:sp>
-        <p:nvSpPr>
           <p:cNvPr id="4" name="Slide Number Placeholder 3"/>
           <p:cNvSpPr>
             <a:spLocks noGrp="1"/>
@@ -1100,10 +1250,48 @@
           </a:p>
         </p:txBody>
       </p:sp>
+      <p:sp>
+        <p:nvSpPr>
+          <p:cNvPr id="9" name="Slide Image Placeholder 8"/>
+          <p:cNvSpPr>
+            <a:spLocks noGrp="1" noRot="1" noChangeAspect="1"/>
+          </p:cNvSpPr>
+          <p:nvPr>
+            <p:ph type="sldImg"/>
+          </p:nvPr>
+        </p:nvSpPr>
+        <p:spPr>
+          <a:xfrm>
+            <a:off x="547688" y="612775"/>
+            <a:ext cx="5762625" cy="3241675"/>
+          </a:xfrm>
+        </p:spPr>
+      </p:sp>
+      <p:sp>
+        <p:nvSpPr>
+          <p:cNvPr id="10" name="Notes Placeholder 9"/>
+          <p:cNvSpPr>
+            <a:spLocks noGrp="1"/>
+          </p:cNvSpPr>
+          <p:nvPr>
+            <p:ph type="body" idx="1"/>
+          </p:nvPr>
+        </p:nvSpPr>
+        <p:spPr/>
+        <p:txBody>
+          <a:bodyPr>
+            <a:normAutofit/>
+          </a:bodyPr>
+          <a:lstStyle/>
+          <a:p>
+            <a:endParaRPr lang="en-US"/>
+          </a:p>
+        </p:txBody>
+      </p:sp>
     </p:spTree>
     <p:extLst>
       <p:ext uri="{BB962C8B-B14F-4D97-AF65-F5344CB8AC3E}">
-        <p14:creationId xmlns:p14="http://schemas.microsoft.com/office/powerpoint/2010/main" val="1052791939"/>
+        <p14:creationId xmlns:p14="http://schemas.microsoft.com/office/powerpoint/2010/main" val="3887584667"/>
       </p:ext>
     </p:extLst>
   </p:cSld>
@@ -1132,6 +1320,76 @@
       </p:grpSpPr>
       <p:sp>
         <p:nvSpPr>
+          <p:cNvPr id="2" name="Slide Image Placeholder 1"/>
+          <p:cNvSpPr>
+            <a:spLocks noGrp="1" noRot="1" noChangeAspect="1"/>
+          </p:cNvSpPr>
+          <p:nvPr>
+            <p:ph type="sldImg"/>
+          </p:nvPr>
+        </p:nvSpPr>
+        <p:spPr/>
+      </p:sp>
+      <p:sp>
+        <p:nvSpPr>
+          <p:cNvPr id="3" name="Notes Placeholder 2"/>
+          <p:cNvSpPr>
+            <a:spLocks noGrp="1"/>
+          </p:cNvSpPr>
+          <p:nvPr>
+            <p:ph type="body" idx="1"/>
+          </p:nvPr>
+        </p:nvSpPr>
+        <p:spPr/>
+        <p:txBody>
+          <a:bodyPr/>
+          <a:lstStyle/>
+          <a:p>
+            <a:r>
+              <a:rPr lang="en-US" dirty="0"/>
+              <a:t>Example</a:t>
+            </a:r>
+            <a:r>
+              <a:rPr lang="en-US" baseline="0" dirty="0"/>
+              <a:t> for a resource with different structure: </a:t>
+            </a:r>
+            <a:r>
+              <a:rPr lang="en-US" baseline="0" dirty="0" err="1"/>
+              <a:t>configMap</a:t>
+            </a:r>
+            <a:endParaRPr lang="en-US" baseline="0" dirty="0"/>
+          </a:p>
+          <a:p>
+            <a:r>
+              <a:rPr lang="en-US" dirty="0" err="1"/>
+              <a:t>configMaps</a:t>
+            </a:r>
+            <a:r>
+              <a:rPr lang="en-US" dirty="0"/>
+              <a:t> have no spec, but a data sections.</a:t>
+            </a:r>
+          </a:p>
+          <a:p>
+            <a:endParaRPr lang="en-US" dirty="0"/>
+          </a:p>
+          <a:p>
+            <a:r>
+              <a:rPr lang="en-US" dirty="0"/>
+              <a:t>When looking at the </a:t>
+            </a:r>
+            <a:r>
+              <a:rPr lang="en-US" dirty="0" err="1"/>
+              <a:t>api</a:t>
+            </a:r>
+            <a:r>
+              <a:rPr lang="en-US" dirty="0"/>
+              <a:t> reference, you can see this basic structure too. Simply navigate to a resource, like pod, and see with fields and object there are. Usually fields have either a list or string/integer as values. Objects link to their object definition.</a:t>
+            </a:r>
+          </a:p>
+        </p:txBody>
+      </p:sp>
+      <p:sp>
+        <p:nvSpPr>
           <p:cNvPr id="4" name="Slide Number Placeholder 3"/>
           <p:cNvSpPr>
             <a:spLocks noGrp="1"/>
@@ -1154,48 +1412,10 @@
           </a:p>
         </p:txBody>
       </p:sp>
-      <p:sp>
-        <p:nvSpPr>
-          <p:cNvPr id="9" name="Slide Image Placeholder 8"/>
-          <p:cNvSpPr>
-            <a:spLocks noGrp="1" noRot="1" noChangeAspect="1"/>
-          </p:cNvSpPr>
-          <p:nvPr>
-            <p:ph type="sldImg"/>
-          </p:nvPr>
-        </p:nvSpPr>
-        <p:spPr>
-          <a:xfrm>
-            <a:off x="547688" y="612775"/>
-            <a:ext cx="5762625" cy="3241675"/>
-          </a:xfrm>
-        </p:spPr>
-      </p:sp>
-      <p:sp>
-        <p:nvSpPr>
-          <p:cNvPr id="10" name="Notes Placeholder 9"/>
-          <p:cNvSpPr>
-            <a:spLocks noGrp="1"/>
-          </p:cNvSpPr>
-          <p:nvPr>
-            <p:ph type="body" idx="1"/>
-          </p:nvPr>
-        </p:nvSpPr>
-        <p:spPr/>
-        <p:txBody>
-          <a:bodyPr>
-            <a:normAutofit/>
-          </a:bodyPr>
-          <a:lstStyle/>
-          <a:p>
-            <a:endParaRPr lang="en-US" dirty="0"/>
-          </a:p>
-        </p:txBody>
-      </p:sp>
     </p:spTree>
     <p:extLst>
       <p:ext uri="{BB962C8B-B14F-4D97-AF65-F5344CB8AC3E}">
-        <p14:creationId xmlns:p14="http://schemas.microsoft.com/office/powerpoint/2010/main" val="3968705523"/>
+        <p14:creationId xmlns:p14="http://schemas.microsoft.com/office/powerpoint/2010/main" val="1052791939"/>
       </p:ext>
     </p:extLst>
   </p:cSld>
@@ -1224,131 +1444,6 @@
       </p:grpSpPr>
       <p:sp>
         <p:nvSpPr>
-          <p:cNvPr id="2" name="Slide Image Placeholder 1"/>
-          <p:cNvSpPr>
-            <a:spLocks noGrp="1" noRot="1" noChangeAspect="1"/>
-          </p:cNvSpPr>
-          <p:nvPr>
-            <p:ph type="sldImg"/>
-          </p:nvPr>
-        </p:nvSpPr>
-        <p:spPr/>
-      </p:sp>
-      <p:sp>
-        <p:nvSpPr>
-          <p:cNvPr id="3" name="Notes Placeholder 2"/>
-          <p:cNvSpPr>
-            <a:spLocks noGrp="1"/>
-          </p:cNvSpPr>
-          <p:nvPr>
-            <p:ph type="body" idx="1"/>
-          </p:nvPr>
-        </p:nvSpPr>
-        <p:spPr/>
-        <p:txBody>
-          <a:bodyPr/>
-          <a:lstStyle/>
-          <a:p>
-            <a:r>
-              <a:rPr lang="en-US" dirty="0"/>
-              <a:t>Demo: http &amp; exec</a:t>
-            </a:r>
-            <a:r>
-              <a:rPr lang="en-US" baseline="0" dirty="0"/>
-              <a:t> liveness pods (see </a:t>
-            </a:r>
-            <a:r>
-              <a:rPr lang="en-US" baseline="0" dirty="0" err="1"/>
-              <a:t>pod_exec_liveness</a:t>
-            </a:r>
-            <a:r>
-              <a:rPr lang="en-US" baseline="0" dirty="0"/>
-              <a:t> &amp; </a:t>
-            </a:r>
-            <a:r>
-              <a:rPr lang="en-US" baseline="0" dirty="0" err="1"/>
-              <a:t>pod_http_liveness</a:t>
-            </a:r>
-            <a:r>
-              <a:rPr lang="en-US" baseline="0" dirty="0"/>
-              <a:t> </a:t>
-            </a:r>
-            <a:r>
-              <a:rPr lang="en-US" baseline="0" dirty="0" err="1"/>
-              <a:t>yaml</a:t>
-            </a:r>
-            <a:r>
-              <a:rPr lang="en-US" baseline="0" dirty="0"/>
-              <a:t> files in the solutions folder)</a:t>
-            </a:r>
-            <a:endParaRPr lang="en-US" dirty="0"/>
-          </a:p>
-          <a:p>
-            <a:r>
-              <a:rPr lang="en-US" dirty="0"/>
-              <a:t>Consequence of failed probe:</a:t>
-            </a:r>
-          </a:p>
-          <a:p>
-            <a:pPr marL="285750" indent="-285750">
-              <a:buFontTx/>
-              <a:buChar char="-"/>
-            </a:pPr>
-            <a:r>
-              <a:rPr lang="en-US" dirty="0"/>
-              <a:t>liveness: kill the pod &amp; restart</a:t>
-            </a:r>
-          </a:p>
-          <a:p>
-            <a:pPr marL="285750" indent="-285750">
-              <a:buFontTx/>
-              <a:buChar char="-"/>
-            </a:pPr>
-            <a:r>
-              <a:rPr lang="en-US" dirty="0"/>
-              <a:t>Readiness: mark pod</a:t>
-            </a:r>
-            <a:r>
-              <a:rPr lang="en-US" baseline="0" dirty="0"/>
-              <a:t> as not ready and don’t route service traffic to it</a:t>
-            </a:r>
-            <a:endParaRPr lang="en-US" dirty="0"/>
-          </a:p>
-          <a:p>
-            <a:r>
-              <a:rPr lang="en-US" dirty="0"/>
-              <a:t>Other options</a:t>
-            </a:r>
-            <a:r>
-              <a:rPr lang="en-US" baseline="0" dirty="0"/>
-              <a:t> for probes: </a:t>
-            </a:r>
-          </a:p>
-          <a:p>
-            <a:pPr marL="285750" indent="-285750">
-              <a:buFontTx/>
-              <a:buChar char="-"/>
-            </a:pPr>
-            <a:r>
-              <a:rPr lang="en-US" baseline="0" dirty="0"/>
-              <a:t>TCP: can a connection be opened successfully?</a:t>
-            </a:r>
-          </a:p>
-          <a:p>
-            <a:pPr marL="285750" indent="-285750">
-              <a:buFontTx/>
-              <a:buChar char="-"/>
-            </a:pPr>
-            <a:r>
-              <a:rPr lang="en-US" baseline="0" dirty="0"/>
-              <a:t>EXEC: run a command and evaluate return/exit code</a:t>
-            </a:r>
-            <a:endParaRPr lang="en-US" dirty="0"/>
-          </a:p>
-        </p:txBody>
-      </p:sp>
-      <p:sp>
-        <p:nvSpPr>
           <p:cNvPr id="4" name="Slide Number Placeholder 3"/>
           <p:cNvSpPr>
             <a:spLocks noGrp="1"/>
@@ -1371,10 +1466,48 @@
           </a:p>
         </p:txBody>
       </p:sp>
+      <p:sp>
+        <p:nvSpPr>
+          <p:cNvPr id="9" name="Slide Image Placeholder 8"/>
+          <p:cNvSpPr>
+            <a:spLocks noGrp="1" noRot="1" noChangeAspect="1"/>
+          </p:cNvSpPr>
+          <p:nvPr>
+            <p:ph type="sldImg"/>
+          </p:nvPr>
+        </p:nvSpPr>
+        <p:spPr>
+          <a:xfrm>
+            <a:off x="547688" y="612775"/>
+            <a:ext cx="5762625" cy="3241675"/>
+          </a:xfrm>
+        </p:spPr>
+      </p:sp>
+      <p:sp>
+        <p:nvSpPr>
+          <p:cNvPr id="10" name="Notes Placeholder 9"/>
+          <p:cNvSpPr>
+            <a:spLocks noGrp="1"/>
+          </p:cNvSpPr>
+          <p:nvPr>
+            <p:ph type="body" idx="1"/>
+          </p:nvPr>
+        </p:nvSpPr>
+        <p:spPr/>
+        <p:txBody>
+          <a:bodyPr>
+            <a:normAutofit/>
+          </a:bodyPr>
+          <a:lstStyle/>
+          <a:p>
+            <a:endParaRPr lang="en-US" dirty="0"/>
+          </a:p>
+        </p:txBody>
+      </p:sp>
     </p:spTree>
     <p:extLst>
       <p:ext uri="{BB962C8B-B14F-4D97-AF65-F5344CB8AC3E}">
-        <p14:creationId xmlns:p14="http://schemas.microsoft.com/office/powerpoint/2010/main" val="3950672114"/>
+        <p14:creationId xmlns:p14="http://schemas.microsoft.com/office/powerpoint/2010/main" val="3968705523"/>
       </p:ext>
     </p:extLst>
   </p:cSld>
@@ -1428,7 +1561,101 @@
           <a:bodyPr/>
           <a:lstStyle/>
           <a:p>
-            <a:endParaRPr lang="en-US"/>
+            <a:r>
+              <a:rPr lang="en-US" dirty="0"/>
+              <a:t>Demo: http &amp; exec</a:t>
+            </a:r>
+            <a:r>
+              <a:rPr lang="en-US" baseline="0" dirty="0"/>
+              <a:t> liveness pods (see </a:t>
+            </a:r>
+            <a:r>
+              <a:rPr lang="en-US" baseline="0" dirty="0" err="1"/>
+              <a:t>pod_exec_liveness</a:t>
+            </a:r>
+            <a:r>
+              <a:rPr lang="en-US" baseline="0" dirty="0"/>
+              <a:t> &amp; </a:t>
+            </a:r>
+            <a:r>
+              <a:rPr lang="en-US" baseline="0" dirty="0" err="1"/>
+              <a:t>pod_http_liveness</a:t>
+            </a:r>
+            <a:r>
+              <a:rPr lang="en-US" baseline="0" dirty="0"/>
+              <a:t> </a:t>
+            </a:r>
+            <a:r>
+              <a:rPr lang="en-US" baseline="0" dirty="0" err="1"/>
+              <a:t>yaml</a:t>
+            </a:r>
+            <a:r>
+              <a:rPr lang="en-US" baseline="0" dirty="0"/>
+              <a:t> files in the solutions folder)</a:t>
+            </a:r>
+            <a:endParaRPr lang="en-US" dirty="0"/>
+          </a:p>
+          <a:p>
+            <a:r>
+              <a:rPr lang="en-US" dirty="0"/>
+              <a:t>Consequence of failed probe:</a:t>
+            </a:r>
+          </a:p>
+          <a:p>
+            <a:pPr marL="285750" indent="-285750">
+              <a:buFontTx/>
+              <a:buChar char="-"/>
+            </a:pPr>
+            <a:r>
+              <a:rPr lang="en-US" dirty="0"/>
+              <a:t>liveness: kill the pod &amp; restart</a:t>
+            </a:r>
+          </a:p>
+          <a:p>
+            <a:pPr marL="285750" indent="-285750">
+              <a:buFontTx/>
+              <a:buChar char="-"/>
+            </a:pPr>
+            <a:r>
+              <a:rPr lang="en-US" dirty="0"/>
+              <a:t>Readiness: mark pod</a:t>
+            </a:r>
+            <a:r>
+              <a:rPr lang="en-US" baseline="0" dirty="0"/>
+              <a:t> as not ready and don’t route service traffic to it</a:t>
+            </a:r>
+            <a:endParaRPr lang="en-US" dirty="0"/>
+          </a:p>
+          <a:p>
+            <a:r>
+              <a:rPr lang="en-US" dirty="0"/>
+              <a:t>Other options</a:t>
+            </a:r>
+            <a:r>
+              <a:rPr lang="en-US" baseline="0" dirty="0"/>
+              <a:t> for probes: </a:t>
+            </a:r>
+          </a:p>
+          <a:p>
+            <a:pPr marL="285750" indent="-285750">
+              <a:buFontTx/>
+              <a:buChar char="-"/>
+            </a:pPr>
+            <a:r>
+              <a:rPr lang="en-US" baseline="0" dirty="0"/>
+              <a:t>TCP: can a connection be opened successfully?</a:t>
+            </a:r>
+          </a:p>
+          <a:p>
+            <a:pPr marL="285750" indent="-285750">
+              <a:buFontTx/>
+              <a:buChar char="-"/>
+            </a:pPr>
+            <a:r>
+              <a:rPr lang="en-US" baseline="0" dirty="0"/>
+              <a:t>EXEC: run a command and evaluate return/exit code</a:t>
+            </a:r>
+            <a:endParaRPr lang="en-US" dirty="0"/>
           </a:p>
         </p:txBody>
       </p:sp>
@@ -1459,7 +1686,7 @@
     </p:spTree>
     <p:extLst>
       <p:ext uri="{BB962C8B-B14F-4D97-AF65-F5344CB8AC3E}">
-        <p14:creationId xmlns:p14="http://schemas.microsoft.com/office/powerpoint/2010/main" val="1827817819"/>
+        <p14:creationId xmlns:p14="http://schemas.microsoft.com/office/powerpoint/2010/main" val="3950672114"/>
       </p:ext>
     </p:extLst>
   </p:cSld>
@@ -1488,6 +1715,37 @@
       </p:grpSpPr>
       <p:sp>
         <p:nvSpPr>
+          <p:cNvPr id="2" name="Slide Image Placeholder 1"/>
+          <p:cNvSpPr>
+            <a:spLocks noGrp="1" noRot="1" noChangeAspect="1"/>
+          </p:cNvSpPr>
+          <p:nvPr>
+            <p:ph type="sldImg"/>
+          </p:nvPr>
+        </p:nvSpPr>
+        <p:spPr/>
+      </p:sp>
+      <p:sp>
+        <p:nvSpPr>
+          <p:cNvPr id="3" name="Notes Placeholder 2"/>
+          <p:cNvSpPr>
+            <a:spLocks noGrp="1"/>
+          </p:cNvSpPr>
+          <p:nvPr>
+            <p:ph type="body" idx="1"/>
+          </p:nvPr>
+        </p:nvSpPr>
+        <p:spPr/>
+        <p:txBody>
+          <a:bodyPr/>
+          <a:lstStyle/>
+          <a:p>
+            <a:endParaRPr lang="en-US"/>
+          </a:p>
+        </p:txBody>
+      </p:sp>
+      <p:sp>
+        <p:nvSpPr>
           <p:cNvPr id="4" name="Slide Number Placeholder 3"/>
           <p:cNvSpPr>
             <a:spLocks noGrp="1"/>
@@ -1510,48 +1768,10 @@
           </a:p>
         </p:txBody>
       </p:sp>
-      <p:sp>
-        <p:nvSpPr>
-          <p:cNvPr id="9" name="Slide Image Placeholder 8"/>
-          <p:cNvSpPr>
-            <a:spLocks noGrp="1" noRot="1" noChangeAspect="1"/>
-          </p:cNvSpPr>
-          <p:nvPr>
-            <p:ph type="sldImg"/>
-          </p:nvPr>
-        </p:nvSpPr>
-        <p:spPr>
-          <a:xfrm>
-            <a:off x="547688" y="612775"/>
-            <a:ext cx="5762625" cy="3241675"/>
-          </a:xfrm>
-        </p:spPr>
-      </p:sp>
-      <p:sp>
-        <p:nvSpPr>
-          <p:cNvPr id="10" name="Notes Placeholder 9"/>
-          <p:cNvSpPr>
-            <a:spLocks noGrp="1"/>
-          </p:cNvSpPr>
-          <p:nvPr>
-            <p:ph type="body" idx="1"/>
-          </p:nvPr>
-        </p:nvSpPr>
-        <p:spPr/>
-        <p:txBody>
-          <a:bodyPr>
-            <a:normAutofit/>
-          </a:bodyPr>
-          <a:lstStyle/>
-          <a:p>
-            <a:endParaRPr lang="en-US" dirty="0"/>
-          </a:p>
-        </p:txBody>
-      </p:sp>
     </p:spTree>
     <p:extLst>
       <p:ext uri="{BB962C8B-B14F-4D97-AF65-F5344CB8AC3E}">
-        <p14:creationId xmlns:p14="http://schemas.microsoft.com/office/powerpoint/2010/main" val="3094605481"/>
+        <p14:creationId xmlns:p14="http://schemas.microsoft.com/office/powerpoint/2010/main" val="1827817819"/>
       </p:ext>
     </p:extLst>
   </p:cSld>
@@ -1580,75 +1800,6 @@
       </p:grpSpPr>
       <p:sp>
         <p:nvSpPr>
-          <p:cNvPr id="2" name="Slide Image Placeholder 1"/>
-          <p:cNvSpPr>
-            <a:spLocks noGrp="1" noRot="1" noChangeAspect="1"/>
-          </p:cNvSpPr>
-          <p:nvPr>
-            <p:ph type="sldImg"/>
-          </p:nvPr>
-        </p:nvSpPr>
-        <p:spPr/>
-      </p:sp>
-      <p:sp>
-        <p:nvSpPr>
-          <p:cNvPr id="3" name="Notes Placeholder 2"/>
-          <p:cNvSpPr>
-            <a:spLocks noGrp="1"/>
-          </p:cNvSpPr>
-          <p:nvPr>
-            <p:ph type="body" idx="1"/>
-          </p:nvPr>
-        </p:nvSpPr>
-        <p:spPr/>
-        <p:txBody>
-          <a:bodyPr/>
-          <a:lstStyle/>
-          <a:p>
-            <a:r>
-              <a:rPr lang="en-US" dirty="0"/>
-              <a:t>The proxy-mode of </a:t>
-            </a:r>
-            <a:r>
-              <a:rPr lang="en-US" dirty="0" err="1"/>
-              <a:t>kubectl</a:t>
-            </a:r>
-            <a:r>
-              <a:rPr lang="en-US" dirty="0"/>
-              <a:t> allows you to easily access the </a:t>
-            </a:r>
-            <a:r>
-              <a:rPr lang="en-US" dirty="0" err="1"/>
-              <a:t>api</a:t>
-            </a:r>
-            <a:r>
-              <a:rPr lang="en-US" dirty="0"/>
-              <a:t>-server of the cluster. </a:t>
-            </a:r>
-          </a:p>
-          <a:p>
-            <a:r>
-              <a:rPr lang="en-US" dirty="0"/>
-              <a:t>Showing the structure of the REST </a:t>
-            </a:r>
-            <a:r>
-              <a:rPr lang="en-US" dirty="0" err="1"/>
-              <a:t>api</a:t>
-            </a:r>
-            <a:r>
-              <a:rPr lang="en-US" dirty="0"/>
-              <a:t> might help as well. Just navigate through it until finding the scheduled pod (by name). Appending the port and “/proxy” will allow browser-based access to the pod via the proxy (without the need </a:t>
-            </a:r>
-            <a:r>
-              <a:rPr lang="en-US"/>
-              <a:t>to expose the pod).</a:t>
-            </a:r>
-            <a:endParaRPr lang="en-US" dirty="0"/>
-          </a:p>
-        </p:txBody>
-      </p:sp>
-      <p:sp>
-        <p:nvSpPr>
           <p:cNvPr id="4" name="Slide Number Placeholder 3"/>
           <p:cNvSpPr>
             <a:spLocks noGrp="1"/>
@@ -1671,10 +1822,48 @@
           </a:p>
         </p:txBody>
       </p:sp>
+      <p:sp>
+        <p:nvSpPr>
+          <p:cNvPr id="9" name="Slide Image Placeholder 8"/>
+          <p:cNvSpPr>
+            <a:spLocks noGrp="1" noRot="1" noChangeAspect="1"/>
+          </p:cNvSpPr>
+          <p:nvPr>
+            <p:ph type="sldImg"/>
+          </p:nvPr>
+        </p:nvSpPr>
+        <p:spPr>
+          <a:xfrm>
+            <a:off x="547688" y="612775"/>
+            <a:ext cx="5762625" cy="3241675"/>
+          </a:xfrm>
+        </p:spPr>
+      </p:sp>
+      <p:sp>
+        <p:nvSpPr>
+          <p:cNvPr id="10" name="Notes Placeholder 9"/>
+          <p:cNvSpPr>
+            <a:spLocks noGrp="1"/>
+          </p:cNvSpPr>
+          <p:nvPr>
+            <p:ph type="body" idx="1"/>
+          </p:nvPr>
+        </p:nvSpPr>
+        <p:spPr/>
+        <p:txBody>
+          <a:bodyPr>
+            <a:normAutofit/>
+          </a:bodyPr>
+          <a:lstStyle/>
+          <a:p>
+            <a:endParaRPr lang="en-US" dirty="0"/>
+          </a:p>
+        </p:txBody>
+      </p:sp>
     </p:spTree>
     <p:extLst>
       <p:ext uri="{BB962C8B-B14F-4D97-AF65-F5344CB8AC3E}">
-        <p14:creationId xmlns:p14="http://schemas.microsoft.com/office/powerpoint/2010/main" val="2327213927"/>
+        <p14:creationId xmlns:p14="http://schemas.microsoft.com/office/powerpoint/2010/main" val="3094605481"/>
       </p:ext>
     </p:extLst>
   </p:cSld>
@@ -9259,6 +9448,214 @@
 </file>
 
 <file path=ppt/slides/slide10.xml><?xml version="1.0" encoding="utf-8"?>
+<p:sld xmlns:a="http://schemas.openxmlformats.org/drawingml/2006/main" xmlns:r="http://schemas.openxmlformats.org/officeDocument/2006/relationships" xmlns:p="http://schemas.openxmlformats.org/presentationml/2006/main" show="0">
+  <p:cSld>
+    <p:spTree>
+      <p:nvGrpSpPr>
+        <p:cNvPr id="1" name=""/>
+        <p:cNvGrpSpPr/>
+        <p:nvPr/>
+      </p:nvGrpSpPr>
+      <p:grpSpPr>
+        <a:xfrm>
+          <a:off x="0" y="0"/>
+          <a:ext cx="0" cy="0"/>
+          <a:chOff x="0" y="0"/>
+          <a:chExt cx="0" cy="0"/>
+        </a:xfrm>
+      </p:grpSpPr>
+      <p:sp>
+        <p:nvSpPr>
+          <p:cNvPr id="2" name="Text Placeholder 1"/>
+          <p:cNvSpPr>
+            <a:spLocks noGrp="1"/>
+          </p:cNvSpPr>
+          <p:nvPr>
+            <p:ph type="body" sz="quarter" idx="10"/>
+          </p:nvPr>
+        </p:nvSpPr>
+        <p:spPr>
+          <a:xfrm>
+            <a:off x="504001" y="1181850"/>
+            <a:ext cx="11185200" cy="4552200"/>
+          </a:xfrm>
+        </p:spPr>
+        <p:txBody>
+          <a:bodyPr/>
+          <a:lstStyle/>
+          <a:p>
+            <a:pPr marL="342900" indent="-342900">
+              <a:buFontTx/>
+              <a:buChar char="-"/>
+            </a:pPr>
+            <a:r>
+              <a:rPr lang="en-US" dirty="0"/>
+              <a:t>Show all namespaces in cluster</a:t>
+            </a:r>
+          </a:p>
+          <a:p>
+            <a:pPr marL="342900" indent="-342900">
+              <a:buFontTx/>
+              <a:buChar char="-"/>
+            </a:pPr>
+            <a:r>
+              <a:rPr lang="en-US" dirty="0"/>
+              <a:t>Query a pod from a dedicated namespace (</a:t>
+            </a:r>
+            <a:r>
+              <a:rPr lang="en-US" dirty="0" err="1"/>
+              <a:t>kube</a:t>
+            </a:r>
+            <a:r>
+              <a:rPr lang="en-US" dirty="0"/>
+              <a:t>-system)</a:t>
+            </a:r>
+          </a:p>
+          <a:p>
+            <a:pPr marL="342900" indent="-342900">
+              <a:buFontTx/>
+              <a:buChar char="-"/>
+            </a:pPr>
+            <a:r>
+              <a:rPr lang="en-US" dirty="0"/>
+              <a:t>Create a pod: ~/</a:t>
+            </a:r>
+            <a:r>
+              <a:rPr lang="en-US" dirty="0" err="1"/>
+              <a:t>kubernetes</a:t>
+            </a:r>
+            <a:r>
+              <a:rPr lang="en-US" dirty="0"/>
+              <a:t>/solutions/</a:t>
+            </a:r>
+            <a:r>
+              <a:rPr lang="en-US" dirty="0" err="1"/>
+              <a:t>pod_http_liveness.yaml</a:t>
+            </a:r>
+            <a:endParaRPr lang="en-US" dirty="0"/>
+          </a:p>
+          <a:p>
+            <a:pPr marL="342900" indent="-342900">
+              <a:buFontTx/>
+              <a:buChar char="-"/>
+            </a:pPr>
+            <a:r>
+              <a:rPr lang="en-US" dirty="0"/>
+              <a:t>Access </a:t>
+            </a:r>
+            <a:r>
+              <a:rPr lang="en-US" dirty="0" err="1"/>
+              <a:t>nginx</a:t>
+            </a:r>
+            <a:r>
+              <a:rPr lang="en-US" dirty="0"/>
+              <a:t>:</a:t>
+            </a:r>
+          </a:p>
+          <a:p>
+            <a:pPr marL="522864" lvl="1" indent="-342900">
+              <a:buFontTx/>
+              <a:buChar char="-"/>
+            </a:pPr>
+            <a:r>
+              <a:rPr lang="en-US" dirty="0"/>
+              <a:t>Run </a:t>
+            </a:r>
+            <a:r>
+              <a:rPr lang="en-US" dirty="0" err="1"/>
+              <a:t>kubectl</a:t>
+            </a:r>
+            <a:r>
+              <a:rPr lang="en-US" dirty="0"/>
+              <a:t> proxy</a:t>
+            </a:r>
+          </a:p>
+          <a:p>
+            <a:pPr marL="522864" lvl="1" indent="-342900">
+              <a:buFontTx/>
+              <a:buChar char="-"/>
+            </a:pPr>
+            <a:r>
+              <a:rPr lang="en-US" dirty="0"/>
+              <a:t>Open a browser and connect to localhost&lt;proxy-port&gt;/</a:t>
+            </a:r>
+            <a:r>
+              <a:rPr lang="en-US" dirty="0" err="1"/>
+              <a:t>api</a:t>
+            </a:r>
+            <a:r>
+              <a:rPr lang="en-US" dirty="0"/>
+              <a:t>/v1/namespaces/&lt;namespace&gt;/pods/&lt;pod-name&gt;:&lt;port&gt;/proxy</a:t>
+            </a:r>
+          </a:p>
+          <a:p>
+            <a:pPr marL="522864" lvl="1" indent="-342900">
+              <a:buFontTx/>
+              <a:buChar char="-"/>
+            </a:pPr>
+            <a:r>
+              <a:rPr lang="en-US" dirty="0"/>
+              <a:t>Example: </a:t>
+            </a:r>
+            <a:r>
+              <a:rPr lang="en-US" dirty="0">
+                <a:hlinkClick r:id="rId3"/>
+              </a:rPr>
+              <a:t>http://localhost:8001/api/v1/namespaces/pvxka22/pods/nginx-7f7fdf788c-ljmjs:80/proxy/</a:t>
+            </a:r>
+            <a:r>
+              <a:rPr lang="en-US" dirty="0"/>
+              <a:t> </a:t>
+            </a:r>
+          </a:p>
+          <a:p>
+            <a:pPr marL="342900" indent="-342900">
+              <a:buFontTx/>
+              <a:buChar char="-"/>
+            </a:pPr>
+            <a:r>
+              <a:rPr lang="en-US" dirty="0"/>
+              <a:t>Show logs</a:t>
+            </a:r>
+          </a:p>
+        </p:txBody>
+      </p:sp>
+      <p:sp>
+        <p:nvSpPr>
+          <p:cNvPr id="3" name="Title 2"/>
+          <p:cNvSpPr>
+            <a:spLocks noGrp="1"/>
+          </p:cNvSpPr>
+          <p:nvPr>
+            <p:ph type="title"/>
+          </p:nvPr>
+        </p:nvSpPr>
+        <p:spPr/>
+        <p:txBody>
+          <a:bodyPr/>
+          <a:lstStyle/>
+          <a:p>
+            <a:r>
+              <a:rPr lang="en-US" dirty="0"/>
+              <a:t>Demo</a:t>
+            </a:r>
+          </a:p>
+        </p:txBody>
+      </p:sp>
+    </p:spTree>
+    <p:extLst>
+      <p:ext uri="{BB962C8B-B14F-4D97-AF65-F5344CB8AC3E}">
+        <p14:creationId xmlns:p14="http://schemas.microsoft.com/office/powerpoint/2010/main" val="2631106931"/>
+      </p:ext>
+    </p:extLst>
+  </p:cSld>
+  <p:clrMapOvr>
+    <a:masterClrMapping/>
+  </p:clrMapOvr>
+</p:sld>
+</file>
+
+<file path=ppt/slides/slide11.xml><?xml version="1.0" encoding="utf-8"?>
 <p:sld xmlns:a="http://schemas.openxmlformats.org/drawingml/2006/main" xmlns:r="http://schemas.openxmlformats.org/officeDocument/2006/relationships" xmlns:p="http://schemas.openxmlformats.org/presentationml/2006/main">
   <p:cSld>
     <p:spTree>
@@ -10116,7 +10513,7 @@
 </p:sld>
 </file>
 
-<file path=ppt/slides/slide11.xml><?xml version="1.0" encoding="utf-8"?>
+<file path=ppt/slides/slide12.xml><?xml version="1.0" encoding="utf-8"?>
 <p:sld xmlns:a="http://schemas.openxmlformats.org/drawingml/2006/main" xmlns:r="http://schemas.openxmlformats.org/officeDocument/2006/relationships" xmlns:p="http://schemas.openxmlformats.org/presentationml/2006/main" show="0">
   <p:cSld>
     <p:spTree>
@@ -10932,7 +11329,7 @@
                 <a:ea typeface="Arial Unicode MS" pitchFamily="34" charset="-128"/>
                 <a:cs typeface="Arial Unicode MS" pitchFamily="34" charset="-128"/>
               </a:rPr>
-              <a:t>client</a:t>
+              <a:t>proxy</a:t>
             </a:r>
             <a:endParaRPr kumimoji="0" lang="de-DE" sz="1800" b="0" i="0" u="none" strike="noStrike" kern="0" cap="none" spc="0" normalizeH="0" baseline="0" noProof="0" dirty="0">
               <a:ln>
@@ -11264,6 +11661,891 @@
       </p:grpSpPr>
       <p:sp>
         <p:nvSpPr>
+          <p:cNvPr id="2" name="Title 1">
+            <a:extLst>
+              <a:ext uri="{FF2B5EF4-FFF2-40B4-BE49-F238E27FC236}">
+                <a16:creationId xmlns:a16="http://schemas.microsoft.com/office/drawing/2014/main" id="{C2AD8DC7-A4C9-412C-A423-2880AD0B6E76}"/>
+              </a:ext>
+            </a:extLst>
+          </p:cNvPr>
+          <p:cNvSpPr>
+            <a:spLocks noGrp="1"/>
+          </p:cNvSpPr>
+          <p:nvPr>
+            <p:ph type="title"/>
+          </p:nvPr>
+        </p:nvSpPr>
+        <p:spPr/>
+        <p:txBody>
+          <a:bodyPr/>
+          <a:lstStyle/>
+          <a:p>
+            <a:r>
+              <a:rPr lang="en-US" dirty="0"/>
+              <a:t>Sidecar pattern – or when to use multiple container in a pod</a:t>
+            </a:r>
+          </a:p>
+        </p:txBody>
+      </p:sp>
+      <p:grpSp>
+        <p:nvGrpSpPr>
+          <p:cNvPr id="11" name="Group 10">
+            <a:extLst>
+              <a:ext uri="{FF2B5EF4-FFF2-40B4-BE49-F238E27FC236}">
+                <a16:creationId xmlns:a16="http://schemas.microsoft.com/office/drawing/2014/main" id="{FB2CD143-0D2F-4657-9000-8B31A4D6BDB6}"/>
+              </a:ext>
+            </a:extLst>
+          </p:cNvPr>
+          <p:cNvGrpSpPr/>
+          <p:nvPr/>
+        </p:nvGrpSpPr>
+        <p:grpSpPr>
+          <a:xfrm>
+            <a:off x="3495009" y="2656763"/>
+            <a:ext cx="5204460" cy="3263342"/>
+            <a:chOff x="3394095" y="2548608"/>
+            <a:chExt cx="5204460" cy="3263342"/>
+          </a:xfrm>
+        </p:grpSpPr>
+        <p:sp>
+          <p:nvSpPr>
+            <p:cNvPr id="3" name="Rectangle 2">
+              <a:extLst>
+                <a:ext uri="{FF2B5EF4-FFF2-40B4-BE49-F238E27FC236}">
+                  <a16:creationId xmlns:a16="http://schemas.microsoft.com/office/drawing/2014/main" id="{78AAD8F1-386E-40CE-979F-C79845ECC6E3}"/>
+                </a:ext>
+              </a:extLst>
+            </p:cNvPr>
+            <p:cNvSpPr/>
+            <p:nvPr/>
+          </p:nvSpPr>
+          <p:spPr bwMode="gray">
+            <a:xfrm>
+              <a:off x="3565833" y="2670528"/>
+              <a:ext cx="5032722" cy="3141422"/>
+            </a:xfrm>
+            <a:prstGeom prst="rect">
+              <a:avLst/>
+            </a:prstGeom>
+            <a:ln>
+              <a:headEnd/>
+              <a:tailEnd/>
+            </a:ln>
+          </p:spPr>
+          <p:style>
+            <a:lnRef idx="2">
+              <a:schemeClr val="accent2">
+                <a:shade val="50000"/>
+              </a:schemeClr>
+            </a:lnRef>
+            <a:fillRef idx="1">
+              <a:schemeClr val="accent2"/>
+            </a:fillRef>
+            <a:effectRef idx="0">
+              <a:schemeClr val="accent2"/>
+            </a:effectRef>
+            <a:fontRef idx="minor">
+              <a:schemeClr val="lt1"/>
+            </a:fontRef>
+          </p:style>
+          <p:txBody>
+            <a:bodyPr lIns="90000" tIns="72000" rIns="90000" bIns="72000" rtlCol="0" anchor="t"/>
+            <a:lstStyle/>
+            <a:p>
+              <a:pPr marR="0" algn="ctr" defTabSz="914400" eaLnBrk="1" fontAlgn="base" latinLnBrk="0" hangingPunct="1">
+                <a:lnSpc>
+                  <a:spcPct val="100000"/>
+                </a:lnSpc>
+                <a:spcBef>
+                  <a:spcPct val="50000"/>
+                </a:spcBef>
+                <a:spcAft>
+                  <a:spcPct val="0"/>
+                </a:spcAft>
+                <a:buClr>
+                  <a:srgbClr val="F0AB00"/>
+                </a:buClr>
+                <a:buSzPct val="80000"/>
+                <a:tabLst/>
+              </a:pPr>
+              <a:r>
+                <a:rPr lang="de-DE" sz="1600" b="1" kern="0" noProof="0" dirty="0" err="1">
+                  <a:ea typeface="Arial Unicode MS" pitchFamily="34" charset="-128"/>
+                  <a:cs typeface="Arial Unicode MS" pitchFamily="34" charset="-128"/>
+                </a:rPr>
+                <a:t>Pod</a:t>
+              </a:r>
+              <a:r>
+                <a:rPr lang="de-DE" sz="1600" b="1" kern="0" noProof="0" dirty="0">
+                  <a:ea typeface="Arial Unicode MS" pitchFamily="34" charset="-128"/>
+                  <a:cs typeface="Arial Unicode MS" pitchFamily="34" charset="-128"/>
+                </a:rPr>
+                <a:t>-B</a:t>
+              </a:r>
+              <a:endParaRPr kumimoji="0" lang="de-DE" sz="1600" b="1" i="0" u="none" strike="noStrike" kern="0" cap="none" spc="0" normalizeH="0" baseline="0" noProof="0" dirty="0">
+                <a:ln>
+                  <a:noFill/>
+                </a:ln>
+                <a:effectLst/>
+                <a:uLnTx/>
+                <a:uFillTx/>
+                <a:ea typeface="Arial Unicode MS" pitchFamily="34" charset="-128"/>
+                <a:cs typeface="Arial Unicode MS" pitchFamily="34" charset="-128"/>
+              </a:endParaRPr>
+            </a:p>
+          </p:txBody>
+        </p:sp>
+        <p:sp>
+          <p:nvSpPr>
+            <p:cNvPr id="4" name="Rectangle 3">
+              <a:extLst>
+                <a:ext uri="{FF2B5EF4-FFF2-40B4-BE49-F238E27FC236}">
+                  <a16:creationId xmlns:a16="http://schemas.microsoft.com/office/drawing/2014/main" id="{4306B961-6B68-43FE-86D9-2321AB2204D3}"/>
+                </a:ext>
+              </a:extLst>
+            </p:cNvPr>
+            <p:cNvSpPr/>
+            <p:nvPr/>
+          </p:nvSpPr>
+          <p:spPr bwMode="gray">
+            <a:xfrm>
+              <a:off x="3394095" y="2548608"/>
+              <a:ext cx="1645920" cy="365760"/>
+            </a:xfrm>
+            <a:prstGeom prst="rect">
+              <a:avLst/>
+            </a:prstGeom>
+            <a:ln>
+              <a:headEnd/>
+              <a:tailEnd/>
+            </a:ln>
+          </p:spPr>
+          <p:style>
+            <a:lnRef idx="2">
+              <a:schemeClr val="accent2"/>
+            </a:lnRef>
+            <a:fillRef idx="1">
+              <a:schemeClr val="lt1"/>
+            </a:fillRef>
+            <a:effectRef idx="0">
+              <a:schemeClr val="accent2"/>
+            </a:effectRef>
+            <a:fontRef idx="minor">
+              <a:schemeClr val="dk1"/>
+            </a:fontRef>
+          </p:style>
+          <p:txBody>
+            <a:bodyPr lIns="90000" tIns="72000" rIns="90000" bIns="72000" rtlCol="0" anchor="ctr"/>
+            <a:lstStyle/>
+            <a:p>
+              <a:pPr marR="0" algn="ctr" defTabSz="914400" eaLnBrk="1" fontAlgn="base" latinLnBrk="0" hangingPunct="1">
+                <a:lnSpc>
+                  <a:spcPct val="100000"/>
+                </a:lnSpc>
+                <a:spcBef>
+                  <a:spcPct val="50000"/>
+                </a:spcBef>
+                <a:spcAft>
+                  <a:spcPct val="0"/>
+                </a:spcAft>
+                <a:buClr>
+                  <a:srgbClr val="F0AB00"/>
+                </a:buClr>
+                <a:buSzPct val="80000"/>
+                <a:tabLst/>
+              </a:pPr>
+              <a:r>
+                <a:rPr kumimoji="0" lang="de-DE" sz="1800" b="0" i="0" u="none" strike="noStrike" kern="0" cap="none" spc="0" normalizeH="0" baseline="0" noProof="0" dirty="0">
+                  <a:ln>
+                    <a:noFill/>
+                  </a:ln>
+                  <a:effectLst/>
+                  <a:uLnTx/>
+                  <a:uFillTx/>
+                  <a:ea typeface="Arial Unicode MS" pitchFamily="34" charset="-128"/>
+                  <a:cs typeface="Arial Unicode MS" pitchFamily="34" charset="-128"/>
+                </a:rPr>
+                <a:t>IP: 10.10.10.2</a:t>
+              </a:r>
+            </a:p>
+          </p:txBody>
+        </p:sp>
+        <p:sp>
+          <p:nvSpPr>
+            <p:cNvPr id="5" name="Rectangle 4">
+              <a:extLst>
+                <a:ext uri="{FF2B5EF4-FFF2-40B4-BE49-F238E27FC236}">
+                  <a16:creationId xmlns:a16="http://schemas.microsoft.com/office/drawing/2014/main" id="{D359A288-FA58-4435-A556-6E47F71703E0}"/>
+                </a:ext>
+              </a:extLst>
+            </p:cNvPr>
+            <p:cNvSpPr/>
+            <p:nvPr/>
+          </p:nvSpPr>
+          <p:spPr bwMode="gray">
+            <a:xfrm>
+              <a:off x="3955153" y="3262994"/>
+              <a:ext cx="1627931" cy="1156258"/>
+            </a:xfrm>
+            <a:prstGeom prst="rect">
+              <a:avLst/>
+            </a:prstGeom>
+            <a:ln>
+              <a:headEnd/>
+              <a:tailEnd/>
+            </a:ln>
+          </p:spPr>
+          <p:style>
+            <a:lnRef idx="2">
+              <a:schemeClr val="accent2"/>
+            </a:lnRef>
+            <a:fillRef idx="1">
+              <a:schemeClr val="lt1"/>
+            </a:fillRef>
+            <a:effectRef idx="0">
+              <a:schemeClr val="accent2"/>
+            </a:effectRef>
+            <a:fontRef idx="minor">
+              <a:schemeClr val="dk1"/>
+            </a:fontRef>
+          </p:style>
+          <p:txBody>
+            <a:bodyPr lIns="90000" tIns="72000" rIns="90000" bIns="72000" rtlCol="0" anchor="ctr"/>
+            <a:lstStyle/>
+            <a:p>
+              <a:pPr marR="0" algn="ctr" defTabSz="914400" eaLnBrk="1" fontAlgn="base" latinLnBrk="0" hangingPunct="1">
+                <a:lnSpc>
+                  <a:spcPct val="100000"/>
+                </a:lnSpc>
+                <a:spcBef>
+                  <a:spcPct val="50000"/>
+                </a:spcBef>
+                <a:spcAft>
+                  <a:spcPct val="0"/>
+                </a:spcAft>
+                <a:buClr>
+                  <a:srgbClr val="F0AB00"/>
+                </a:buClr>
+                <a:buSzPct val="80000"/>
+                <a:tabLst/>
+              </a:pPr>
+              <a:r>
+                <a:rPr lang="de-DE" sz="1800" kern="0" dirty="0">
+                  <a:ea typeface="Arial Unicode MS" pitchFamily="34" charset="-128"/>
+                  <a:cs typeface="Arial Unicode MS" pitchFamily="34" charset="-128"/>
+                </a:rPr>
+                <a:t>c</a:t>
+              </a:r>
+              <a:r>
+                <a:rPr kumimoji="0" lang="de-DE" sz="1800" b="0" i="0" u="none" strike="noStrike" kern="0" cap="none" spc="0" normalizeH="0" baseline="0" noProof="0" dirty="0" err="1">
+                  <a:ln>
+                    <a:noFill/>
+                  </a:ln>
+                  <a:effectLst/>
+                  <a:uLnTx/>
+                  <a:uFillTx/>
+                  <a:ea typeface="Arial Unicode MS" pitchFamily="34" charset="-128"/>
+                  <a:cs typeface="Arial Unicode MS" pitchFamily="34" charset="-128"/>
+                </a:rPr>
+                <a:t>ontainer</a:t>
+              </a:r>
+              <a:endParaRPr kumimoji="0" lang="de-DE" sz="1800" b="0" i="0" u="none" strike="noStrike" kern="0" cap="none" spc="0" normalizeH="0" baseline="0" noProof="0" dirty="0">
+                <a:ln>
+                  <a:noFill/>
+                </a:ln>
+                <a:effectLst/>
+                <a:uLnTx/>
+                <a:uFillTx/>
+                <a:ea typeface="Arial Unicode MS" pitchFamily="34" charset="-128"/>
+                <a:cs typeface="Arial Unicode MS" pitchFamily="34" charset="-128"/>
+              </a:endParaRPr>
+            </a:p>
+            <a:p>
+              <a:pPr marR="0" algn="ctr" defTabSz="914400" eaLnBrk="1" fontAlgn="base" latinLnBrk="0" hangingPunct="1">
+                <a:lnSpc>
+                  <a:spcPct val="100000"/>
+                </a:lnSpc>
+                <a:spcBef>
+                  <a:spcPct val="50000"/>
+                </a:spcBef>
+                <a:spcAft>
+                  <a:spcPct val="0"/>
+                </a:spcAft>
+                <a:buClr>
+                  <a:srgbClr val="F0AB00"/>
+                </a:buClr>
+                <a:buSzPct val="80000"/>
+                <a:tabLst/>
+              </a:pPr>
+              <a:r>
+                <a:rPr lang="de-DE" sz="1800" kern="0" dirty="0" err="1">
+                  <a:ea typeface="Arial Unicode MS" pitchFamily="34" charset="-128"/>
+                  <a:cs typeface="Arial Unicode MS" pitchFamily="34" charset="-128"/>
+                </a:rPr>
+                <a:t>nginx</a:t>
+              </a:r>
+              <a:endParaRPr kumimoji="0" lang="de-DE" sz="1800" b="0" i="0" u="none" strike="noStrike" kern="0" cap="none" spc="0" normalizeH="0" baseline="0" noProof="0" dirty="0">
+                <a:ln>
+                  <a:noFill/>
+                </a:ln>
+                <a:effectLst/>
+                <a:uLnTx/>
+                <a:uFillTx/>
+                <a:ea typeface="Arial Unicode MS" pitchFamily="34" charset="-128"/>
+                <a:cs typeface="Arial Unicode MS" pitchFamily="34" charset="-128"/>
+              </a:endParaRPr>
+            </a:p>
+          </p:txBody>
+        </p:sp>
+        <p:sp>
+          <p:nvSpPr>
+            <p:cNvPr id="6" name="Cylinder 5">
+              <a:extLst>
+                <a:ext uri="{FF2B5EF4-FFF2-40B4-BE49-F238E27FC236}">
+                  <a16:creationId xmlns:a16="http://schemas.microsoft.com/office/drawing/2014/main" id="{2F8DF86F-FD0C-44AF-BE66-43A5E289EC3C}"/>
+                </a:ext>
+              </a:extLst>
+            </p:cNvPr>
+            <p:cNvSpPr/>
+            <p:nvPr/>
+          </p:nvSpPr>
+          <p:spPr bwMode="gray">
+            <a:xfrm>
+              <a:off x="5583084" y="4743750"/>
+              <a:ext cx="998220" cy="1004248"/>
+            </a:xfrm>
+            <a:prstGeom prst="can">
+              <a:avLst/>
+            </a:prstGeom>
+            <a:ln>
+              <a:headEnd/>
+              <a:tailEnd/>
+            </a:ln>
+          </p:spPr>
+          <p:style>
+            <a:lnRef idx="2">
+              <a:schemeClr val="accent2"/>
+            </a:lnRef>
+            <a:fillRef idx="1">
+              <a:schemeClr val="lt1"/>
+            </a:fillRef>
+            <a:effectRef idx="0">
+              <a:schemeClr val="accent2"/>
+            </a:effectRef>
+            <a:fontRef idx="minor">
+              <a:schemeClr val="dk1"/>
+            </a:fontRef>
+          </p:style>
+          <p:txBody>
+            <a:bodyPr lIns="90000" tIns="72000" rIns="90000" bIns="72000" rtlCol="0" anchor="ctr"/>
+            <a:lstStyle/>
+            <a:p>
+              <a:pPr marR="0" algn="ctr" defTabSz="914400" eaLnBrk="1" fontAlgn="base" latinLnBrk="0" hangingPunct="1">
+                <a:lnSpc>
+                  <a:spcPct val="100000"/>
+                </a:lnSpc>
+                <a:spcBef>
+                  <a:spcPct val="50000"/>
+                </a:spcBef>
+                <a:spcAft>
+                  <a:spcPct val="0"/>
+                </a:spcAft>
+                <a:buClr>
+                  <a:srgbClr val="F0AB00"/>
+                </a:buClr>
+                <a:buSzPct val="80000"/>
+                <a:tabLst/>
+              </a:pPr>
+              <a:r>
+                <a:rPr kumimoji="0" lang="de-DE" sz="1800" b="0" i="0" u="none" strike="noStrike" kern="0" cap="none" spc="0" normalizeH="0" baseline="0" noProof="0" dirty="0" err="1">
+                  <a:ln>
+                    <a:noFill/>
+                  </a:ln>
+                  <a:effectLst/>
+                  <a:uLnTx/>
+                  <a:uFillTx/>
+                  <a:ea typeface="Arial Unicode MS" pitchFamily="34" charset="-128"/>
+                  <a:cs typeface="Arial Unicode MS" pitchFamily="34" charset="-128"/>
+                </a:rPr>
+                <a:t>volume</a:t>
+              </a:r>
+              <a:endParaRPr kumimoji="0" lang="de-DE" sz="1800" b="0" i="0" u="none" strike="noStrike" kern="0" cap="none" spc="0" normalizeH="0" baseline="0" noProof="0" dirty="0">
+                <a:ln>
+                  <a:noFill/>
+                </a:ln>
+                <a:effectLst/>
+                <a:uLnTx/>
+                <a:uFillTx/>
+                <a:ea typeface="Arial Unicode MS" pitchFamily="34" charset="-128"/>
+                <a:cs typeface="Arial Unicode MS" pitchFamily="34" charset="-128"/>
+              </a:endParaRPr>
+            </a:p>
+          </p:txBody>
+        </p:sp>
+        <p:sp>
+          <p:nvSpPr>
+            <p:cNvPr id="7" name="Rectangle 6">
+              <a:extLst>
+                <a:ext uri="{FF2B5EF4-FFF2-40B4-BE49-F238E27FC236}">
+                  <a16:creationId xmlns:a16="http://schemas.microsoft.com/office/drawing/2014/main" id="{03072AD4-D880-47B9-994A-3B2C64739E7B}"/>
+                </a:ext>
+              </a:extLst>
+            </p:cNvPr>
+            <p:cNvSpPr/>
+            <p:nvPr/>
+          </p:nvSpPr>
+          <p:spPr bwMode="gray">
+            <a:xfrm>
+              <a:off x="6581304" y="3262993"/>
+              <a:ext cx="1627931" cy="1156258"/>
+            </a:xfrm>
+            <a:prstGeom prst="rect">
+              <a:avLst/>
+            </a:prstGeom>
+            <a:ln>
+              <a:headEnd/>
+              <a:tailEnd/>
+            </a:ln>
+          </p:spPr>
+          <p:style>
+            <a:lnRef idx="2">
+              <a:schemeClr val="accent2"/>
+            </a:lnRef>
+            <a:fillRef idx="1">
+              <a:schemeClr val="lt1"/>
+            </a:fillRef>
+            <a:effectRef idx="0">
+              <a:schemeClr val="accent2"/>
+            </a:effectRef>
+            <a:fontRef idx="minor">
+              <a:schemeClr val="dk1"/>
+            </a:fontRef>
+          </p:style>
+          <p:txBody>
+            <a:bodyPr lIns="90000" tIns="72000" rIns="90000" bIns="72000" rtlCol="0" anchor="ctr"/>
+            <a:lstStyle/>
+            <a:p>
+              <a:pPr marR="0" algn="ctr" defTabSz="914400" eaLnBrk="1" fontAlgn="base" latinLnBrk="0" hangingPunct="1">
+                <a:lnSpc>
+                  <a:spcPct val="100000"/>
+                </a:lnSpc>
+                <a:spcBef>
+                  <a:spcPct val="50000"/>
+                </a:spcBef>
+                <a:spcAft>
+                  <a:spcPct val="0"/>
+                </a:spcAft>
+                <a:buClr>
+                  <a:srgbClr val="F0AB00"/>
+                </a:buClr>
+                <a:buSzPct val="80000"/>
+                <a:tabLst/>
+              </a:pPr>
+              <a:r>
+                <a:rPr lang="de-DE" sz="1800" kern="0" dirty="0">
+                  <a:ea typeface="Arial Unicode MS" pitchFamily="34" charset="-128"/>
+                  <a:cs typeface="Arial Unicode MS" pitchFamily="34" charset="-128"/>
+                </a:rPr>
+                <a:t>c</a:t>
+              </a:r>
+              <a:r>
+                <a:rPr kumimoji="0" lang="de-DE" sz="1800" b="0" i="0" u="none" strike="noStrike" kern="0" cap="none" spc="0" normalizeH="0" baseline="0" noProof="0" dirty="0" err="1">
+                  <a:ln>
+                    <a:noFill/>
+                  </a:ln>
+                  <a:effectLst/>
+                  <a:uLnTx/>
+                  <a:uFillTx/>
+                  <a:ea typeface="Arial Unicode MS" pitchFamily="34" charset="-128"/>
+                  <a:cs typeface="Arial Unicode MS" pitchFamily="34" charset="-128"/>
+                </a:rPr>
+                <a:t>ontainer</a:t>
+              </a:r>
+              <a:endParaRPr kumimoji="0" lang="de-DE" sz="1800" b="0" i="0" u="none" strike="noStrike" kern="0" cap="none" spc="0" normalizeH="0" baseline="0" noProof="0" dirty="0">
+                <a:ln>
+                  <a:noFill/>
+                </a:ln>
+                <a:effectLst/>
+                <a:uLnTx/>
+                <a:uFillTx/>
+                <a:ea typeface="Arial Unicode MS" pitchFamily="34" charset="-128"/>
+                <a:cs typeface="Arial Unicode MS" pitchFamily="34" charset="-128"/>
+              </a:endParaRPr>
+            </a:p>
+            <a:p>
+              <a:pPr marR="0" algn="ctr" defTabSz="914400" eaLnBrk="1" fontAlgn="base" latinLnBrk="0" hangingPunct="1">
+                <a:lnSpc>
+                  <a:spcPct val="100000"/>
+                </a:lnSpc>
+                <a:spcBef>
+                  <a:spcPct val="50000"/>
+                </a:spcBef>
+                <a:spcAft>
+                  <a:spcPct val="0"/>
+                </a:spcAft>
+                <a:buClr>
+                  <a:srgbClr val="F0AB00"/>
+                </a:buClr>
+                <a:buSzPct val="80000"/>
+                <a:tabLst/>
+              </a:pPr>
+              <a:r>
+                <a:rPr lang="de-DE" sz="1800" kern="0" dirty="0" err="1">
+                  <a:ea typeface="Arial Unicode MS" pitchFamily="34" charset="-128"/>
+                  <a:cs typeface="Arial Unicode MS" pitchFamily="34" charset="-128"/>
+                </a:rPr>
+                <a:t>proxy</a:t>
+              </a:r>
+              <a:endParaRPr kumimoji="0" lang="de-DE" sz="1800" b="0" i="0" u="none" strike="noStrike" kern="0" cap="none" spc="0" normalizeH="0" baseline="0" noProof="0" dirty="0">
+                <a:ln>
+                  <a:noFill/>
+                </a:ln>
+                <a:effectLst/>
+                <a:uLnTx/>
+                <a:uFillTx/>
+                <a:ea typeface="Arial Unicode MS" pitchFamily="34" charset="-128"/>
+                <a:cs typeface="Arial Unicode MS" pitchFamily="34" charset="-128"/>
+              </a:endParaRPr>
+            </a:p>
+          </p:txBody>
+        </p:sp>
+        <p:cxnSp>
+          <p:nvCxnSpPr>
+            <p:cNvPr id="8" name="Connector: Elbow 7">
+              <a:extLst>
+                <a:ext uri="{FF2B5EF4-FFF2-40B4-BE49-F238E27FC236}">
+                  <a16:creationId xmlns:a16="http://schemas.microsoft.com/office/drawing/2014/main" id="{A9F69B7D-24E3-4263-985E-C5D03E2AFBED}"/>
+                </a:ext>
+              </a:extLst>
+            </p:cNvPr>
+            <p:cNvCxnSpPr>
+              <a:stCxn id="5" idx="2"/>
+              <a:endCxn id="6" idx="2"/>
+            </p:cNvCxnSpPr>
+            <p:nvPr/>
+          </p:nvCxnSpPr>
+          <p:spPr>
+            <a:xfrm rot="16200000" flipH="1">
+              <a:off x="4762790" y="4425580"/>
+              <a:ext cx="826622" cy="813965"/>
+            </a:xfrm>
+            <a:prstGeom prst="bentConnector2">
+              <a:avLst/>
+            </a:prstGeom>
+            <a:ln w="57150">
+              <a:solidFill>
+                <a:schemeClr val="tx1"/>
+              </a:solidFill>
+              <a:headEnd type="triangle"/>
+              <a:tailEnd type="triangle"/>
+            </a:ln>
+          </p:spPr>
+          <p:style>
+            <a:lnRef idx="1">
+              <a:schemeClr val="accent1"/>
+            </a:lnRef>
+            <a:fillRef idx="0">
+              <a:schemeClr val="accent1"/>
+            </a:fillRef>
+            <a:effectRef idx="0">
+              <a:schemeClr val="accent1"/>
+            </a:effectRef>
+            <a:fontRef idx="minor">
+              <a:schemeClr val="tx1"/>
+            </a:fontRef>
+          </p:style>
+        </p:cxnSp>
+        <p:cxnSp>
+          <p:nvCxnSpPr>
+            <p:cNvPr id="9" name="Connector: Elbow 8">
+              <a:extLst>
+                <a:ext uri="{FF2B5EF4-FFF2-40B4-BE49-F238E27FC236}">
+                  <a16:creationId xmlns:a16="http://schemas.microsoft.com/office/drawing/2014/main" id="{4D95C8FA-3BFA-4BA1-A483-C434537E54B9}"/>
+                </a:ext>
+              </a:extLst>
+            </p:cNvPr>
+            <p:cNvCxnSpPr>
+              <a:stCxn id="7" idx="2"/>
+              <a:endCxn id="6" idx="4"/>
+            </p:cNvCxnSpPr>
+            <p:nvPr/>
+          </p:nvCxnSpPr>
+          <p:spPr>
+            <a:xfrm rot="5400000">
+              <a:off x="6574976" y="4425579"/>
+              <a:ext cx="826623" cy="813966"/>
+            </a:xfrm>
+            <a:prstGeom prst="bentConnector2">
+              <a:avLst/>
+            </a:prstGeom>
+            <a:ln w="57150">
+              <a:solidFill>
+                <a:schemeClr val="tx1"/>
+              </a:solidFill>
+              <a:headEnd type="triangle"/>
+              <a:tailEnd type="triangle"/>
+            </a:ln>
+          </p:spPr>
+          <p:style>
+            <a:lnRef idx="1">
+              <a:schemeClr val="accent1"/>
+            </a:lnRef>
+            <a:fillRef idx="0">
+              <a:schemeClr val="accent1"/>
+            </a:fillRef>
+            <a:effectRef idx="0">
+              <a:schemeClr val="accent1"/>
+            </a:effectRef>
+            <a:fontRef idx="minor">
+              <a:schemeClr val="tx1"/>
+            </a:fontRef>
+          </p:style>
+        </p:cxnSp>
+        <p:cxnSp>
+          <p:nvCxnSpPr>
+            <p:cNvPr id="10" name="Connector: Elbow 9">
+              <a:extLst>
+                <a:ext uri="{FF2B5EF4-FFF2-40B4-BE49-F238E27FC236}">
+                  <a16:creationId xmlns:a16="http://schemas.microsoft.com/office/drawing/2014/main" id="{0FF28FED-1367-412F-8C10-8037765AB121}"/>
+                </a:ext>
+              </a:extLst>
+            </p:cNvPr>
+            <p:cNvCxnSpPr>
+              <a:stCxn id="7" idx="1"/>
+              <a:endCxn id="5" idx="3"/>
+            </p:cNvCxnSpPr>
+            <p:nvPr/>
+          </p:nvCxnSpPr>
+          <p:spPr>
+            <a:xfrm rot="10800000" flipV="1">
+              <a:off x="5583084" y="3841121"/>
+              <a:ext cx="998220" cy="1"/>
+            </a:xfrm>
+            <a:prstGeom prst="bentConnector3">
+              <a:avLst>
+                <a:gd name="adj1" fmla="val 50000"/>
+              </a:avLst>
+            </a:prstGeom>
+            <a:ln w="57150">
+              <a:solidFill>
+                <a:schemeClr val="tx1"/>
+              </a:solidFill>
+              <a:headEnd type="triangle"/>
+              <a:tailEnd type="triangle"/>
+            </a:ln>
+          </p:spPr>
+          <p:style>
+            <a:lnRef idx="1">
+              <a:schemeClr val="accent1"/>
+            </a:lnRef>
+            <a:fillRef idx="0">
+              <a:schemeClr val="accent1"/>
+            </a:fillRef>
+            <a:effectRef idx="0">
+              <a:schemeClr val="accent1"/>
+            </a:effectRef>
+            <a:fontRef idx="minor">
+              <a:schemeClr val="tx1"/>
+            </a:fontRef>
+          </p:style>
+        </p:cxnSp>
+      </p:grpSp>
+      <p:sp>
+        <p:nvSpPr>
+          <p:cNvPr id="12" name="Speech Bubble: Rectangle 11">
+            <a:extLst>
+              <a:ext uri="{FF2B5EF4-FFF2-40B4-BE49-F238E27FC236}">
+                <a16:creationId xmlns:a16="http://schemas.microsoft.com/office/drawing/2014/main" id="{CEC408BF-E469-4FEB-B3B1-E9272ECCBFBD}"/>
+              </a:ext>
+            </a:extLst>
+          </p:cNvPr>
+          <p:cNvSpPr/>
+          <p:nvPr/>
+        </p:nvSpPr>
+        <p:spPr bwMode="gray">
+          <a:xfrm>
+            <a:off x="8310149" y="1616445"/>
+            <a:ext cx="3008446" cy="915844"/>
+          </a:xfrm>
+          <a:prstGeom prst="wedgeRectCallout">
+            <a:avLst>
+              <a:gd name="adj1" fmla="val -56757"/>
+              <a:gd name="adj2" fmla="val 119702"/>
+            </a:avLst>
+          </a:prstGeom>
+          <a:ln>
+            <a:headEnd/>
+            <a:tailEnd/>
+          </a:ln>
+        </p:spPr>
+        <p:style>
+          <a:lnRef idx="2">
+            <a:schemeClr val="accent5"/>
+          </a:lnRef>
+          <a:fillRef idx="1">
+            <a:schemeClr val="lt1"/>
+          </a:fillRef>
+          <a:effectRef idx="0">
+            <a:schemeClr val="accent5"/>
+          </a:effectRef>
+          <a:fontRef idx="minor">
+            <a:schemeClr val="dk1"/>
+          </a:fontRef>
+        </p:style>
+        <p:txBody>
+          <a:bodyPr lIns="90000" tIns="72000" rIns="90000" bIns="72000" rtlCol="0" anchor="ctr"/>
+          <a:lstStyle/>
+          <a:p>
+            <a:pPr marR="0" algn="ctr" defTabSz="914400" eaLnBrk="1" fontAlgn="base" latinLnBrk="0" hangingPunct="1">
+              <a:lnSpc>
+                <a:spcPct val="100000"/>
+              </a:lnSpc>
+              <a:spcBef>
+                <a:spcPct val="50000"/>
+              </a:spcBef>
+              <a:spcAft>
+                <a:spcPct val="0"/>
+              </a:spcAft>
+              <a:buClr>
+                <a:srgbClr val="F0AB00"/>
+              </a:buClr>
+              <a:buSzPct val="80000"/>
+              <a:tabLst/>
+            </a:pPr>
+            <a:r>
+              <a:rPr lang="en-US" sz="1800" kern="0" dirty="0">
+                <a:ea typeface="Arial Unicode MS" pitchFamily="34" charset="-128"/>
+                <a:cs typeface="Arial Unicode MS" pitchFamily="34" charset="-128"/>
+              </a:rPr>
+              <a:t>Helper container</a:t>
+            </a:r>
+            <a:endParaRPr kumimoji="0" lang="en-US" sz="1800" b="0" i="0" u="none" strike="noStrike" kern="0" cap="none" spc="0" normalizeH="0" baseline="0" noProof="0" dirty="0" err="1">
+              <a:ln>
+                <a:noFill/>
+              </a:ln>
+              <a:effectLst/>
+              <a:uLnTx/>
+              <a:uFillTx/>
+              <a:ea typeface="Arial Unicode MS" pitchFamily="34" charset="-128"/>
+              <a:cs typeface="Arial Unicode MS" pitchFamily="34" charset="-128"/>
+            </a:endParaRPr>
+          </a:p>
+        </p:txBody>
+      </p:sp>
+      <p:sp>
+        <p:nvSpPr>
+          <p:cNvPr id="13" name="Speech Bubble: Rectangle 12">
+            <a:extLst>
+              <a:ext uri="{FF2B5EF4-FFF2-40B4-BE49-F238E27FC236}">
+                <a16:creationId xmlns:a16="http://schemas.microsoft.com/office/drawing/2014/main" id="{A6BFAEFB-B711-43D3-9AF6-2BA756B0F93E}"/>
+              </a:ext>
+            </a:extLst>
+          </p:cNvPr>
+          <p:cNvSpPr/>
+          <p:nvPr/>
+        </p:nvSpPr>
+        <p:spPr bwMode="gray">
+          <a:xfrm>
+            <a:off x="504001" y="1616445"/>
+            <a:ext cx="3008446" cy="915844"/>
+          </a:xfrm>
+          <a:prstGeom prst="wedgeRectCallout">
+            <a:avLst>
+              <a:gd name="adj1" fmla="val 58938"/>
+              <a:gd name="adj2" fmla="val 166939"/>
+            </a:avLst>
+          </a:prstGeom>
+          <a:ln>
+            <a:headEnd/>
+            <a:tailEnd/>
+          </a:ln>
+        </p:spPr>
+        <p:style>
+          <a:lnRef idx="2">
+            <a:schemeClr val="accent5"/>
+          </a:lnRef>
+          <a:fillRef idx="1">
+            <a:schemeClr val="lt1"/>
+          </a:fillRef>
+          <a:effectRef idx="0">
+            <a:schemeClr val="accent5"/>
+          </a:effectRef>
+          <a:fontRef idx="minor">
+            <a:schemeClr val="dk1"/>
+          </a:fontRef>
+        </p:style>
+        <p:txBody>
+          <a:bodyPr lIns="90000" tIns="72000" rIns="90000" bIns="72000" rtlCol="0" anchor="ctr"/>
+          <a:lstStyle/>
+          <a:p>
+            <a:pPr marR="0" algn="ctr" defTabSz="914400" eaLnBrk="1" fontAlgn="base" latinLnBrk="0" hangingPunct="1">
+              <a:lnSpc>
+                <a:spcPct val="100000"/>
+              </a:lnSpc>
+              <a:spcBef>
+                <a:spcPct val="50000"/>
+              </a:spcBef>
+              <a:spcAft>
+                <a:spcPct val="0"/>
+              </a:spcAft>
+              <a:buClr>
+                <a:srgbClr val="F0AB00"/>
+              </a:buClr>
+              <a:buSzPct val="80000"/>
+              <a:tabLst/>
+            </a:pPr>
+            <a:r>
+              <a:rPr lang="en-US" sz="1800" kern="0" dirty="0">
+                <a:ea typeface="Arial Unicode MS" pitchFamily="34" charset="-128"/>
+                <a:cs typeface="Arial Unicode MS" pitchFamily="34" charset="-128"/>
+              </a:rPr>
+              <a:t>Application container</a:t>
+            </a:r>
+            <a:endParaRPr kumimoji="0" lang="en-US" sz="1800" b="0" i="0" u="none" strike="noStrike" kern="0" cap="none" spc="0" normalizeH="0" baseline="0" noProof="0" dirty="0" err="1">
+              <a:ln>
+                <a:noFill/>
+              </a:ln>
+              <a:effectLst/>
+              <a:uLnTx/>
+              <a:uFillTx/>
+              <a:ea typeface="Arial Unicode MS" pitchFamily="34" charset="-128"/>
+              <a:cs typeface="Arial Unicode MS" pitchFamily="34" charset="-128"/>
+            </a:endParaRPr>
+          </a:p>
+        </p:txBody>
+      </p:sp>
+    </p:spTree>
+    <p:extLst>
+      <p:ext uri="{BB962C8B-B14F-4D97-AF65-F5344CB8AC3E}">
+        <p14:creationId xmlns:p14="http://schemas.microsoft.com/office/powerpoint/2010/main" val="171295343"/>
+      </p:ext>
+    </p:extLst>
+  </p:cSld>
+  <p:clrMapOvr>
+    <a:masterClrMapping/>
+  </p:clrMapOvr>
+</p:sld>
+</file>
+
+<file path=ppt/slides/slide4.xml><?xml version="1.0" encoding="utf-8"?>
+<p:sld xmlns:a="http://schemas.openxmlformats.org/drawingml/2006/main" xmlns:r="http://schemas.openxmlformats.org/officeDocument/2006/relationships" xmlns:p="http://schemas.openxmlformats.org/presentationml/2006/main">
+  <p:cSld>
+    <p:spTree>
+      <p:nvGrpSpPr>
+        <p:cNvPr id="1" name=""/>
+        <p:cNvGrpSpPr/>
+        <p:nvPr/>
+      </p:nvGrpSpPr>
+      <p:grpSpPr>
+        <a:xfrm>
+          <a:off x="0" y="0"/>
+          <a:ext cx="0" cy="0"/>
+          <a:chOff x="0" y="0"/>
+          <a:chExt cx="0" cy="0"/>
+        </a:xfrm>
+      </p:grpSpPr>
+      <p:sp>
+        <p:nvSpPr>
           <p:cNvPr id="3" name="Text Placeholder 2"/>
           <p:cNvSpPr>
             <a:spLocks noGrp="1"/>
@@ -11423,7 +12705,7 @@
 </p:sld>
 </file>
 
-<file path=ppt/slides/slide4.xml><?xml version="1.0" encoding="utf-8"?>
+<file path=ppt/slides/slide5.xml><?xml version="1.0" encoding="utf-8"?>
 <p:sld xmlns:a="http://schemas.openxmlformats.org/drawingml/2006/main" xmlns:r="http://schemas.openxmlformats.org/officeDocument/2006/relationships" xmlns:p="http://schemas.openxmlformats.org/presentationml/2006/main">
   <p:cSld>
     <p:spTree>
@@ -12632,7 +13914,7 @@
 </p:sld>
 </file>
 
-<file path=ppt/slides/slide5.xml><?xml version="1.0" encoding="utf-8"?>
+<file path=ppt/slides/slide6.xml><?xml version="1.0" encoding="utf-8"?>
 <p:sld xmlns:a="http://schemas.openxmlformats.org/drawingml/2006/main" xmlns:r="http://schemas.openxmlformats.org/officeDocument/2006/relationships" xmlns:p="http://schemas.openxmlformats.org/presentationml/2006/main">
   <p:cSld>
     <p:spTree>
@@ -13064,7 +14346,7 @@
 </p:sld>
 </file>
 
-<file path=ppt/slides/slide6.xml><?xml version="1.0" encoding="utf-8"?>
+<file path=ppt/slides/slide7.xml><?xml version="1.0" encoding="utf-8"?>
 <p:sld xmlns:a="http://schemas.openxmlformats.org/drawingml/2006/main" xmlns:r="http://schemas.openxmlformats.org/officeDocument/2006/relationships" xmlns:p="http://schemas.openxmlformats.org/presentationml/2006/main">
   <p:cSld>
     <p:spTree>
@@ -13554,7 +14836,7 @@
 </p:sld>
 </file>
 
-<file path=ppt/slides/slide7.xml><?xml version="1.0" encoding="utf-8"?>
+<file path=ppt/slides/slide8.xml><?xml version="1.0" encoding="utf-8"?>
 <p:sld xmlns:a="http://schemas.openxmlformats.org/drawingml/2006/main" xmlns:r="http://schemas.openxmlformats.org/officeDocument/2006/relationships" xmlns:p="http://schemas.openxmlformats.org/presentationml/2006/main">
   <p:cSld>
     <p:spTree>
@@ -14424,7 +15706,7 @@
 </p:sld>
 </file>
 
-<file path=ppt/slides/slide8.xml><?xml version="1.0" encoding="utf-8"?>
+<file path=ppt/slides/slide9.xml><?xml version="1.0" encoding="utf-8"?>
 <p:sld xmlns:a="http://schemas.openxmlformats.org/drawingml/2006/main" xmlns:r="http://schemas.openxmlformats.org/officeDocument/2006/relationships" xmlns:p="http://schemas.openxmlformats.org/presentationml/2006/main">
   <p:cSld>
     <p:spTree>
@@ -14549,214 +15831,6 @@
     <p:extLst>
       <p:ext uri="{BB962C8B-B14F-4D97-AF65-F5344CB8AC3E}">
         <p14:creationId xmlns:p14="http://schemas.microsoft.com/office/powerpoint/2010/main" val="3249990004"/>
-      </p:ext>
-    </p:extLst>
-  </p:cSld>
-  <p:clrMapOvr>
-    <a:masterClrMapping/>
-  </p:clrMapOvr>
-</p:sld>
-</file>
-
-<file path=ppt/slides/slide9.xml><?xml version="1.0" encoding="utf-8"?>
-<p:sld xmlns:a="http://schemas.openxmlformats.org/drawingml/2006/main" xmlns:r="http://schemas.openxmlformats.org/officeDocument/2006/relationships" xmlns:p="http://schemas.openxmlformats.org/presentationml/2006/main" show="0">
-  <p:cSld>
-    <p:spTree>
-      <p:nvGrpSpPr>
-        <p:cNvPr id="1" name=""/>
-        <p:cNvGrpSpPr/>
-        <p:nvPr/>
-      </p:nvGrpSpPr>
-      <p:grpSpPr>
-        <a:xfrm>
-          <a:off x="0" y="0"/>
-          <a:ext cx="0" cy="0"/>
-          <a:chOff x="0" y="0"/>
-          <a:chExt cx="0" cy="0"/>
-        </a:xfrm>
-      </p:grpSpPr>
-      <p:sp>
-        <p:nvSpPr>
-          <p:cNvPr id="2" name="Text Placeholder 1"/>
-          <p:cNvSpPr>
-            <a:spLocks noGrp="1"/>
-          </p:cNvSpPr>
-          <p:nvPr>
-            <p:ph type="body" sz="quarter" idx="10"/>
-          </p:nvPr>
-        </p:nvSpPr>
-        <p:spPr>
-          <a:xfrm>
-            <a:off x="504001" y="1181850"/>
-            <a:ext cx="11185200" cy="4552200"/>
-          </a:xfrm>
-        </p:spPr>
-        <p:txBody>
-          <a:bodyPr/>
-          <a:lstStyle/>
-          <a:p>
-            <a:pPr marL="342900" indent="-342900">
-              <a:buFontTx/>
-              <a:buChar char="-"/>
-            </a:pPr>
-            <a:r>
-              <a:rPr lang="en-US" dirty="0"/>
-              <a:t>Show all namespaces in cluster</a:t>
-            </a:r>
-          </a:p>
-          <a:p>
-            <a:pPr marL="342900" indent="-342900">
-              <a:buFontTx/>
-              <a:buChar char="-"/>
-            </a:pPr>
-            <a:r>
-              <a:rPr lang="en-US" dirty="0"/>
-              <a:t>Query a pod from a dedicated namespace (</a:t>
-            </a:r>
-            <a:r>
-              <a:rPr lang="en-US" dirty="0" err="1"/>
-              <a:t>kube</a:t>
-            </a:r>
-            <a:r>
-              <a:rPr lang="en-US" dirty="0"/>
-              <a:t>-system)</a:t>
-            </a:r>
-          </a:p>
-          <a:p>
-            <a:pPr marL="342900" indent="-342900">
-              <a:buFontTx/>
-              <a:buChar char="-"/>
-            </a:pPr>
-            <a:r>
-              <a:rPr lang="en-US" dirty="0"/>
-              <a:t>Create a pod: ~/</a:t>
-            </a:r>
-            <a:r>
-              <a:rPr lang="en-US" dirty="0" err="1"/>
-              <a:t>kubernetes</a:t>
-            </a:r>
-            <a:r>
-              <a:rPr lang="en-US" dirty="0"/>
-              <a:t>/solutions/</a:t>
-            </a:r>
-            <a:r>
-              <a:rPr lang="en-US" dirty="0" err="1"/>
-              <a:t>pod_http_liveness.yaml</a:t>
-            </a:r>
-            <a:endParaRPr lang="en-US" dirty="0"/>
-          </a:p>
-          <a:p>
-            <a:pPr marL="342900" indent="-342900">
-              <a:buFontTx/>
-              <a:buChar char="-"/>
-            </a:pPr>
-            <a:r>
-              <a:rPr lang="en-US" dirty="0"/>
-              <a:t>Access </a:t>
-            </a:r>
-            <a:r>
-              <a:rPr lang="en-US" dirty="0" err="1"/>
-              <a:t>nginx</a:t>
-            </a:r>
-            <a:r>
-              <a:rPr lang="en-US" dirty="0"/>
-              <a:t>:</a:t>
-            </a:r>
-          </a:p>
-          <a:p>
-            <a:pPr marL="522864" lvl="1" indent="-342900">
-              <a:buFontTx/>
-              <a:buChar char="-"/>
-            </a:pPr>
-            <a:r>
-              <a:rPr lang="en-US" dirty="0"/>
-              <a:t>Run </a:t>
-            </a:r>
-            <a:r>
-              <a:rPr lang="en-US" dirty="0" err="1"/>
-              <a:t>kubectl</a:t>
-            </a:r>
-            <a:r>
-              <a:rPr lang="en-US" dirty="0"/>
-              <a:t> proxy</a:t>
-            </a:r>
-          </a:p>
-          <a:p>
-            <a:pPr marL="522864" lvl="1" indent="-342900">
-              <a:buFontTx/>
-              <a:buChar char="-"/>
-            </a:pPr>
-            <a:r>
-              <a:rPr lang="en-US" dirty="0"/>
-              <a:t>Open a browser and connect to localhost&lt;proxy-port&gt;/</a:t>
-            </a:r>
-            <a:r>
-              <a:rPr lang="en-US" dirty="0" err="1"/>
-              <a:t>api</a:t>
-            </a:r>
-            <a:r>
-              <a:rPr lang="en-US" dirty="0"/>
-              <a:t>/v1/namespaces/&lt;namespace&gt;/pods/&lt;pod-name&gt;:&lt;port&gt;/proxy</a:t>
-            </a:r>
-          </a:p>
-          <a:p>
-            <a:pPr marL="522864" lvl="1" indent="-342900">
-              <a:buFontTx/>
-              <a:buChar char="-"/>
-            </a:pPr>
-            <a:r>
-              <a:rPr lang="en-US" dirty="0"/>
-              <a:t>Example: </a:t>
-            </a:r>
-            <a:r>
-              <a:rPr lang="en-US" dirty="0">
-                <a:hlinkClick r:id="rId3"/>
-              </a:rPr>
-              <a:t>http://localhost:8001/api/v1/namespaces/pvxka22/pods/nginx-7f7fdf788c-ljmjs:80/proxy/</a:t>
-            </a:r>
-            <a:r>
-              <a:rPr lang="en-US" dirty="0"/>
-              <a:t> </a:t>
-            </a:r>
-          </a:p>
-          <a:p>
-            <a:pPr marL="342900" indent="-342900">
-              <a:buFontTx/>
-              <a:buChar char="-"/>
-            </a:pPr>
-            <a:r>
-              <a:rPr lang="en-US" dirty="0"/>
-              <a:t>Show logs</a:t>
-            </a:r>
-          </a:p>
-        </p:txBody>
-      </p:sp>
-      <p:sp>
-        <p:nvSpPr>
-          <p:cNvPr id="3" name="Title 2"/>
-          <p:cNvSpPr>
-            <a:spLocks noGrp="1"/>
-          </p:cNvSpPr>
-          <p:nvPr>
-            <p:ph type="title"/>
-          </p:nvPr>
-        </p:nvSpPr>
-        <p:spPr/>
-        <p:txBody>
-          <a:bodyPr/>
-          <a:lstStyle/>
-          <a:p>
-            <a:r>
-              <a:rPr lang="en-US" dirty="0"/>
-              <a:t>Demo</a:t>
-            </a:r>
-          </a:p>
-        </p:txBody>
-      </p:sp>
-    </p:spTree>
-    <p:extLst>
-      <p:ext uri="{BB962C8B-B14F-4D97-AF65-F5344CB8AC3E}">
-        <p14:creationId xmlns:p14="http://schemas.microsoft.com/office/powerpoint/2010/main" val="2631106931"/>
       </p:ext>
     </p:extLst>
   </p:cSld>

</xml_diff>

<commit_message>
http probe demo + explanation in ppt
</commit_message>
<xml_diff>
--- a/kubernetes/02_namespaces_pods.pptx
+++ b/kubernetes/02_namespaces_pods.pptx
@@ -5,10 +5,10 @@
     <p:sldMasterId id="2147483733" r:id="rId1"/>
   </p:sldMasterIdLst>
   <p:notesMasterIdLst>
-    <p:notesMasterId r:id="rId14"/>
+    <p:notesMasterId r:id="rId15"/>
   </p:notesMasterIdLst>
   <p:handoutMasterIdLst>
-    <p:handoutMasterId r:id="rId15"/>
+    <p:handoutMasterId r:id="rId16"/>
   </p:handoutMasterIdLst>
   <p:sldIdLst>
     <p:sldId id="433" r:id="rId2"/>
@@ -18,11 +18,12 @@
     <p:sldId id="445" r:id="rId6"/>
     <p:sldId id="438" r:id="rId7"/>
     <p:sldId id="446" r:id="rId8"/>
-    <p:sldId id="440" r:id="rId9"/>
-    <p:sldId id="436" r:id="rId10"/>
-    <p:sldId id="443" r:id="rId11"/>
-    <p:sldId id="444" r:id="rId12"/>
-    <p:sldId id="265" r:id="rId13"/>
+    <p:sldId id="443" r:id="rId9"/>
+    <p:sldId id="440" r:id="rId10"/>
+    <p:sldId id="436" r:id="rId11"/>
+    <p:sldId id="448" r:id="rId12"/>
+    <p:sldId id="444" r:id="rId13"/>
+    <p:sldId id="265" r:id="rId14"/>
   </p:sldIdLst>
   <p:sldSz cx="12195175" cy="6858000"/>
   <p:notesSz cx="6858000" cy="9144000"/>
@@ -630,172 +631,6 @@
       </p:grpSpPr>
       <p:sp>
         <p:nvSpPr>
-          <p:cNvPr id="2" name="Slide Image Placeholder 1"/>
-          <p:cNvSpPr>
-            <a:spLocks noGrp="1" noRot="1" noChangeAspect="1"/>
-          </p:cNvSpPr>
-          <p:nvPr>
-            <p:ph type="sldImg"/>
-          </p:nvPr>
-        </p:nvSpPr>
-        <p:spPr/>
-      </p:sp>
-      <p:sp>
-        <p:nvSpPr>
-          <p:cNvPr id="3" name="Notes Placeholder 2"/>
-          <p:cNvSpPr>
-            <a:spLocks noGrp="1"/>
-          </p:cNvSpPr>
-          <p:nvPr>
-            <p:ph type="body" idx="1"/>
-          </p:nvPr>
-        </p:nvSpPr>
-        <p:spPr/>
-        <p:txBody>
-          <a:bodyPr/>
-          <a:lstStyle/>
-          <a:p>
-            <a:pPr marL="342900" indent="-342900">
-              <a:buFontTx/>
-              <a:buChar char="-"/>
-            </a:pPr>
-            <a:r>
-              <a:rPr lang="en-US" dirty="0"/>
-              <a:t>Show all namespaces in cluster</a:t>
-            </a:r>
-          </a:p>
-          <a:p>
-            <a:pPr marL="522900" lvl="1" indent="-342900">
-              <a:buFontTx/>
-              <a:buChar char="-"/>
-            </a:pPr>
-            <a:r>
-              <a:rPr lang="en-US" dirty="0"/>
-              <a:t>If not yet mentioned, explain that everyone has their own namespace. Please be a good citizen and don’t sabotage the others.</a:t>
-            </a:r>
-          </a:p>
-          <a:p>
-            <a:pPr marL="342900" indent="-342900">
-              <a:buFontTx/>
-              <a:buChar char="-"/>
-            </a:pPr>
-            <a:r>
-              <a:rPr lang="en-US" dirty="0"/>
-              <a:t>Query a pod from a dedicated namespace (</a:t>
-            </a:r>
-            <a:r>
-              <a:rPr lang="en-US" dirty="0" err="1"/>
-              <a:t>kube</a:t>
-            </a:r>
-            <a:r>
-              <a:rPr lang="en-US" dirty="0"/>
-              <a:t>-system)</a:t>
-            </a:r>
-          </a:p>
-          <a:p>
-            <a:pPr marL="342900" indent="-342900">
-              <a:buFontTx/>
-              <a:buChar char="-"/>
-            </a:pPr>
-            <a:r>
-              <a:rPr lang="en-US" dirty="0"/>
-              <a:t>Create a pod: ~/</a:t>
-            </a:r>
-            <a:r>
-              <a:rPr lang="en-US" dirty="0" err="1"/>
-              <a:t>kubernetes</a:t>
-            </a:r>
-            <a:r>
-              <a:rPr lang="en-US" dirty="0"/>
-              <a:t>/solutions/02_pod_http_liveness.yaml</a:t>
-            </a:r>
-          </a:p>
-          <a:p>
-            <a:pPr marL="342900" indent="-342900">
-              <a:buFontTx/>
-              <a:buChar char="-"/>
-            </a:pPr>
-            <a:r>
-              <a:rPr lang="en-US" dirty="0"/>
-              <a:t>Access </a:t>
-            </a:r>
-            <a:r>
-              <a:rPr lang="en-US" dirty="0" err="1"/>
-              <a:t>nginx</a:t>
-            </a:r>
-            <a:r>
-              <a:rPr lang="en-US" dirty="0"/>
-              <a:t>:</a:t>
-            </a:r>
-          </a:p>
-          <a:p>
-            <a:pPr marL="522864" lvl="1" indent="-342900">
-              <a:buFontTx/>
-              <a:buChar char="-"/>
-            </a:pPr>
-            <a:r>
-              <a:rPr lang="en-US" dirty="0"/>
-              <a:t>Run  </a:t>
-            </a:r>
-            <a:r>
-              <a:rPr lang="en-US" dirty="0" err="1"/>
-              <a:t>kubectl</a:t>
-            </a:r>
-            <a:r>
-              <a:rPr lang="en-US" dirty="0"/>
-              <a:t> port-forward pod/</a:t>
-            </a:r>
-            <a:r>
-              <a:rPr lang="en-US" dirty="0" err="1"/>
-              <a:t>nginx</a:t>
-            </a:r>
-            <a:r>
-              <a:rPr lang="en-US" dirty="0"/>
-              <a:t>-liveness-pod 8080:80</a:t>
-            </a:r>
-          </a:p>
-          <a:p>
-            <a:pPr marL="522864" lvl="1" indent="-342900">
-              <a:buFontTx/>
-              <a:buChar char="-"/>
-            </a:pPr>
-            <a:r>
-              <a:rPr lang="en-US" dirty="0"/>
-              <a:t>Open a browser and connect to 127.0.0.1:8080</a:t>
-            </a:r>
-          </a:p>
-          <a:p>
-            <a:pPr marL="522864" lvl="1" indent="-342900">
-              <a:buFontTx/>
-              <a:buChar char="-"/>
-            </a:pPr>
-            <a:r>
-              <a:rPr lang="en-US" dirty="0"/>
-              <a:t>Port-forward is a nice command to test access to something that you don’t want to expose (yet). However it is not recommended for any production like setup as the traffic is routed via </a:t>
-            </a:r>
-            <a:r>
-              <a:rPr lang="en-US"/>
-              <a:t>the cluster’s API </a:t>
-            </a:r>
-            <a:r>
-              <a:rPr lang="en-US" dirty="0"/>
-              <a:t>server</a:t>
-            </a:r>
-          </a:p>
-          <a:p>
-            <a:pPr marL="285750" indent="-285750">
-              <a:buFontTx/>
-              <a:buChar char="-"/>
-            </a:pPr>
-            <a:r>
-              <a:rPr lang="en-US" dirty="0"/>
-              <a:t>Show logs of the container (will be the access log) and discuss the effect of the liveness probe</a:t>
-            </a:r>
-          </a:p>
-        </p:txBody>
-      </p:sp>
-      <p:sp>
-        <p:nvSpPr>
           <p:cNvPr id="4" name="Slide Number Placeholder 3"/>
           <p:cNvSpPr>
             <a:spLocks noGrp="1"/>
@@ -818,10 +653,48 @@
           </a:p>
         </p:txBody>
       </p:sp>
+      <p:sp>
+        <p:nvSpPr>
+          <p:cNvPr id="9" name="Slide Image Placeholder 8"/>
+          <p:cNvSpPr>
+            <a:spLocks noGrp="1" noRot="1" noChangeAspect="1"/>
+          </p:cNvSpPr>
+          <p:nvPr>
+            <p:ph type="sldImg"/>
+          </p:nvPr>
+        </p:nvSpPr>
+        <p:spPr>
+          <a:xfrm>
+            <a:off x="547688" y="612775"/>
+            <a:ext cx="5762625" cy="3241675"/>
+          </a:xfrm>
+        </p:spPr>
+      </p:sp>
+      <p:sp>
+        <p:nvSpPr>
+          <p:cNvPr id="10" name="Notes Placeholder 9"/>
+          <p:cNvSpPr>
+            <a:spLocks noGrp="1"/>
+          </p:cNvSpPr>
+          <p:nvPr>
+            <p:ph type="body" idx="1"/>
+          </p:nvPr>
+        </p:nvSpPr>
+        <p:spPr/>
+        <p:txBody>
+          <a:bodyPr>
+            <a:normAutofit/>
+          </a:bodyPr>
+          <a:lstStyle/>
+          <a:p>
+            <a:endParaRPr lang="en-US" dirty="0"/>
+          </a:p>
+        </p:txBody>
+      </p:sp>
     </p:spTree>
     <p:extLst>
       <p:ext uri="{BB962C8B-B14F-4D97-AF65-F5344CB8AC3E}">
-        <p14:creationId xmlns:p14="http://schemas.microsoft.com/office/powerpoint/2010/main" val="2327213927"/>
+        <p14:creationId xmlns:p14="http://schemas.microsoft.com/office/powerpoint/2010/main" val="3094605481"/>
       </p:ext>
     </p:extLst>
   </p:cSld>
@@ -875,7 +748,47 @@
           <a:bodyPr/>
           <a:lstStyle/>
           <a:p>
-            <a:endParaRPr lang="en-US"/>
+            <a:pPr marL="342900" indent="-342900">
+              <a:buFontTx/>
+              <a:buChar char="-"/>
+            </a:pPr>
+            <a:r>
+              <a:rPr lang="en-US" dirty="0"/>
+              <a:t>Show all namespaces in cluster</a:t>
+            </a:r>
+          </a:p>
+          <a:p>
+            <a:pPr marL="522900" lvl="1" indent="-342900">
+              <a:buFontTx/>
+              <a:buChar char="-"/>
+            </a:pPr>
+            <a:r>
+              <a:rPr lang="en-US" dirty="0"/>
+              <a:t>If not yet mentioned, explain that everyone has their own namespace. Please be a good citizen and don’t sabotage the others.</a:t>
+            </a:r>
+          </a:p>
+          <a:p>
+            <a:pPr marL="342900" indent="-342900">
+              <a:buFontTx/>
+              <a:buChar char="-"/>
+            </a:pPr>
+            <a:r>
+              <a:rPr lang="en-US" dirty="0"/>
+              <a:t>Query a pod from a dedicated namespace ( e.g. </a:t>
+            </a:r>
+            <a:r>
+              <a:rPr lang="en-US" dirty="0" err="1"/>
+              <a:t>kube</a:t>
+            </a:r>
+            <a:r>
+              <a:rPr lang="en-US" dirty="0"/>
+              <a:t>-system), explain “-n &lt;namespace</a:t>
+            </a:r>
+            <a:r>
+              <a:rPr lang="en-US"/>
+              <a:t>&gt;” flag</a:t>
+            </a:r>
+            <a:endParaRPr lang="en-US" dirty="0"/>
           </a:p>
         </p:txBody>
       </p:sp>
@@ -906,7 +819,7 @@
     </p:spTree>
     <p:extLst>
       <p:ext uri="{BB962C8B-B14F-4D97-AF65-F5344CB8AC3E}">
-        <p14:creationId xmlns:p14="http://schemas.microsoft.com/office/powerpoint/2010/main" val="2480745755"/>
+        <p14:creationId xmlns:p14="http://schemas.microsoft.com/office/powerpoint/2010/main" val="987303343"/>
       </p:ext>
     </p:extLst>
   </p:cSld>
@@ -935,6 +848,37 @@
       </p:grpSpPr>
       <p:sp>
         <p:nvSpPr>
+          <p:cNvPr id="2" name="Slide Image Placeholder 1"/>
+          <p:cNvSpPr>
+            <a:spLocks noGrp="1" noRot="1" noChangeAspect="1"/>
+          </p:cNvSpPr>
+          <p:nvPr>
+            <p:ph type="sldImg"/>
+          </p:nvPr>
+        </p:nvSpPr>
+        <p:spPr/>
+      </p:sp>
+      <p:sp>
+        <p:nvSpPr>
+          <p:cNvPr id="3" name="Notes Placeholder 2"/>
+          <p:cNvSpPr>
+            <a:spLocks noGrp="1"/>
+          </p:cNvSpPr>
+          <p:nvPr>
+            <p:ph type="body" idx="1"/>
+          </p:nvPr>
+        </p:nvSpPr>
+        <p:spPr/>
+        <p:txBody>
+          <a:bodyPr/>
+          <a:lstStyle/>
+          <a:p>
+            <a:endParaRPr lang="en-US"/>
+          </a:p>
+        </p:txBody>
+      </p:sp>
+      <p:sp>
+        <p:nvSpPr>
           <p:cNvPr id="4" name="Slide Number Placeholder 3"/>
           <p:cNvSpPr>
             <a:spLocks noGrp="1"/>
@@ -952,6 +896,60 @@
               <a:rPr lang="de-DE" smtClean="0"/>
               <a:pPr/>
               <a:t>12</a:t>
+            </a:fld>
+            <a:endParaRPr lang="de-DE" dirty="0"/>
+          </a:p>
+        </p:txBody>
+      </p:sp>
+    </p:spTree>
+    <p:extLst>
+      <p:ext uri="{BB962C8B-B14F-4D97-AF65-F5344CB8AC3E}">
+        <p14:creationId xmlns:p14="http://schemas.microsoft.com/office/powerpoint/2010/main" val="2480745755"/>
+      </p:ext>
+    </p:extLst>
+  </p:cSld>
+  <p:clrMapOvr>
+    <a:masterClrMapping/>
+  </p:clrMapOvr>
+</p:notes>
+</file>
+
+<file path=ppt/notesSlides/notesSlide13.xml><?xml version="1.0" encoding="utf-8"?>
+<p:notes xmlns:a="http://schemas.openxmlformats.org/drawingml/2006/main" xmlns:r="http://schemas.openxmlformats.org/officeDocument/2006/relationships" xmlns:p="http://schemas.openxmlformats.org/presentationml/2006/main">
+  <p:cSld>
+    <p:spTree>
+      <p:nvGrpSpPr>
+        <p:cNvPr id="1" name=""/>
+        <p:cNvGrpSpPr/>
+        <p:nvPr/>
+      </p:nvGrpSpPr>
+      <p:grpSpPr>
+        <a:xfrm>
+          <a:off x="0" y="0"/>
+          <a:ext cx="0" cy="0"/>
+          <a:chOff x="0" y="0"/>
+          <a:chExt cx="0" cy="0"/>
+        </a:xfrm>
+      </p:grpSpPr>
+      <p:sp>
+        <p:nvSpPr>
+          <p:cNvPr id="4" name="Slide Number Placeholder 3"/>
+          <p:cNvSpPr>
+            <a:spLocks noGrp="1"/>
+          </p:cNvSpPr>
+          <p:nvPr>
+            <p:ph type="sldNum" sz="quarter" idx="10"/>
+          </p:nvPr>
+        </p:nvSpPr>
+        <p:spPr/>
+        <p:txBody>
+          <a:bodyPr/>
+          <a:lstStyle/>
+          <a:p>
+            <a:fld id="{7D8C2C35-2B8A-446E-BEC0-FD36716C29AC}" type="slidenum">
+              <a:rPr lang="de-DE" smtClean="0"/>
+              <a:pPr/>
+              <a:t>13</a:t>
             </a:fld>
             <a:endParaRPr lang="de-DE" dirty="0"/>
           </a:p>
@@ -1833,7 +1831,177 @@
           <a:bodyPr/>
           <a:lstStyle/>
           <a:p>
-            <a:endParaRPr lang="en-US"/>
+            <a:pPr marL="342900" indent="-342900">
+              <a:buFontTx/>
+              <a:buChar char="-"/>
+            </a:pPr>
+            <a:r>
+              <a:rPr lang="en-US" dirty="0"/>
+              <a:t>Create a pod: ~/</a:t>
+            </a:r>
+            <a:r>
+              <a:rPr lang="en-US" dirty="0" err="1"/>
+              <a:t>kubernetes</a:t>
+            </a:r>
+            <a:r>
+              <a:rPr lang="en-US" dirty="0"/>
+              <a:t>/demo/02_pod_exec_liveness.yaml</a:t>
+            </a:r>
+          </a:p>
+          <a:p>
+            <a:pPr marL="522900" lvl="1" indent="-342900">
+              <a:buFontTx/>
+              <a:buChar char="-"/>
+            </a:pPr>
+            <a:r>
+              <a:rPr lang="en-US" dirty="0"/>
+              <a:t>Discuss the probe and how it should fail</a:t>
+            </a:r>
+          </a:p>
+          <a:p>
+            <a:pPr marL="522900" lvl="1" indent="-342900">
+              <a:buFontTx/>
+              <a:buChar char="-"/>
+            </a:pPr>
+            <a:r>
+              <a:rPr lang="en-US" dirty="0"/>
+              <a:t>Show how it fails &amp; get restarted</a:t>
+            </a:r>
+          </a:p>
+          <a:p>
+            <a:pPr marL="522900" lvl="1" indent="-342900">
+              <a:buFontTx/>
+              <a:buChar char="-"/>
+            </a:pPr>
+            <a:r>
+              <a:rPr lang="en-US" dirty="0"/>
+              <a:t>Point out the failure threshold</a:t>
+            </a:r>
+          </a:p>
+          <a:p>
+            <a:pPr marL="342900" indent="-342900">
+              <a:buFontTx/>
+              <a:buChar char="-"/>
+            </a:pPr>
+            <a:r>
+              <a:rPr lang="en-US" dirty="0"/>
+              <a:t>Create a 2</a:t>
+            </a:r>
+            <a:r>
+              <a:rPr lang="en-US" baseline="30000" dirty="0"/>
+              <a:t>nd</a:t>
+            </a:r>
+            <a:r>
+              <a:rPr lang="en-US" dirty="0"/>
+              <a:t> pod, this time with a web server: ~/</a:t>
+            </a:r>
+            <a:r>
+              <a:rPr lang="en-US" dirty="0" err="1"/>
+              <a:t>kubernetes</a:t>
+            </a:r>
+            <a:r>
+              <a:rPr lang="en-US" dirty="0"/>
+              <a:t>/demo/02_pod_http_liveness.yaml</a:t>
+            </a:r>
+          </a:p>
+          <a:p>
+            <a:pPr marL="522900" lvl="1" indent="-342900">
+              <a:buFontTx/>
+              <a:buChar char="-"/>
+            </a:pPr>
+            <a:r>
+              <a:rPr lang="en-US" dirty="0"/>
+              <a:t>Explain the http probe and how it should fill up the logs</a:t>
+            </a:r>
+          </a:p>
+          <a:p>
+            <a:pPr marL="522900" marR="0" lvl="1" indent="-342900" algn="l" defTabSz="1088776" rtl="0" eaLnBrk="1" fontAlgn="auto" latinLnBrk="0" hangingPunct="1">
+              <a:lnSpc>
+                <a:spcPct val="100000"/>
+              </a:lnSpc>
+              <a:spcBef>
+                <a:spcPts val="0"/>
+              </a:spcBef>
+              <a:spcAft>
+                <a:spcPts val="0"/>
+              </a:spcAft>
+              <a:buClr>
+                <a:schemeClr val="accent1"/>
+              </a:buClr>
+              <a:buSzPct val="100000"/>
+              <a:buFontTx/>
+              <a:buChar char="-"/>
+              <a:tabLst/>
+              <a:defRPr/>
+            </a:pPr>
+            <a:r>
+              <a:rPr lang="en-US" dirty="0"/>
+              <a:t>Show logs of the container (will be the access log) and discuss the effect of the liveness probe</a:t>
+            </a:r>
+          </a:p>
+          <a:p>
+            <a:pPr marL="342900" indent="-342900">
+              <a:buFontTx/>
+              <a:buChar char="-"/>
+            </a:pPr>
+            <a:r>
+              <a:rPr lang="en-US" dirty="0"/>
+              <a:t>Access </a:t>
+            </a:r>
+            <a:r>
+              <a:rPr lang="en-US" dirty="0" err="1"/>
+              <a:t>nginx</a:t>
+            </a:r>
+            <a:r>
+              <a:rPr lang="en-US" dirty="0"/>
+              <a:t>:</a:t>
+            </a:r>
+          </a:p>
+          <a:p>
+            <a:pPr marL="522864" lvl="1" indent="-342900">
+              <a:buFontTx/>
+              <a:buChar char="-"/>
+            </a:pPr>
+            <a:r>
+              <a:rPr lang="en-US" dirty="0"/>
+              <a:t>Run  </a:t>
+            </a:r>
+            <a:r>
+              <a:rPr lang="en-US" dirty="0" err="1"/>
+              <a:t>kubectl</a:t>
+            </a:r>
+            <a:r>
+              <a:rPr lang="en-US" dirty="0"/>
+              <a:t> port-forward pod/</a:t>
+            </a:r>
+            <a:r>
+              <a:rPr lang="en-US" dirty="0" err="1"/>
+              <a:t>nginx</a:t>
+            </a:r>
+            <a:r>
+              <a:rPr lang="en-US" dirty="0"/>
+              <a:t>-liveness-pod 8080:80</a:t>
+            </a:r>
+          </a:p>
+          <a:p>
+            <a:pPr marL="522864" lvl="1" indent="-342900">
+              <a:buFontTx/>
+              <a:buChar char="-"/>
+            </a:pPr>
+            <a:r>
+              <a:rPr lang="en-US" dirty="0"/>
+              <a:t>Open a browser and connect to 127.0.0.1:8080</a:t>
+            </a:r>
+          </a:p>
+          <a:p>
+            <a:pPr marL="522864" lvl="1" indent="-342900">
+              <a:buFontTx/>
+              <a:buChar char="-"/>
+            </a:pPr>
+            <a:r>
+              <a:rPr lang="en-US" dirty="0"/>
+              <a:t>Port-forward is a nice command to test access to something that you don’t want to expose (yet). However it is not recommended for any production like setup as the traffic is routed via the cluster’s API server</a:t>
+            </a:r>
           </a:p>
         </p:txBody>
       </p:sp>
@@ -1864,7 +2032,7 @@
     </p:spTree>
     <p:extLst>
       <p:ext uri="{BB962C8B-B14F-4D97-AF65-F5344CB8AC3E}">
-        <p14:creationId xmlns:p14="http://schemas.microsoft.com/office/powerpoint/2010/main" val="1827817819"/>
+        <p14:creationId xmlns:p14="http://schemas.microsoft.com/office/powerpoint/2010/main" val="2327213927"/>
       </p:ext>
     </p:extLst>
   </p:cSld>
@@ -1893,6 +2061,37 @@
       </p:grpSpPr>
       <p:sp>
         <p:nvSpPr>
+          <p:cNvPr id="2" name="Slide Image Placeholder 1"/>
+          <p:cNvSpPr>
+            <a:spLocks noGrp="1" noRot="1" noChangeAspect="1"/>
+          </p:cNvSpPr>
+          <p:nvPr>
+            <p:ph type="sldImg"/>
+          </p:nvPr>
+        </p:nvSpPr>
+        <p:spPr/>
+      </p:sp>
+      <p:sp>
+        <p:nvSpPr>
+          <p:cNvPr id="3" name="Notes Placeholder 2"/>
+          <p:cNvSpPr>
+            <a:spLocks noGrp="1"/>
+          </p:cNvSpPr>
+          <p:nvPr>
+            <p:ph type="body" idx="1"/>
+          </p:nvPr>
+        </p:nvSpPr>
+        <p:spPr/>
+        <p:txBody>
+          <a:bodyPr/>
+          <a:lstStyle/>
+          <a:p>
+            <a:endParaRPr lang="en-US"/>
+          </a:p>
+        </p:txBody>
+      </p:sp>
+      <p:sp>
+        <p:nvSpPr>
           <p:cNvPr id="4" name="Slide Number Placeholder 3"/>
           <p:cNvSpPr>
             <a:spLocks noGrp="1"/>
@@ -1915,48 +2114,10 @@
           </a:p>
         </p:txBody>
       </p:sp>
-      <p:sp>
-        <p:nvSpPr>
-          <p:cNvPr id="9" name="Slide Image Placeholder 8"/>
-          <p:cNvSpPr>
-            <a:spLocks noGrp="1" noRot="1" noChangeAspect="1"/>
-          </p:cNvSpPr>
-          <p:nvPr>
-            <p:ph type="sldImg"/>
-          </p:nvPr>
-        </p:nvSpPr>
-        <p:spPr>
-          <a:xfrm>
-            <a:off x="547688" y="612775"/>
-            <a:ext cx="5762625" cy="3241675"/>
-          </a:xfrm>
-        </p:spPr>
-      </p:sp>
-      <p:sp>
-        <p:nvSpPr>
-          <p:cNvPr id="10" name="Notes Placeholder 9"/>
-          <p:cNvSpPr>
-            <a:spLocks noGrp="1"/>
-          </p:cNvSpPr>
-          <p:nvPr>
-            <p:ph type="body" idx="1"/>
-          </p:nvPr>
-        </p:nvSpPr>
-        <p:spPr/>
-        <p:txBody>
-          <a:bodyPr>
-            <a:normAutofit/>
-          </a:bodyPr>
-          <a:lstStyle/>
-          <a:p>
-            <a:endParaRPr lang="en-US" dirty="0"/>
-          </a:p>
-        </p:txBody>
-      </p:sp>
     </p:spTree>
     <p:extLst>
       <p:ext uri="{BB962C8B-B14F-4D97-AF65-F5344CB8AC3E}">
-        <p14:creationId xmlns:p14="http://schemas.microsoft.com/office/powerpoint/2010/main" val="3094605481"/>
+        <p14:creationId xmlns:p14="http://schemas.microsoft.com/office/powerpoint/2010/main" val="1827817819"/>
       </p:ext>
     </p:extLst>
   </p:cSld>
@@ -9619,6 +9780,140 @@
       </p:grpSpPr>
       <p:sp>
         <p:nvSpPr>
+          <p:cNvPr id="3" name="Text Placeholder 2"/>
+          <p:cNvSpPr>
+            <a:spLocks noGrp="1"/>
+          </p:cNvSpPr>
+          <p:nvPr>
+            <p:ph type="body" sz="quarter" idx="10"/>
+          </p:nvPr>
+        </p:nvSpPr>
+        <p:spPr>
+          <a:xfrm>
+            <a:off x="504000" y="1124700"/>
+            <a:ext cx="8159939" cy="4727460"/>
+          </a:xfrm>
+        </p:spPr>
+        <p:txBody>
+          <a:bodyPr/>
+          <a:lstStyle/>
+          <a:p>
+            <a:pPr lvl="1"/>
+            <a:r>
+              <a:rPr lang="en-US" dirty="0"/>
+              <a:t>Logical realm for applications to run within</a:t>
+            </a:r>
+          </a:p>
+          <a:p>
+            <a:pPr lvl="1"/>
+            <a:r>
+              <a:rPr lang="en-US" dirty="0"/>
+              <a:t>Isolate resources and restrict visibility to objects in the same namespace</a:t>
+            </a:r>
+          </a:p>
+          <a:p>
+            <a:pPr lvl="1"/>
+            <a:r>
+              <a:rPr lang="en-US" dirty="0"/>
+              <a:t>Basic user management is handled on namespace level</a:t>
+            </a:r>
+          </a:p>
+          <a:p>
+            <a:pPr lvl="1"/>
+            <a:r>
+              <a:rPr lang="en-US" dirty="0"/>
+              <a:t>Resource quotas / limits managed per namespace</a:t>
+            </a:r>
+          </a:p>
+          <a:p>
+            <a:pPr lvl="1"/>
+            <a:r>
+              <a:rPr lang="en-US" dirty="0"/>
+              <a:t>Uniqueness of names required per namespace</a:t>
+            </a:r>
+          </a:p>
+          <a:p>
+            <a:pPr lvl="1"/>
+            <a:r>
+              <a:rPr lang="en-US" dirty="0"/>
+              <a:t>Access to services in a different namespace via FQDN &lt;service-name&gt;.&lt;namespace&gt;</a:t>
+            </a:r>
+          </a:p>
+          <a:p>
+            <a:pPr lvl="1"/>
+            <a:r>
+              <a:rPr lang="en-US" dirty="0"/>
+              <a:t>Use –n (--namespace) &lt;namespace&gt; switch with </a:t>
+            </a:r>
+            <a:r>
+              <a:rPr lang="en-US" dirty="0" err="1"/>
+              <a:t>kubectl</a:t>
+            </a:r>
+            <a:r>
+              <a:rPr lang="en-US" dirty="0"/>
+              <a:t> to access resources</a:t>
+            </a:r>
+          </a:p>
+          <a:p>
+            <a:pPr lvl="1"/>
+            <a:endParaRPr lang="en-US" dirty="0"/>
+          </a:p>
+        </p:txBody>
+      </p:sp>
+      <p:sp>
+        <p:nvSpPr>
+          <p:cNvPr id="2" name="Title 1"/>
+          <p:cNvSpPr>
+            <a:spLocks noGrp="1"/>
+          </p:cNvSpPr>
+          <p:nvPr>
+            <p:ph type="title"/>
+          </p:nvPr>
+        </p:nvSpPr>
+        <p:spPr/>
+        <p:txBody>
+          <a:bodyPr/>
+          <a:lstStyle/>
+          <a:p>
+            <a:r>
+              <a:rPr lang="en-US" dirty="0"/>
+              <a:t>Namespaces</a:t>
+            </a:r>
+          </a:p>
+        </p:txBody>
+      </p:sp>
+    </p:spTree>
+    <p:extLst>
+      <p:ext uri="{BB962C8B-B14F-4D97-AF65-F5344CB8AC3E}">
+        <p14:creationId xmlns:p14="http://schemas.microsoft.com/office/powerpoint/2010/main" val="3249990004"/>
+      </p:ext>
+    </p:extLst>
+  </p:cSld>
+  <p:clrMapOvr>
+    <a:masterClrMapping/>
+  </p:clrMapOvr>
+</p:sld>
+</file>
+
+<file path=ppt/slides/slide11.xml><?xml version="1.0" encoding="utf-8"?>
+<p:sld xmlns:a="http://schemas.openxmlformats.org/drawingml/2006/main" xmlns:r="http://schemas.openxmlformats.org/officeDocument/2006/relationships" xmlns:p="http://schemas.openxmlformats.org/presentationml/2006/main">
+  <p:cSld>
+    <p:spTree>
+      <p:nvGrpSpPr>
+        <p:cNvPr id="1" name=""/>
+        <p:cNvGrpSpPr/>
+        <p:nvPr/>
+      </p:nvGrpSpPr>
+      <p:grpSpPr>
+        <a:xfrm>
+          <a:off x="0" y="0"/>
+          <a:ext cx="0" cy="0"/>
+          <a:chOff x="0" y="0"/>
+          <a:chExt cx="0" cy="0"/>
+        </a:xfrm>
+      </p:grpSpPr>
+      <p:sp>
+        <p:nvSpPr>
           <p:cNvPr id="3" name="Title 2"/>
           <p:cNvSpPr>
             <a:spLocks noGrp="1"/>
@@ -9672,7 +9967,7 @@
     </p:spTree>
     <p:extLst>
       <p:ext uri="{BB962C8B-B14F-4D97-AF65-F5344CB8AC3E}">
-        <p14:creationId xmlns:p14="http://schemas.microsoft.com/office/powerpoint/2010/main" val="2631106931"/>
+        <p14:creationId xmlns:p14="http://schemas.microsoft.com/office/powerpoint/2010/main" val="1961122541"/>
       </p:ext>
     </p:extLst>
   </p:cSld>
@@ -9682,7 +9977,7 @@
 </p:sld>
 </file>
 
-<file path=ppt/slides/slide11.xml><?xml version="1.0" encoding="utf-8"?>
+<file path=ppt/slides/slide12.xml><?xml version="1.0" encoding="utf-8"?>
 <p:sld xmlns:a="http://schemas.openxmlformats.org/drawingml/2006/main" xmlns:r="http://schemas.openxmlformats.org/officeDocument/2006/relationships" xmlns:p="http://schemas.openxmlformats.org/presentationml/2006/main">
   <p:cSld>
     <p:spTree>
@@ -10540,7 +10835,7 @@
 </p:sld>
 </file>
 
-<file path=ppt/slides/slide12.xml><?xml version="1.0" encoding="utf-8"?>
+<file path=ppt/slides/slide13.xml><?xml version="1.0" encoding="utf-8"?>
 <p:sld xmlns:a="http://schemas.openxmlformats.org/drawingml/2006/main" xmlns:r="http://schemas.openxmlformats.org/officeDocument/2006/relationships" xmlns:p="http://schemas.openxmlformats.org/presentationml/2006/main" show="0">
   <p:cSld>
     <p:spTree>
@@ -14882,6 +15177,88 @@
       </p:grpSpPr>
       <p:sp>
         <p:nvSpPr>
+          <p:cNvPr id="3" name="Title 2"/>
+          <p:cNvSpPr>
+            <a:spLocks noGrp="1"/>
+          </p:cNvSpPr>
+          <p:nvPr>
+            <p:ph type="title"/>
+          </p:nvPr>
+        </p:nvSpPr>
+        <p:spPr/>
+        <p:txBody>
+          <a:bodyPr/>
+          <a:lstStyle/>
+          <a:p>
+            <a:r>
+              <a:rPr lang="en-US" dirty="0"/>
+              <a:t>Demo</a:t>
+            </a:r>
+          </a:p>
+        </p:txBody>
+      </p:sp>
+      <p:pic>
+        <p:nvPicPr>
+          <p:cNvPr id="4" name="Picture 3">
+            <a:extLst>
+              <a:ext uri="{FF2B5EF4-FFF2-40B4-BE49-F238E27FC236}">
+                <a16:creationId xmlns:a16="http://schemas.microsoft.com/office/drawing/2014/main" id="{667C7630-D1BA-44ED-BD0C-E0F24DE56B91}"/>
+              </a:ext>
+            </a:extLst>
+          </p:cNvPr>
+          <p:cNvPicPr>
+            <a:picLocks noChangeAspect="1"/>
+          </p:cNvPicPr>
+          <p:nvPr/>
+        </p:nvPicPr>
+        <p:blipFill>
+          <a:blip r:embed="rId3"/>
+          <a:stretch>
+            <a:fillRect/>
+          </a:stretch>
+        </p:blipFill>
+        <p:spPr>
+          <a:xfrm>
+            <a:off x="3849419" y="1181180"/>
+            <a:ext cx="4495640" cy="4495640"/>
+          </a:xfrm>
+          <a:prstGeom prst="rect">
+            <a:avLst/>
+          </a:prstGeom>
+        </p:spPr>
+      </p:pic>
+    </p:spTree>
+    <p:extLst>
+      <p:ext uri="{BB962C8B-B14F-4D97-AF65-F5344CB8AC3E}">
+        <p14:creationId xmlns:p14="http://schemas.microsoft.com/office/powerpoint/2010/main" val="2631106931"/>
+      </p:ext>
+    </p:extLst>
+  </p:cSld>
+  <p:clrMapOvr>
+    <a:masterClrMapping/>
+  </p:clrMapOvr>
+</p:sld>
+</file>
+
+<file path=ppt/slides/slide9.xml><?xml version="1.0" encoding="utf-8"?>
+<p:sld xmlns:a="http://schemas.openxmlformats.org/drawingml/2006/main" xmlns:r="http://schemas.openxmlformats.org/officeDocument/2006/relationships" xmlns:p="http://schemas.openxmlformats.org/presentationml/2006/main">
+  <p:cSld>
+    <p:spTree>
+      <p:nvGrpSpPr>
+        <p:cNvPr id="1" name=""/>
+        <p:cNvGrpSpPr/>
+        <p:nvPr/>
+      </p:nvGrpSpPr>
+      <p:grpSpPr>
+        <a:xfrm>
+          <a:off x="0" y="0"/>
+          <a:ext cx="0" cy="0"/>
+          <a:chOff x="0" y="0"/>
+          <a:chExt cx="0" cy="0"/>
+        </a:xfrm>
+      </p:grpSpPr>
+      <p:sp>
+        <p:nvSpPr>
           <p:cNvPr id="24" name="Title 23"/>
           <p:cNvSpPr>
             <a:spLocks noGrp="1"/>
@@ -15724,140 +16101,6 @@
     <p:extLst>
       <p:ext uri="{BB962C8B-B14F-4D97-AF65-F5344CB8AC3E}">
         <p14:creationId xmlns:p14="http://schemas.microsoft.com/office/powerpoint/2010/main" val="3012488707"/>
-      </p:ext>
-    </p:extLst>
-  </p:cSld>
-  <p:clrMapOvr>
-    <a:masterClrMapping/>
-  </p:clrMapOvr>
-</p:sld>
-</file>
-
-<file path=ppt/slides/slide9.xml><?xml version="1.0" encoding="utf-8"?>
-<p:sld xmlns:a="http://schemas.openxmlformats.org/drawingml/2006/main" xmlns:r="http://schemas.openxmlformats.org/officeDocument/2006/relationships" xmlns:p="http://schemas.openxmlformats.org/presentationml/2006/main">
-  <p:cSld>
-    <p:spTree>
-      <p:nvGrpSpPr>
-        <p:cNvPr id="1" name=""/>
-        <p:cNvGrpSpPr/>
-        <p:nvPr/>
-      </p:nvGrpSpPr>
-      <p:grpSpPr>
-        <a:xfrm>
-          <a:off x="0" y="0"/>
-          <a:ext cx="0" cy="0"/>
-          <a:chOff x="0" y="0"/>
-          <a:chExt cx="0" cy="0"/>
-        </a:xfrm>
-      </p:grpSpPr>
-      <p:sp>
-        <p:nvSpPr>
-          <p:cNvPr id="3" name="Text Placeholder 2"/>
-          <p:cNvSpPr>
-            <a:spLocks noGrp="1"/>
-          </p:cNvSpPr>
-          <p:nvPr>
-            <p:ph type="body" sz="quarter" idx="10"/>
-          </p:nvPr>
-        </p:nvSpPr>
-        <p:spPr>
-          <a:xfrm>
-            <a:off x="504000" y="1124700"/>
-            <a:ext cx="8159939" cy="4727460"/>
-          </a:xfrm>
-        </p:spPr>
-        <p:txBody>
-          <a:bodyPr/>
-          <a:lstStyle/>
-          <a:p>
-            <a:pPr lvl="1"/>
-            <a:r>
-              <a:rPr lang="en-US" dirty="0"/>
-              <a:t>Logical realm for applications to run within</a:t>
-            </a:r>
-          </a:p>
-          <a:p>
-            <a:pPr lvl="1"/>
-            <a:r>
-              <a:rPr lang="en-US" dirty="0"/>
-              <a:t>Isolate resources and restrict visibility to objects in the same namespace</a:t>
-            </a:r>
-          </a:p>
-          <a:p>
-            <a:pPr lvl="1"/>
-            <a:r>
-              <a:rPr lang="en-US" dirty="0"/>
-              <a:t>Basic user management is handled on namespace level</a:t>
-            </a:r>
-          </a:p>
-          <a:p>
-            <a:pPr lvl="1"/>
-            <a:r>
-              <a:rPr lang="en-US" dirty="0"/>
-              <a:t>Resource quotas / limits managed per namespace</a:t>
-            </a:r>
-          </a:p>
-          <a:p>
-            <a:pPr lvl="1"/>
-            <a:r>
-              <a:rPr lang="en-US" dirty="0"/>
-              <a:t>Uniqueness of names required per namespace</a:t>
-            </a:r>
-          </a:p>
-          <a:p>
-            <a:pPr lvl="1"/>
-            <a:r>
-              <a:rPr lang="en-US" dirty="0"/>
-              <a:t>Access to services in a different namespace via FQDN &lt;service-name&gt;.&lt;namespace&gt;</a:t>
-            </a:r>
-          </a:p>
-          <a:p>
-            <a:pPr lvl="1"/>
-            <a:r>
-              <a:rPr lang="en-US" dirty="0"/>
-              <a:t>Use –n (--namespace) &lt;namespace&gt; switch with </a:t>
-            </a:r>
-            <a:r>
-              <a:rPr lang="en-US" dirty="0" err="1"/>
-              <a:t>kubectl</a:t>
-            </a:r>
-            <a:r>
-              <a:rPr lang="en-US" dirty="0"/>
-              <a:t> to access resources</a:t>
-            </a:r>
-          </a:p>
-          <a:p>
-            <a:pPr lvl="1"/>
-            <a:endParaRPr lang="en-US" dirty="0"/>
-          </a:p>
-        </p:txBody>
-      </p:sp>
-      <p:sp>
-        <p:nvSpPr>
-          <p:cNvPr id="2" name="Title 1"/>
-          <p:cNvSpPr>
-            <a:spLocks noGrp="1"/>
-          </p:cNvSpPr>
-          <p:nvPr>
-            <p:ph type="title"/>
-          </p:nvPr>
-        </p:nvSpPr>
-        <p:spPr/>
-        <p:txBody>
-          <a:bodyPr/>
-          <a:lstStyle/>
-          <a:p>
-            <a:r>
-              <a:rPr lang="en-US" dirty="0"/>
-              <a:t>Namespaces</a:t>
-            </a:r>
-          </a:p>
-        </p:txBody>
-      </p:sp>
-    </p:spTree>
-    <p:extLst>
-      <p:ext uri="{BB962C8B-B14F-4D97-AF65-F5344CB8AC3E}">
-        <p14:creationId xmlns:p14="http://schemas.microsoft.com/office/powerpoint/2010/main" val="3249990004"/>
       </p:ext>
     </p:extLst>
   </p:cSld>

</xml_diff>

<commit_message>
state: probes refer only to containers
</commit_message>
<xml_diff>
--- a/kubernetes/02_namespaces_pods.pptx
+++ b/kubernetes/02_namespaces_pods.pptx
@@ -1246,13 +1246,8 @@
             </a:r>
             <a:r>
               <a:rPr lang="en-US" dirty="0"/>
-              <a:t> in order to make it re-load the configuration. This is possible, since both container share the same volume (disks) and also the process namespace (if </a:t>
-            </a:r>
-            <a:r>
-              <a:rPr lang="en-US"/>
-              <a:t>configured properly).</a:t>
-            </a:r>
-            <a:endParaRPr lang="en-US" dirty="0"/>
+              <a:t> in order to make it re-load the configuration. This is possible, since both container share the same volume (disks) and also the process namespace (if configured properly).</a:t>
+            </a:r>
           </a:p>
           <a:p>
             <a:pPr marL="285750" indent="-285750">
@@ -1699,7 +1694,7 @@
             </a:pPr>
             <a:r>
               <a:rPr lang="en-US" dirty="0"/>
-              <a:t>liveness: kill the pod &amp; restart</a:t>
+              <a:t>liveness: kill the container and restart it depending on the restart policy.</a:t>
             </a:r>
           </a:p>
           <a:p>

</xml_diff>

<commit_message>
workers are called nodes now
</commit_message>
<xml_diff>
--- a/kubernetes/02_namespaces_pods.pptx
+++ b/kubernetes/02_namespaces_pods.pptx
@@ -10950,12 +10950,16 @@
               <a:buSzPct val="80000"/>
             </a:pPr>
             <a:r>
-              <a:rPr lang="de-DE" sz="2400" b="1" kern="0" dirty="0">
+              <a:rPr lang="de-DE" sz="2400" b="1" kern="0" dirty="0" err="1">
                 <a:ea typeface="Arial Unicode MS" pitchFamily="34" charset="-128"/>
                 <a:cs typeface="Arial Unicode MS" pitchFamily="34" charset="-128"/>
               </a:rPr>
-              <a:t>Worker</a:t>
-            </a:r>
+              <a:t>Node</a:t>
+            </a:r>
+            <a:endParaRPr lang="de-DE" sz="2400" b="1" kern="0" dirty="0">
+              <a:ea typeface="Arial Unicode MS" pitchFamily="34" charset="-128"/>
+              <a:cs typeface="Arial Unicode MS" pitchFamily="34" charset="-128"/>
+            </a:endParaRPr>
           </a:p>
         </p:txBody>
       </p:sp>

</xml_diff>